<commit_message>
pptx update to add images
</commit_message>
<xml_diff>
--- a/06_PresentationUpdates/Radar_ResearchProject.pptx
+++ b/06_PresentationUpdates/Radar_ResearchProject.pptx
@@ -1288,7 +1288,7 @@
           <a:p>
             <a:fld id="{914561EA-877F-40EB-BD03-9F9D93CF8F08}" type="datetimeFigureOut">
               <a:rPr lang="en-US" smtClean="0"/>
-              <a:t>8/11/2025</a:t>
+              <a:t>8/25/2025</a:t>
             </a:fld>
             <a:endParaRPr lang="en-US"/>
           </a:p>
@@ -1818,7 +1818,7 @@
           <a:p>
             <a:fld id="{AFA779F1-D9BB-4E74-86A2-2DC123167359}" type="datetime1">
               <a:rPr lang="en-US" smtClean="0"/>
-              <a:t>8/11/2025</a:t>
+              <a:t>8/25/2025</a:t>
             </a:fld>
             <a:endParaRPr lang="en-US" dirty="0"/>
           </a:p>
@@ -1994,7 +1994,7 @@
           <a:p>
             <a:fld id="{BD548D2B-CE3E-4EDD-9649-B6EE9E3C2340}" type="datetime1">
               <a:rPr lang="en-US" smtClean="0"/>
-              <a:t>8/11/2025</a:t>
+              <a:t>8/25/2025</a:t>
             </a:fld>
             <a:endParaRPr lang="en-US"/>
           </a:p>
@@ -2180,7 +2180,7 @@
           <a:p>
             <a:fld id="{ACEBBA4F-0F17-4FF1-AA6C-E0193917BC1E}" type="datetime1">
               <a:rPr lang="en-US" smtClean="0"/>
-              <a:t>8/11/2025</a:t>
+              <a:t>8/25/2025</a:t>
             </a:fld>
             <a:endParaRPr lang="en-US"/>
           </a:p>
@@ -2356,7 +2356,7 @@
           <a:p>
             <a:fld id="{0EFBEC3F-4208-4590-BA97-4119A385DFD9}" type="datetime1">
               <a:rPr lang="en-US" smtClean="0"/>
-              <a:t>8/11/2025</a:t>
+              <a:t>8/25/2025</a:t>
             </a:fld>
             <a:endParaRPr lang="en-US"/>
           </a:p>
@@ -2609,7 +2609,7 @@
           <a:p>
             <a:fld id="{B2D760EB-C9A5-467F-AA36-B176C44BCBF1}" type="datetime1">
               <a:rPr lang="en-US" smtClean="0"/>
-              <a:t>8/11/2025</a:t>
+              <a:t>8/25/2025</a:t>
             </a:fld>
             <a:endParaRPr lang="en-US"/>
           </a:p>
@@ -2902,7 +2902,7 @@
           <a:p>
             <a:fld id="{1C9B5E61-6324-405D-8AF5-05323E47D966}" type="datetime1">
               <a:rPr lang="en-US" smtClean="0"/>
-              <a:t>8/11/2025</a:t>
+              <a:t>8/25/2025</a:t>
             </a:fld>
             <a:endParaRPr lang="en-US"/>
           </a:p>
@@ -3329,7 +3329,7 @@
           <a:p>
             <a:fld id="{4A37807E-A869-4435-A051-311AEF96909D}" type="datetime1">
               <a:rPr lang="en-US" smtClean="0"/>
-              <a:t>8/11/2025</a:t>
+              <a:t>8/25/2025</a:t>
             </a:fld>
             <a:endParaRPr lang="en-US"/>
           </a:p>
@@ -3454,7 +3454,7 @@
           <a:p>
             <a:fld id="{1BC8686A-CD31-4B11-9B8F-A51012174BB0}" type="datetime1">
               <a:rPr lang="en-US" smtClean="0"/>
-              <a:t>8/11/2025</a:t>
+              <a:t>8/25/2025</a:t>
             </a:fld>
             <a:endParaRPr lang="en-US"/>
           </a:p>
@@ -3557,7 +3557,7 @@
           <a:p>
             <a:fld id="{4F4B4EA3-50E0-4631-85EF-BDA8608D293F}" type="datetime1">
               <a:rPr lang="en-US" smtClean="0"/>
-              <a:t>8/11/2025</a:t>
+              <a:t>8/25/2025</a:t>
             </a:fld>
             <a:endParaRPr lang="en-US"/>
           </a:p>
@@ -3840,7 +3840,7 @@
           <a:p>
             <a:fld id="{4BA8B4E6-89B0-4D9D-AC8C-3B8ECDAACC34}" type="datetime1">
               <a:rPr lang="en-US" smtClean="0"/>
-              <a:t>8/11/2025</a:t>
+              <a:t>8/25/2025</a:t>
             </a:fld>
             <a:endParaRPr lang="en-US"/>
           </a:p>
@@ -4100,7 +4100,7 @@
           <a:p>
             <a:fld id="{0A1BBC16-5931-43C3-BDFF-9B248A400D54}" type="datetime1">
               <a:rPr lang="en-US" smtClean="0"/>
-              <a:t>8/11/2025</a:t>
+              <a:t>8/25/2025</a:t>
             </a:fld>
             <a:endParaRPr lang="en-US"/>
           </a:p>
@@ -4411,7 +4411,7 @@
           <a:p>
             <a:fld id="{A7143E5B-78DF-476F-8A09-9FD612E00067}" type="datetime1">
               <a:rPr lang="en-US" smtClean="0"/>
-              <a:t>8/11/2025</a:t>
+              <a:t>8/25/2025</a:t>
             </a:fld>
             <a:endParaRPr lang="en-US" dirty="0"/>
           </a:p>
@@ -4946,7 +4946,7 @@
           <a:p>
             <a:fld id="{1FF5D759-AFA5-4CA4-8536-68E39A72291A}" type="datetime1">
               <a:rPr lang="en-US" smtClean="0"/>
-              <a:t>8/11/2025</a:t>
+              <a:t>8/25/2025</a:t>
             </a:fld>
             <a:endParaRPr lang="en-US" dirty="0"/>
           </a:p>
@@ -5048,7 +5048,7 @@
           <a:p>
             <a:fld id="{0EFBEC3F-4208-4590-BA97-4119A385DFD9}" type="datetime1">
               <a:rPr lang="en-US" smtClean="0"/>
-              <a:t>8/11/2025</a:t>
+              <a:t>8/25/2025</a:t>
             </a:fld>
             <a:endParaRPr lang="en-US"/>
           </a:p>
@@ -5203,7 +5203,7 @@
           <a:p>
             <a:fld id="{0EFBEC3F-4208-4590-BA97-4119A385DFD9}" type="datetime1">
               <a:rPr lang="en-US" smtClean="0"/>
-              <a:t>8/11/2025</a:t>
+              <a:t>8/25/2025</a:t>
             </a:fld>
             <a:endParaRPr lang="en-US"/>
           </a:p>
@@ -5388,7 +5388,7 @@
           <a:p>
             <a:fld id="{0EFBEC3F-4208-4590-BA97-4119A385DFD9}" type="datetime1">
               <a:rPr lang="en-US" smtClean="0"/>
-              <a:t>8/11/2025</a:t>
+              <a:t>8/25/2025</a:t>
             </a:fld>
             <a:endParaRPr lang="en-US"/>
           </a:p>
@@ -5685,7 +5685,7 @@
           <a:p>
             <a:fld id="{0EFBEC3F-4208-4590-BA97-4119A385DFD9}" type="datetime1">
               <a:rPr lang="en-US" smtClean="0"/>
-              <a:t>8/11/2025</a:t>
+              <a:t>8/25/2025</a:t>
             </a:fld>
             <a:endParaRPr lang="en-US"/>
           </a:p>
@@ -5863,7 +5863,7 @@
           <a:p>
             <a:fld id="{0EFBEC3F-4208-4590-BA97-4119A385DFD9}" type="datetime1">
               <a:rPr lang="en-US" smtClean="0"/>
-              <a:t>8/11/2025</a:t>
+              <a:t>8/25/2025</a:t>
             </a:fld>
             <a:endParaRPr lang="en-US"/>
           </a:p>
@@ -6102,7 +6102,7 @@
           <a:p>
             <a:fld id="{0EFBEC3F-4208-4590-BA97-4119A385DFD9}" type="datetime1">
               <a:rPr lang="en-US" smtClean="0"/>
-              <a:t>8/11/2025</a:t>
+              <a:t>8/25/2025</a:t>
             </a:fld>
             <a:endParaRPr lang="en-US"/>
           </a:p>
@@ -6371,7 +6371,7 @@
           <a:p>
             <a:fld id="{0EFBEC3F-4208-4590-BA97-4119A385DFD9}" type="datetime1">
               <a:rPr lang="en-US" smtClean="0"/>
-              <a:t>8/11/2025</a:t>
+              <a:t>8/25/2025</a:t>
             </a:fld>
             <a:endParaRPr lang="en-US"/>
           </a:p>
@@ -6626,7 +6626,7 @@
           <a:p>
             <a:fld id="{0EFBEC3F-4208-4590-BA97-4119A385DFD9}" type="datetime1">
               <a:rPr lang="en-US" smtClean="0"/>
-              <a:t>8/11/2025</a:t>
+              <a:t>8/25/2025</a:t>
             </a:fld>
             <a:endParaRPr lang="en-US"/>
           </a:p>
@@ -6892,7 +6892,7 @@
           <a:p>
             <a:fld id="{0EFBEC3F-4208-4590-BA97-4119A385DFD9}" type="datetime1">
               <a:rPr lang="en-US" smtClean="0"/>
-              <a:t>8/11/2025</a:t>
+              <a:t>8/25/2025</a:t>
             </a:fld>
             <a:endParaRPr lang="en-US"/>
           </a:p>
@@ -7186,7 +7186,7 @@
           <a:p>
             <a:fld id="{0EFBEC3F-4208-4590-BA97-4119A385DFD9}" type="datetime1">
               <a:rPr lang="en-US" smtClean="0"/>
-              <a:t>8/11/2025</a:t>
+              <a:t>8/25/2025</a:t>
             </a:fld>
             <a:endParaRPr lang="en-US"/>
           </a:p>
@@ -7376,7 +7376,7 @@
           <a:p>
             <a:fld id="{1AA46178-B97E-4817-9029-290586FA77E9}" type="datetime1">
               <a:rPr lang="en-US" smtClean="0"/>
-              <a:t>8/11/2025</a:t>
+              <a:t>8/25/2025</a:t>
             </a:fld>
             <a:endParaRPr lang="en-US"/>
           </a:p>
@@ -7543,7 +7543,7 @@
           <a:p>
             <a:fld id="{0EFBEC3F-4208-4590-BA97-4119A385DFD9}" type="datetime1">
               <a:rPr lang="en-US" smtClean="0"/>
-              <a:t>8/11/2025</a:t>
+              <a:t>8/25/2025</a:t>
             </a:fld>
             <a:endParaRPr lang="en-US"/>
           </a:p>
@@ -7814,7 +7814,7 @@
           <a:p>
             <a:fld id="{0EFBEC3F-4208-4590-BA97-4119A385DFD9}" type="datetime1">
               <a:rPr lang="en-US" smtClean="0"/>
-              <a:t>8/11/2025</a:t>
+              <a:t>8/25/2025</a:t>
             </a:fld>
             <a:endParaRPr lang="en-US"/>
           </a:p>
@@ -8085,7 +8085,7 @@
           <a:p>
             <a:fld id="{0EFBEC3F-4208-4590-BA97-4119A385DFD9}" type="datetime1">
               <a:rPr lang="en-US" smtClean="0"/>
-              <a:t>8/11/2025</a:t>
+              <a:t>8/25/2025</a:t>
             </a:fld>
             <a:endParaRPr lang="en-US"/>
           </a:p>
@@ -8326,7 +8326,7 @@
           <a:p>
             <a:fld id="{0EFBEC3F-4208-4590-BA97-4119A385DFD9}" type="datetime1">
               <a:rPr lang="en-US" smtClean="0"/>
-              <a:t>8/11/2025</a:t>
+              <a:t>8/25/2025</a:t>
             </a:fld>
             <a:endParaRPr lang="en-US"/>
           </a:p>
@@ -8567,7 +8567,7 @@
           <a:p>
             <a:fld id="{0EFBEC3F-4208-4590-BA97-4119A385DFD9}" type="datetime1">
               <a:rPr lang="en-US" smtClean="0"/>
-              <a:t>8/11/2025</a:t>
+              <a:t>8/25/2025</a:t>
             </a:fld>
             <a:endParaRPr lang="en-US"/>
           </a:p>
@@ -8850,7 +8850,7 @@
           <a:p>
             <a:fld id="{0EFBEC3F-4208-4590-BA97-4119A385DFD9}" type="datetime1">
               <a:rPr lang="en-US" smtClean="0"/>
-              <a:t>8/11/2025</a:t>
+              <a:t>8/25/2025</a:t>
             </a:fld>
             <a:endParaRPr lang="en-US"/>
           </a:p>
@@ -9124,7 +9124,7 @@
           <a:p>
             <a:fld id="{0EFBEC3F-4208-4590-BA97-4119A385DFD9}" type="datetime1">
               <a:rPr lang="en-US" smtClean="0"/>
-              <a:t>8/11/2025</a:t>
+              <a:t>8/25/2025</a:t>
             </a:fld>
             <a:endParaRPr lang="en-US"/>
           </a:p>
@@ -9362,7 +9362,7 @@
           <a:p>
             <a:fld id="{0EFBEC3F-4208-4590-BA97-4119A385DFD9}" type="datetime1">
               <a:rPr lang="en-US" smtClean="0"/>
-              <a:t>8/11/2025</a:t>
+              <a:t>8/25/2025</a:t>
             </a:fld>
             <a:endParaRPr lang="en-US"/>
           </a:p>
@@ -9557,39 +9557,89 @@
         <p:spPr/>
         <p:txBody>
           <a:bodyPr>
+            <a:normAutofit fontScale="90000"/>
+          </a:bodyPr>
+          <a:lstStyle/>
+          <a:p>
+            <a:r>
+              <a:rPr lang="en-US" dirty="0"/>
+              <a:t>Period Highlight – 11</a:t>
+            </a:r>
+            <a:br>
+              <a:rPr lang="en-US" dirty="0"/>
+            </a:br>
+            <a:r>
+              <a:rPr lang="en-US" sz="3200" dirty="0"/>
+              <a:t>Hardware Preparations</a:t>
+            </a:r>
+            <a:endParaRPr lang="en-US" dirty="0"/>
+          </a:p>
+        </p:txBody>
+      </p:sp>
+      <p:sp>
+        <p:nvSpPr>
+          <p:cNvPr id="3" name="Content Placeholder 2">
+            <a:extLst>
+              <a:ext uri="{FF2B5EF4-FFF2-40B4-BE49-F238E27FC236}">
+                <a16:creationId xmlns:a16="http://schemas.microsoft.com/office/drawing/2014/main" id="{A83137DA-642A-37AF-D880-4B70BC913D4B}"/>
+              </a:ext>
+            </a:extLst>
+          </p:cNvPr>
+          <p:cNvSpPr>
+            <a:spLocks noGrp="1"/>
+          </p:cNvSpPr>
+          <p:nvPr>
+            <p:ph idx="1"/>
+          </p:nvPr>
+        </p:nvSpPr>
+        <p:spPr>
+          <a:xfrm>
+            <a:off x="457200" y="1600201"/>
+            <a:ext cx="5202936" cy="3054096"/>
+          </a:xfrm>
+        </p:spPr>
+        <p:txBody>
+          <a:bodyPr>
             <a:normAutofit/>
           </a:bodyPr>
           <a:lstStyle/>
           <a:p>
             <a:r>
-              <a:rPr lang="en-US" dirty="0"/>
-              <a:t>Period Highlight - #</a:t>
-            </a:r>
-          </a:p>
-        </p:txBody>
-      </p:sp>
-      <p:sp>
-        <p:nvSpPr>
-          <p:cNvPr id="3" name="Content Placeholder 2">
-            <a:extLst>
-              <a:ext uri="{FF2B5EF4-FFF2-40B4-BE49-F238E27FC236}">
-                <a16:creationId xmlns:a16="http://schemas.microsoft.com/office/drawing/2014/main" id="{A83137DA-642A-37AF-D880-4B70BC913D4B}"/>
-              </a:ext>
-            </a:extLst>
-          </p:cNvPr>
-          <p:cNvSpPr>
-            <a:spLocks noGrp="1"/>
-          </p:cNvSpPr>
-          <p:nvPr>
-            <p:ph idx="1"/>
-          </p:nvPr>
-        </p:nvSpPr>
-        <p:spPr/>
-        <p:txBody>
-          <a:bodyPr/>
-          <a:lstStyle/>
-          <a:p>
-            <a:endParaRPr lang="en-US"/>
+              <a:rPr lang="en-US" sz="1800" dirty="0"/>
+              <a:t>Implementation of both sensors.</a:t>
+            </a:r>
+          </a:p>
+          <a:p>
+            <a:r>
+              <a:rPr lang="en-US" sz="1800" dirty="0"/>
+              <a:t>Frequency offset: 1,9GHz</a:t>
+            </a:r>
+          </a:p>
+          <a:p>
+            <a:r>
+              <a:rPr lang="en-US" sz="1800" dirty="0"/>
+              <a:t>Sensor A (Left)</a:t>
+            </a:r>
+          </a:p>
+          <a:p>
+            <a:pPr lvl="1"/>
+            <a:r>
+              <a:rPr lang="en-US" sz="1800" dirty="0"/>
+              <a:t>60 GHz to 61,98GHz</a:t>
+            </a:r>
+          </a:p>
+          <a:p>
+            <a:r>
+              <a:rPr lang="en-US" sz="1800" dirty="0"/>
+              <a:t>Sensor B (right)</a:t>
+            </a:r>
+          </a:p>
+          <a:p>
+            <a:pPr lvl="1"/>
+            <a:r>
+              <a:rPr lang="en-US" sz="1800" dirty="0"/>
+              <a:t>62 GHz to 63,98 GHz</a:t>
+            </a:r>
           </a:p>
         </p:txBody>
       </p:sp>
@@ -9616,7 +9666,7 @@
           <a:p>
             <a:fld id="{0EFBEC3F-4208-4590-BA97-4119A385DFD9}" type="datetime1">
               <a:rPr lang="en-US" smtClean="0"/>
-              <a:t>8/11/2025</a:t>
+              <a:t>8/25/2025</a:t>
             </a:fld>
             <a:endParaRPr lang="en-US"/>
           </a:p>
@@ -9651,6 +9701,66 @@
           </a:p>
         </p:txBody>
       </p:sp>
+      <p:pic>
+        <p:nvPicPr>
+          <p:cNvPr id="6" name="Picture 5" descr="A graph of a car sensor&#10;&#10;AI-generated content may be incorrect.">
+            <a:extLst>
+              <a:ext uri="{FF2B5EF4-FFF2-40B4-BE49-F238E27FC236}">
+                <a16:creationId xmlns:a16="http://schemas.microsoft.com/office/drawing/2014/main" id="{ABD74DD8-1577-915A-A168-CD9E0F0E4670}"/>
+              </a:ext>
+            </a:extLst>
+          </p:cNvPr>
+          <p:cNvPicPr>
+            <a:picLocks noChangeAspect="1"/>
+          </p:cNvPicPr>
+          <p:nvPr/>
+        </p:nvPicPr>
+        <p:blipFill>
+          <a:blip r:embed="rId2"/>
+          <a:stretch>
+            <a:fillRect/>
+          </a:stretch>
+        </p:blipFill>
+        <p:spPr>
+          <a:xfrm>
+            <a:off x="4376430" y="2614861"/>
+            <a:ext cx="4353540" cy="3511302"/>
+          </a:xfrm>
+          <a:prstGeom prst="rect">
+            <a:avLst/>
+          </a:prstGeom>
+        </p:spPr>
+      </p:pic>
+      <p:pic>
+        <p:nvPicPr>
+          <p:cNvPr id="7" name="Picture 6" descr="A graph of a graph showing a variety of colors&#10;&#10;AI-generated content may be incorrect.">
+            <a:extLst>
+              <a:ext uri="{FF2B5EF4-FFF2-40B4-BE49-F238E27FC236}">
+                <a16:creationId xmlns:a16="http://schemas.microsoft.com/office/drawing/2014/main" id="{3E73C73F-D347-4E6A-76C7-13330DEF52A3}"/>
+              </a:ext>
+            </a:extLst>
+          </p:cNvPr>
+          <p:cNvPicPr>
+            <a:picLocks noChangeAspect="1"/>
+          </p:cNvPicPr>
+          <p:nvPr/>
+        </p:nvPicPr>
+        <p:blipFill>
+          <a:blip r:embed="rId3"/>
+          <a:stretch>
+            <a:fillRect/>
+          </a:stretch>
+        </p:blipFill>
+        <p:spPr>
+          <a:xfrm>
+            <a:off x="380389" y="4279070"/>
+            <a:ext cx="3952871" cy="1957460"/>
+          </a:xfrm>
+          <a:prstGeom prst="rect">
+            <a:avLst/>
+          </a:prstGeom>
+        </p:spPr>
+      </p:pic>
     </p:spTree>
     <p:extLst>
       <p:ext uri="{BB962C8B-B14F-4D97-AF65-F5344CB8AC3E}">
@@ -9765,7 +9875,7 @@
           <a:p>
             <a:fld id="{0EFBEC3F-4208-4590-BA97-4119A385DFD9}" type="datetime1">
               <a:rPr lang="en-US" smtClean="0"/>
-              <a:t>8/11/2025</a:t>
+              <a:t>8/25/2025</a:t>
             </a:fld>
             <a:endParaRPr lang="en-US"/>
           </a:p>
@@ -9921,7 +10031,7 @@
           <a:p>
             <a:fld id="{0EFBEC3F-4208-4590-BA97-4119A385DFD9}" type="datetime1">
               <a:rPr lang="en-US" smtClean="0"/>
-              <a:t>8/11/2025</a:t>
+              <a:t>8/25/2025</a:t>
             </a:fld>
             <a:endParaRPr lang="en-US"/>
           </a:p>
@@ -10122,7 +10232,7 @@
           <a:p>
             <a:fld id="{0EFBEC3F-4208-4590-BA97-4119A385DFD9}" type="datetime1">
               <a:rPr lang="en-US" smtClean="0"/>
-              <a:t>8/11/2025</a:t>
+              <a:t>8/25/2025</a:t>
             </a:fld>
             <a:endParaRPr lang="en-US"/>
           </a:p>
@@ -10464,7 +10574,7 @@
           <a:p>
             <a:fld id="{0EFBEC3F-4208-4590-BA97-4119A385DFD9}" type="datetime1">
               <a:rPr lang="en-US" smtClean="0"/>
-              <a:t>8/11/2025</a:t>
+              <a:t>8/25/2025</a:t>
             </a:fld>
             <a:endParaRPr lang="en-US"/>
           </a:p>
@@ -10715,7 +10825,7 @@
           <a:p>
             <a:fld id="{0EFBEC3F-4208-4590-BA97-4119A385DFD9}" type="datetime1">
               <a:rPr lang="en-US" smtClean="0"/>
-              <a:t>8/11/2025</a:t>
+              <a:t>8/25/2025</a:t>
             </a:fld>
             <a:endParaRPr lang="en-US"/>
           </a:p>
@@ -10871,7 +10981,7 @@
           <a:p>
             <a:fld id="{0EFBEC3F-4208-4590-BA97-4119A385DFD9}" type="datetime1">
               <a:rPr lang="en-US" smtClean="0"/>
-              <a:t>8/11/2025</a:t>
+              <a:t>8/25/2025</a:t>
             </a:fld>
             <a:endParaRPr lang="en-US"/>
           </a:p>
@@ -11190,7 +11300,7 @@
           <a:p>
             <a:fld id="{0EFBEC3F-4208-4590-BA97-4119A385DFD9}" type="datetime1">
               <a:rPr lang="en-US" smtClean="0"/>
-              <a:t>8/11/2025</a:t>
+              <a:t>8/25/2025</a:t>
             </a:fld>
             <a:endParaRPr lang="en-US"/>
           </a:p>
@@ -11503,7 +11613,7 @@
           <a:p>
             <a:fld id="{0EFBEC3F-4208-4590-BA97-4119A385DFD9}" type="datetime1">
               <a:rPr lang="en-US" smtClean="0"/>
-              <a:t>8/11/2025</a:t>
+              <a:t>8/25/2025</a:t>
             </a:fld>
             <a:endParaRPr lang="en-US"/>
           </a:p>

</xml_diff>

<commit_message>
forgot to add move-around images
</commit_message>
<xml_diff>
--- a/06_PresentationUpdates/Radar_ResearchProject.pptx
+++ b/06_PresentationUpdates/Radar_ResearchProject.pptx
@@ -5,7 +5,7 @@
     <p:sldMasterId id="2147483648" r:id="rId1"/>
   </p:sldMasterIdLst>
   <p:notesMasterIdLst>
-    <p:notesMasterId r:id="rId33"/>
+    <p:notesMasterId r:id="rId34"/>
   </p:notesMasterIdLst>
   <p:sldIdLst>
     <p:sldId id="380" r:id="rId2"/>
@@ -37,8 +37,9 @@
     <p:sldId id="406" r:id="rId28"/>
     <p:sldId id="384" r:id="rId29"/>
     <p:sldId id="409" r:id="rId30"/>
-    <p:sldId id="410" r:id="rId31"/>
-    <p:sldId id="385" r:id="rId32"/>
+    <p:sldId id="411" r:id="rId31"/>
+    <p:sldId id="410" r:id="rId32"/>
+    <p:sldId id="385" r:id="rId33"/>
   </p:sldIdLst>
   <p:sldSz cx="9144000" cy="6858000" type="screen4x3"/>
   <p:notesSz cx="6858000" cy="9144000"/>
@@ -10167,6 +10168,173 @@
         <p:cNvPr id="1" name="">
           <a:extLst>
             <a:ext uri="{FF2B5EF4-FFF2-40B4-BE49-F238E27FC236}">
+              <a16:creationId xmlns:a16="http://schemas.microsoft.com/office/drawing/2014/main" id="{FF24E9B9-4751-0E76-AD11-7DC3656C5FB4}"/>
+            </a:ext>
+          </a:extLst>
+        </p:cNvPr>
+        <p:cNvGrpSpPr/>
+        <p:nvPr/>
+      </p:nvGrpSpPr>
+      <p:grpSpPr>
+        <a:xfrm>
+          <a:off x="0" y="0"/>
+          <a:ext cx="0" cy="0"/>
+          <a:chOff x="0" y="0"/>
+          <a:chExt cx="0" cy="0"/>
+        </a:xfrm>
+      </p:grpSpPr>
+      <p:sp>
+        <p:nvSpPr>
+          <p:cNvPr id="2" name="Title 1">
+            <a:extLst>
+              <a:ext uri="{FF2B5EF4-FFF2-40B4-BE49-F238E27FC236}">
+                <a16:creationId xmlns:a16="http://schemas.microsoft.com/office/drawing/2014/main" id="{FFCB1F6A-BE60-9CE3-1B89-77DAA7FD74E4}"/>
+              </a:ext>
+            </a:extLst>
+          </p:cNvPr>
+          <p:cNvSpPr>
+            <a:spLocks noGrp="1"/>
+          </p:cNvSpPr>
+          <p:nvPr>
+            <p:ph type="title"/>
+          </p:nvPr>
+        </p:nvSpPr>
+        <p:spPr/>
+        <p:txBody>
+          <a:bodyPr>
+            <a:normAutofit fontScale="90000"/>
+          </a:bodyPr>
+          <a:lstStyle/>
+          <a:p>
+            <a:r>
+              <a:rPr lang="en-US" dirty="0"/>
+              <a:t>Period Highlight – 11</a:t>
+            </a:r>
+            <a:br>
+              <a:rPr lang="en-US" dirty="0"/>
+            </a:br>
+            <a:r>
+              <a:rPr lang="en-US" sz="3200" dirty="0"/>
+              <a:t>Software Progress</a:t>
+            </a:r>
+            <a:endParaRPr lang="en-US" dirty="0"/>
+          </a:p>
+        </p:txBody>
+      </p:sp>
+      <p:sp>
+        <p:nvSpPr>
+          <p:cNvPr id="3" name="Content Placeholder 2">
+            <a:extLst>
+              <a:ext uri="{FF2B5EF4-FFF2-40B4-BE49-F238E27FC236}">
+                <a16:creationId xmlns:a16="http://schemas.microsoft.com/office/drawing/2014/main" id="{712E0224-EBCF-5274-8104-E61FDBBF917B}"/>
+              </a:ext>
+            </a:extLst>
+          </p:cNvPr>
+          <p:cNvSpPr>
+            <a:spLocks noGrp="1"/>
+          </p:cNvSpPr>
+          <p:nvPr>
+            <p:ph idx="1"/>
+          </p:nvPr>
+        </p:nvSpPr>
+        <p:spPr>
+          <a:xfrm>
+            <a:off x="457200" y="1417638"/>
+            <a:ext cx="5202936" cy="3054096"/>
+          </a:xfrm>
+        </p:spPr>
+        <p:txBody>
+          <a:bodyPr>
+            <a:normAutofit/>
+          </a:bodyPr>
+          <a:lstStyle/>
+          <a:p>
+            <a:r>
+              <a:rPr lang="en-US" sz="1800" dirty="0"/>
+              <a:t>Implementation with single sensor.</a:t>
+            </a:r>
+          </a:p>
+        </p:txBody>
+      </p:sp>
+      <p:sp>
+        <p:nvSpPr>
+          <p:cNvPr id="4" name="Date Placeholder 3">
+            <a:extLst>
+              <a:ext uri="{FF2B5EF4-FFF2-40B4-BE49-F238E27FC236}">
+                <a16:creationId xmlns:a16="http://schemas.microsoft.com/office/drawing/2014/main" id="{D0970F29-5651-901E-F5D5-CED095FBACF3}"/>
+              </a:ext>
+            </a:extLst>
+          </p:cNvPr>
+          <p:cNvSpPr>
+            <a:spLocks noGrp="1"/>
+          </p:cNvSpPr>
+          <p:nvPr>
+            <p:ph type="dt" sz="half" idx="10"/>
+          </p:nvPr>
+        </p:nvSpPr>
+        <p:spPr/>
+        <p:txBody>
+          <a:bodyPr/>
+          <a:lstStyle/>
+          <a:p>
+            <a:fld id="{0EFBEC3F-4208-4590-BA97-4119A385DFD9}" type="datetime1">
+              <a:rPr lang="en-US" smtClean="0"/>
+              <a:t>8/25/2025</a:t>
+            </a:fld>
+            <a:endParaRPr lang="en-US"/>
+          </a:p>
+        </p:txBody>
+      </p:sp>
+      <p:sp>
+        <p:nvSpPr>
+          <p:cNvPr id="5" name="Slide Number Placeholder 4">
+            <a:extLst>
+              <a:ext uri="{FF2B5EF4-FFF2-40B4-BE49-F238E27FC236}">
+                <a16:creationId xmlns:a16="http://schemas.microsoft.com/office/drawing/2014/main" id="{1B93056D-3405-AF6F-78BF-AFA38045C391}"/>
+              </a:ext>
+            </a:extLst>
+          </p:cNvPr>
+          <p:cNvSpPr>
+            <a:spLocks noGrp="1"/>
+          </p:cNvSpPr>
+          <p:nvPr>
+            <p:ph type="sldNum" sz="quarter" idx="12"/>
+          </p:nvPr>
+        </p:nvSpPr>
+        <p:spPr/>
+        <p:txBody>
+          <a:bodyPr/>
+          <a:lstStyle/>
+          <a:p>
+            <a:fld id="{C1FF6DA9-008F-8B48-92A6-B652298478BF}" type="slidenum">
+              <a:rPr lang="en-US" smtClean="0"/>
+              <a:t>30</a:t>
+            </a:fld>
+            <a:endParaRPr lang="en-US"/>
+          </a:p>
+        </p:txBody>
+      </p:sp>
+    </p:spTree>
+    <p:extLst>
+      <p:ext uri="{BB962C8B-B14F-4D97-AF65-F5344CB8AC3E}">
+        <p14:creationId xmlns:p14="http://schemas.microsoft.com/office/powerpoint/2010/main" val="3156544465"/>
+      </p:ext>
+    </p:extLst>
+  </p:cSld>
+  <p:clrMapOvr>
+    <a:masterClrMapping/>
+  </p:clrMapOvr>
+</p:sld>
+</file>
+
+<file path=ppt/slides/slide31.xml><?xml version="1.0" encoding="utf-8"?>
+<p:sld xmlns:a="http://schemas.openxmlformats.org/drawingml/2006/main" xmlns:r="http://schemas.openxmlformats.org/officeDocument/2006/relationships" xmlns:p="http://schemas.openxmlformats.org/presentationml/2006/main">
+  <p:cSld>
+    <p:spTree>
+      <p:nvGrpSpPr>
+        <p:cNvPr id="1" name="">
+          <a:extLst>
+            <a:ext uri="{FF2B5EF4-FFF2-40B4-BE49-F238E27FC236}">
               <a16:creationId xmlns:a16="http://schemas.microsoft.com/office/drawing/2014/main" id="{C7E76805-6940-E5D9-7F60-7B6767121A21}"/>
             </a:ext>
           </a:extLst>
@@ -10250,7 +10418,20 @@
           <a:p>
             <a:r>
               <a:rPr lang="en-US" sz="1800" dirty="0"/>
-              <a:t>Implementation with single sensor.</a:t>
+              <a:t>Implementation with dual sensor.</a:t>
+            </a:r>
+          </a:p>
+          <a:p>
+            <a:r>
+              <a:rPr lang="en-US" sz="1800" dirty="0"/>
+              <a:t>Improvements needed, at some point the recordings were working better than latest version.</a:t>
+            </a:r>
+          </a:p>
+          <a:p>
+            <a:pPr lvl="1"/>
+            <a:r>
+              <a:rPr lang="en-US" sz="1400" dirty="0"/>
+              <a:t>Next goal is to roll back to that point and start from there.</a:t>
             </a:r>
           </a:p>
         </p:txBody>
@@ -10307,12 +10488,42 @@
           <a:p>
             <a:fld id="{C1FF6DA9-008F-8B48-92A6-B652298478BF}" type="slidenum">
               <a:rPr lang="en-US" smtClean="0"/>
-              <a:t>30</a:t>
+              <a:t>31</a:t>
             </a:fld>
             <a:endParaRPr lang="en-US"/>
           </a:p>
         </p:txBody>
       </p:sp>
+      <p:pic>
+        <p:nvPicPr>
+          <p:cNvPr id="6" name="Picture 5">
+            <a:extLst>
+              <a:ext uri="{FF2B5EF4-FFF2-40B4-BE49-F238E27FC236}">
+                <a16:creationId xmlns:a16="http://schemas.microsoft.com/office/drawing/2014/main" id="{FFEA1CB0-4D8B-082E-52D2-93CB3678D796}"/>
+              </a:ext>
+            </a:extLst>
+          </p:cNvPr>
+          <p:cNvPicPr>
+            <a:picLocks noChangeAspect="1"/>
+          </p:cNvPicPr>
+          <p:nvPr/>
+        </p:nvPicPr>
+        <p:blipFill>
+          <a:blip r:embed="rId2"/>
+          <a:stretch>
+            <a:fillRect/>
+          </a:stretch>
+        </p:blipFill>
+        <p:spPr>
+          <a:xfrm>
+            <a:off x="2942360" y="3311588"/>
+            <a:ext cx="6201640" cy="3029373"/>
+          </a:xfrm>
+          <a:prstGeom prst="rect">
+            <a:avLst/>
+          </a:prstGeom>
+        </p:spPr>
+      </p:pic>
     </p:spTree>
     <p:extLst>
       <p:ext uri="{BB962C8B-B14F-4D97-AF65-F5344CB8AC3E}">
@@ -10326,7 +10537,7 @@
 </p:sld>
 </file>
 
-<file path=ppt/slides/slide31.xml><?xml version="1.0" encoding="utf-8"?>
+<file path=ppt/slides/slide32.xml><?xml version="1.0" encoding="utf-8"?>
 <p:sld xmlns:a="http://schemas.openxmlformats.org/drawingml/2006/main" xmlns:r="http://schemas.openxmlformats.org/officeDocument/2006/relationships" xmlns:p="http://schemas.openxmlformats.org/presentationml/2006/main">
   <p:cSld>
     <p:spTree>
@@ -10456,7 +10667,7 @@
           <a:p>
             <a:fld id="{C1FF6DA9-008F-8B48-92A6-B652298478BF}" type="slidenum">
               <a:rPr lang="en-US" smtClean="0"/>
-              <a:t>31</a:t>
+              <a:t>32</a:t>
             </a:fld>
             <a:endParaRPr lang="en-US"/>
           </a:p>

</xml_diff>

<commit_message>
Latest update and fix for code. pptx done for presentation
</commit_message>
<xml_diff>
--- a/06_PresentationUpdates/Radar_ResearchProject.pptx
+++ b/06_PresentationUpdates/Radar_ResearchProject.pptx
@@ -5,7 +5,7 @@
     <p:sldMasterId id="2147483648" r:id="rId1"/>
   </p:sldMasterIdLst>
   <p:notesMasterIdLst>
-    <p:notesMasterId r:id="rId34"/>
+    <p:notesMasterId r:id="rId41"/>
   </p:notesMasterIdLst>
   <p:sldIdLst>
     <p:sldId id="380" r:id="rId2"/>
@@ -26,20 +26,27 @@
     <p:sldId id="397" r:id="rId17"/>
     <p:sldId id="398" r:id="rId18"/>
     <p:sldId id="399" r:id="rId19"/>
-    <p:sldId id="407" r:id="rId20"/>
-    <p:sldId id="408" r:id="rId21"/>
-    <p:sldId id="401" r:id="rId22"/>
-    <p:sldId id="402" r:id="rId23"/>
-    <p:sldId id="403" r:id="rId24"/>
-    <p:sldId id="400" r:id="rId25"/>
-    <p:sldId id="404" r:id="rId26"/>
-    <p:sldId id="405" r:id="rId27"/>
-    <p:sldId id="406" r:id="rId28"/>
-    <p:sldId id="384" r:id="rId29"/>
-    <p:sldId id="409" r:id="rId30"/>
-    <p:sldId id="411" r:id="rId31"/>
-    <p:sldId id="410" r:id="rId32"/>
-    <p:sldId id="385" r:id="rId33"/>
+    <p:sldId id="419" r:id="rId20"/>
+    <p:sldId id="407" r:id="rId21"/>
+    <p:sldId id="408" r:id="rId22"/>
+    <p:sldId id="401" r:id="rId23"/>
+    <p:sldId id="402" r:id="rId24"/>
+    <p:sldId id="403" r:id="rId25"/>
+    <p:sldId id="400" r:id="rId26"/>
+    <p:sldId id="404" r:id="rId27"/>
+    <p:sldId id="405" r:id="rId28"/>
+    <p:sldId id="406" r:id="rId29"/>
+    <p:sldId id="384" r:id="rId30"/>
+    <p:sldId id="409" r:id="rId31"/>
+    <p:sldId id="418" r:id="rId32"/>
+    <p:sldId id="412" r:id="rId33"/>
+    <p:sldId id="413" r:id="rId34"/>
+    <p:sldId id="414" r:id="rId35"/>
+    <p:sldId id="415" r:id="rId36"/>
+    <p:sldId id="417" r:id="rId37"/>
+    <p:sldId id="421" r:id="rId38"/>
+    <p:sldId id="422" r:id="rId39"/>
+    <p:sldId id="385" r:id="rId40"/>
   </p:sldIdLst>
   <p:sldSz cx="9144000" cy="6858000" type="screen4x3"/>
   <p:notesSz cx="6858000" cy="9144000"/>
@@ -1291,7 +1298,7 @@
           <a:p>
             <a:fld id="{914561EA-877F-40EB-BD03-9F9D93CF8F08}" type="datetimeFigureOut">
               <a:rPr lang="en-US" smtClean="0"/>
-              <a:t>8/25/2025</a:t>
+              <a:t>9/7/2025</a:t>
             </a:fld>
             <a:endParaRPr lang="en-US"/>
           </a:p>
@@ -1821,7 +1828,7 @@
           <a:p>
             <a:fld id="{AFA779F1-D9BB-4E74-86A2-2DC123167359}" type="datetime1">
               <a:rPr lang="en-US" smtClean="0"/>
-              <a:t>8/25/2025</a:t>
+              <a:t>9/7/2025</a:t>
             </a:fld>
             <a:endParaRPr lang="en-US" dirty="0"/>
           </a:p>
@@ -1997,7 +2004,7 @@
           <a:p>
             <a:fld id="{BD548D2B-CE3E-4EDD-9649-B6EE9E3C2340}" type="datetime1">
               <a:rPr lang="en-US" smtClean="0"/>
-              <a:t>8/25/2025</a:t>
+              <a:t>9/7/2025</a:t>
             </a:fld>
             <a:endParaRPr lang="en-US"/>
           </a:p>
@@ -2183,7 +2190,7 @@
           <a:p>
             <a:fld id="{ACEBBA4F-0F17-4FF1-AA6C-E0193917BC1E}" type="datetime1">
               <a:rPr lang="en-US" smtClean="0"/>
-              <a:t>8/25/2025</a:t>
+              <a:t>9/7/2025</a:t>
             </a:fld>
             <a:endParaRPr lang="en-US"/>
           </a:p>
@@ -2359,7 +2366,7 @@
           <a:p>
             <a:fld id="{0EFBEC3F-4208-4590-BA97-4119A385DFD9}" type="datetime1">
               <a:rPr lang="en-US" smtClean="0"/>
-              <a:t>8/25/2025</a:t>
+              <a:t>9/7/2025</a:t>
             </a:fld>
             <a:endParaRPr lang="en-US"/>
           </a:p>
@@ -2612,7 +2619,7 @@
           <a:p>
             <a:fld id="{B2D760EB-C9A5-467F-AA36-B176C44BCBF1}" type="datetime1">
               <a:rPr lang="en-US" smtClean="0"/>
-              <a:t>8/25/2025</a:t>
+              <a:t>9/7/2025</a:t>
             </a:fld>
             <a:endParaRPr lang="en-US"/>
           </a:p>
@@ -2905,7 +2912,7 @@
           <a:p>
             <a:fld id="{1C9B5E61-6324-405D-8AF5-05323E47D966}" type="datetime1">
               <a:rPr lang="en-US" smtClean="0"/>
-              <a:t>8/25/2025</a:t>
+              <a:t>9/7/2025</a:t>
             </a:fld>
             <a:endParaRPr lang="en-US"/>
           </a:p>
@@ -3332,7 +3339,7 @@
           <a:p>
             <a:fld id="{4A37807E-A869-4435-A051-311AEF96909D}" type="datetime1">
               <a:rPr lang="en-US" smtClean="0"/>
-              <a:t>8/25/2025</a:t>
+              <a:t>9/7/2025</a:t>
             </a:fld>
             <a:endParaRPr lang="en-US"/>
           </a:p>
@@ -3457,7 +3464,7 @@
           <a:p>
             <a:fld id="{1BC8686A-CD31-4B11-9B8F-A51012174BB0}" type="datetime1">
               <a:rPr lang="en-US" smtClean="0"/>
-              <a:t>8/25/2025</a:t>
+              <a:t>9/7/2025</a:t>
             </a:fld>
             <a:endParaRPr lang="en-US"/>
           </a:p>
@@ -3560,7 +3567,7 @@
           <a:p>
             <a:fld id="{4F4B4EA3-50E0-4631-85EF-BDA8608D293F}" type="datetime1">
               <a:rPr lang="en-US" smtClean="0"/>
-              <a:t>8/25/2025</a:t>
+              <a:t>9/7/2025</a:t>
             </a:fld>
             <a:endParaRPr lang="en-US"/>
           </a:p>
@@ -3843,7 +3850,7 @@
           <a:p>
             <a:fld id="{4BA8B4E6-89B0-4D9D-AC8C-3B8ECDAACC34}" type="datetime1">
               <a:rPr lang="en-US" smtClean="0"/>
-              <a:t>8/25/2025</a:t>
+              <a:t>9/7/2025</a:t>
             </a:fld>
             <a:endParaRPr lang="en-US"/>
           </a:p>
@@ -4103,7 +4110,7 @@
           <a:p>
             <a:fld id="{0A1BBC16-5931-43C3-BDFF-9B248A400D54}" type="datetime1">
               <a:rPr lang="en-US" smtClean="0"/>
-              <a:t>8/25/2025</a:t>
+              <a:t>9/7/2025</a:t>
             </a:fld>
             <a:endParaRPr lang="en-US"/>
           </a:p>
@@ -4414,7 +4421,7 @@
           <a:p>
             <a:fld id="{A7143E5B-78DF-476F-8A09-9FD612E00067}" type="datetime1">
               <a:rPr lang="en-US" smtClean="0"/>
-              <a:t>8/25/2025</a:t>
+              <a:t>9/7/2025</a:t>
             </a:fld>
             <a:endParaRPr lang="en-US" dirty="0"/>
           </a:p>
@@ -4949,7 +4956,7 @@
           <a:p>
             <a:fld id="{1FF5D759-AFA5-4CA4-8536-68E39A72291A}" type="datetime1">
               <a:rPr lang="en-US" smtClean="0"/>
-              <a:t>8/25/2025</a:t>
+              <a:t>9/7/2025</a:t>
             </a:fld>
             <a:endParaRPr lang="en-US" dirty="0"/>
           </a:p>
@@ -5051,7 +5058,7 @@
           <a:p>
             <a:fld id="{0EFBEC3F-4208-4590-BA97-4119A385DFD9}" type="datetime1">
               <a:rPr lang="en-US" smtClean="0"/>
-              <a:t>8/25/2025</a:t>
+              <a:t>9/7/2025</a:t>
             </a:fld>
             <a:endParaRPr lang="en-US"/>
           </a:p>
@@ -5206,7 +5213,7 @@
           <a:p>
             <a:fld id="{0EFBEC3F-4208-4590-BA97-4119A385DFD9}" type="datetime1">
               <a:rPr lang="en-US" smtClean="0"/>
-              <a:t>8/25/2025</a:t>
+              <a:t>9/7/2025</a:t>
             </a:fld>
             <a:endParaRPr lang="en-US"/>
           </a:p>
@@ -5391,7 +5398,7 @@
           <a:p>
             <a:fld id="{0EFBEC3F-4208-4590-BA97-4119A385DFD9}" type="datetime1">
               <a:rPr lang="en-US" smtClean="0"/>
-              <a:t>8/25/2025</a:t>
+              <a:t>9/7/2025</a:t>
             </a:fld>
             <a:endParaRPr lang="en-US"/>
           </a:p>
@@ -5688,7 +5695,7 @@
           <a:p>
             <a:fld id="{0EFBEC3F-4208-4590-BA97-4119A385DFD9}" type="datetime1">
               <a:rPr lang="en-US" smtClean="0"/>
-              <a:t>8/25/2025</a:t>
+              <a:t>9/7/2025</a:t>
             </a:fld>
             <a:endParaRPr lang="en-US"/>
           </a:p>
@@ -5866,7 +5873,7 @@
           <a:p>
             <a:fld id="{0EFBEC3F-4208-4590-BA97-4119A385DFD9}" type="datetime1">
               <a:rPr lang="en-US" smtClean="0"/>
-              <a:t>8/25/2025</a:t>
+              <a:t>9/7/2025</a:t>
             </a:fld>
             <a:endParaRPr lang="en-US"/>
           </a:p>
@@ -6105,7 +6112,7 @@
           <a:p>
             <a:fld id="{0EFBEC3F-4208-4590-BA97-4119A385DFD9}" type="datetime1">
               <a:rPr lang="en-US" smtClean="0"/>
-              <a:t>8/25/2025</a:t>
+              <a:t>9/7/2025</a:t>
             </a:fld>
             <a:endParaRPr lang="en-US"/>
           </a:p>
@@ -6374,7 +6381,7 @@
           <a:p>
             <a:fld id="{0EFBEC3F-4208-4590-BA97-4119A385DFD9}" type="datetime1">
               <a:rPr lang="en-US" smtClean="0"/>
-              <a:t>8/25/2025</a:t>
+              <a:t>9/7/2025</a:t>
             </a:fld>
             <a:endParaRPr lang="en-US"/>
           </a:p>
@@ -6629,7 +6636,7 @@
           <a:p>
             <a:fld id="{0EFBEC3F-4208-4590-BA97-4119A385DFD9}" type="datetime1">
               <a:rPr lang="en-US" smtClean="0"/>
-              <a:t>8/25/2025</a:t>
+              <a:t>9/7/2025</a:t>
             </a:fld>
             <a:endParaRPr lang="en-US"/>
           </a:p>
@@ -6895,7 +6902,7 @@
           <a:p>
             <a:fld id="{0EFBEC3F-4208-4590-BA97-4119A385DFD9}" type="datetime1">
               <a:rPr lang="en-US" smtClean="0"/>
-              <a:t>8/25/2025</a:t>
+              <a:t>9/7/2025</a:t>
             </a:fld>
             <a:endParaRPr lang="en-US"/>
           </a:p>
@@ -7026,7 +7033,7 @@
         <p:cNvPr id="1" name="">
           <a:extLst>
             <a:ext uri="{FF2B5EF4-FFF2-40B4-BE49-F238E27FC236}">
-              <a16:creationId xmlns:a16="http://schemas.microsoft.com/office/drawing/2014/main" id="{F01159C6-A844-0962-8335-8FBE1C2C5888}"/>
+              <a16:creationId xmlns:a16="http://schemas.microsoft.com/office/drawing/2014/main" id="{1ED6E358-3961-8502-3C9D-4F10CA4CB625}"/>
             </a:ext>
           </a:extLst>
         </p:cNvPr>
@@ -7046,7 +7053,7 @@
           <p:cNvPr id="2" name="Title 1">
             <a:extLst>
               <a:ext uri="{FF2B5EF4-FFF2-40B4-BE49-F238E27FC236}">
-                <a16:creationId xmlns:a16="http://schemas.microsoft.com/office/drawing/2014/main" id="{DA18550B-7BEF-7806-3281-FAF7C45D472D}"/>
+                <a16:creationId xmlns:a16="http://schemas.microsoft.com/office/drawing/2014/main" id="{E86A046B-D642-95AD-9DDC-7C97BCB292C0}"/>
               </a:ext>
             </a:extLst>
           </p:cNvPr>
@@ -7066,15 +7073,16 @@
           <a:p>
             <a:r>
               <a:rPr lang="en-US" dirty="0"/>
-              <a:t>Period Highlight – 10</a:t>
+              <a:t>Period Highlight – 9</a:t>
             </a:r>
             <a:br>
               <a:rPr lang="en-US" dirty="0"/>
             </a:br>
             <a:r>
               <a:rPr lang="en-US" sz="3200" dirty="0"/>
-              <a:t>Networking Preparations</a:t>
-            </a:r>
+              <a:t>Missed</a:t>
+            </a:r>
+            <a:endParaRPr lang="en-US" dirty="0"/>
           </a:p>
         </p:txBody>
       </p:sp>
@@ -7083,7 +7091,7 @@
           <p:cNvPr id="3" name="Content Placeholder 2">
             <a:extLst>
               <a:ext uri="{FF2B5EF4-FFF2-40B4-BE49-F238E27FC236}">
-                <a16:creationId xmlns:a16="http://schemas.microsoft.com/office/drawing/2014/main" id="{A873E215-2F00-163D-D15B-8990AAC91003}"/>
+                <a16:creationId xmlns:a16="http://schemas.microsoft.com/office/drawing/2014/main" id="{0B4079A5-28E8-1A19-D08A-94AED31D507D}"/>
               </a:ext>
             </a:extLst>
           </p:cNvPr>
@@ -7094,75 +7102,19 @@
             <p:ph idx="1"/>
           </p:nvPr>
         </p:nvSpPr>
-        <p:spPr/>
+        <p:spPr>
+          <a:xfrm>
+            <a:off x="457200" y="1417638"/>
+            <a:ext cx="5202936" cy="3054096"/>
+          </a:xfrm>
+        </p:spPr>
         <p:txBody>
           <a:bodyPr>
-            <a:normAutofit fontScale="85000" lnSpcReduction="20000"/>
+            <a:normAutofit/>
           </a:bodyPr>
           <a:lstStyle/>
           <a:p>
-            <a:r>
-              <a:rPr lang="en-US" dirty="0"/>
-              <a:t>Got in contact with Dr. Alexis Kostas from Norway.</a:t>
-            </a:r>
-          </a:p>
-          <a:p>
-            <a:pPr lvl="1"/>
-            <a:r>
-              <a:rPr lang="en-US" dirty="0">
-                <a:hlinkClick r:id="rId2"/>
-              </a:rPr>
-              <a:t>Radar-Inertial ICP-based Pose Graph SLAM</a:t>
-            </a:r>
-            <a:endParaRPr lang="en-US" dirty="0"/>
-          </a:p>
-          <a:p>
-            <a:pPr lvl="1"/>
-            <a:endParaRPr lang="en-US" dirty="0"/>
-          </a:p>
-          <a:p>
-            <a:r>
-              <a:rPr lang="en-US" dirty="0"/>
-              <a:t>Which later direct me to Morten Nissov, also from Norway.</a:t>
-            </a:r>
-          </a:p>
-          <a:p>
-            <a:pPr lvl="1"/>
-            <a:r>
-              <a:rPr lang="en-US" dirty="0"/>
-              <a:t>Explain about the project that was implemented before and current work.</a:t>
-            </a:r>
-          </a:p>
-          <a:p>
-            <a:r>
-              <a:rPr lang="en-US" dirty="0"/>
-              <a:t>New material provided by them:</a:t>
-            </a:r>
-          </a:p>
-          <a:p>
-            <a:pPr lvl="1"/>
-            <a:r>
-              <a:rPr lang="en-US" dirty="0"/>
-              <a:t>Instantaneous ego-motion estimation using Doppler radar</a:t>
-            </a:r>
-          </a:p>
-          <a:p>
-            <a:pPr lvl="2"/>
-            <a:r>
-              <a:rPr lang="en-US" dirty="0"/>
-              <a:t>According to the paper results, this was done in last semester project.</a:t>
-            </a:r>
-          </a:p>
-          <a:p>
-            <a:pPr lvl="2"/>
-            <a:r>
-              <a:rPr lang="en-US" dirty="0"/>
-              <a:t>Fusion of this work and current one is on the way.</a:t>
-            </a:r>
-          </a:p>
-          <a:p>
-            <a:pPr lvl="1"/>
-            <a:endParaRPr lang="en-US" dirty="0"/>
+            <a:endParaRPr lang="en-US" sz="1800" dirty="0"/>
           </a:p>
         </p:txBody>
       </p:sp>
@@ -7171,7 +7123,7 @@
           <p:cNvPr id="4" name="Date Placeholder 3">
             <a:extLst>
               <a:ext uri="{FF2B5EF4-FFF2-40B4-BE49-F238E27FC236}">
-                <a16:creationId xmlns:a16="http://schemas.microsoft.com/office/drawing/2014/main" id="{B6306280-94DF-A4B1-1837-D11D0EBC955E}"/>
+                <a16:creationId xmlns:a16="http://schemas.microsoft.com/office/drawing/2014/main" id="{9089B884-81BD-1779-2DBC-491490799F40}"/>
               </a:ext>
             </a:extLst>
           </p:cNvPr>
@@ -7189,7 +7141,7 @@
           <a:p>
             <a:fld id="{0EFBEC3F-4208-4590-BA97-4119A385DFD9}" type="datetime1">
               <a:rPr lang="en-US" smtClean="0"/>
-              <a:t>8/25/2025</a:t>
+              <a:t>9/7/2025</a:t>
             </a:fld>
             <a:endParaRPr lang="en-US"/>
           </a:p>
@@ -7200,7 +7152,7 @@
           <p:cNvPr id="5" name="Slide Number Placeholder 4">
             <a:extLst>
               <a:ext uri="{FF2B5EF4-FFF2-40B4-BE49-F238E27FC236}">
-                <a16:creationId xmlns:a16="http://schemas.microsoft.com/office/drawing/2014/main" id="{606CF556-F433-C4C6-FDF5-CCBF58BCFAAF}"/>
+                <a16:creationId xmlns:a16="http://schemas.microsoft.com/office/drawing/2014/main" id="{47721AB8-8A1D-8BA9-149F-A985DC0656E4}"/>
               </a:ext>
             </a:extLst>
           </p:cNvPr>
@@ -7224,55 +7176,10 @@
           </a:p>
         </p:txBody>
       </p:sp>
-      <p:sp>
-        <p:nvSpPr>
-          <p:cNvPr id="6" name="AutoShape 2">
-            <a:extLst>
-              <a:ext uri="{FF2B5EF4-FFF2-40B4-BE49-F238E27FC236}">
-                <a16:creationId xmlns:a16="http://schemas.microsoft.com/office/drawing/2014/main" id="{3C658808-0ABF-1700-BF70-62A78709EBFC}"/>
-              </a:ext>
-            </a:extLst>
-          </p:cNvPr>
-          <p:cNvSpPr>
-            <a:spLocks noChangeAspect="1" noChangeArrowheads="1"/>
-          </p:cNvSpPr>
-          <p:nvPr/>
-        </p:nvSpPr>
-        <p:spPr bwMode="auto">
-          <a:xfrm>
-            <a:off x="4419600" y="3276600"/>
-            <a:ext cx="304800" cy="304800"/>
-          </a:xfrm>
-          <a:prstGeom prst="rect">
-            <a:avLst/>
-          </a:prstGeom>
-          <a:noFill/>
-          <a:extLst>
-            <a:ext uri="{909E8E84-426E-40DD-AFC4-6F175D3DCCD1}">
-              <a14:hiddenFill xmlns:a14="http://schemas.microsoft.com/office/drawing/2010/main">
-                <a:solidFill>
-                  <a:srgbClr val="FFFFFF"/>
-                </a:solidFill>
-              </a14:hiddenFill>
-            </a:ext>
-          </a:extLst>
-        </p:spPr>
-        <p:txBody>
-          <a:bodyPr vert="horz" wrap="square" lIns="91440" tIns="45720" rIns="91440" bIns="45720" numCol="1" anchor="t" anchorCtr="0" compatLnSpc="1">
-            <a:prstTxWarp prst="textNoShape">
-              <a:avLst/>
-            </a:prstTxWarp>
-          </a:bodyPr>
-          <a:lstStyle/>
-          <a:p>
-            <a:endParaRPr lang="en-US"/>
-          </a:p>
-        </p:txBody>
-      </p:sp>
     </p:spTree>
     <p:extLst>
       <p:ext uri="{BB962C8B-B14F-4D97-AF65-F5344CB8AC3E}">
-        <p14:creationId xmlns:p14="http://schemas.microsoft.com/office/powerpoint/2010/main" val="3774724792"/>
+        <p14:creationId xmlns:p14="http://schemas.microsoft.com/office/powerpoint/2010/main" val="3417567800"/>
       </p:ext>
     </p:extLst>
   </p:cSld>
@@ -7379,7 +7286,7 @@
           <a:p>
             <a:fld id="{1AA46178-B97E-4817-9029-290586FA77E9}" type="datetime1">
               <a:rPr lang="en-US" smtClean="0"/>
-              <a:t>8/25/2025</a:t>
+              <a:t>9/7/2025</a:t>
             </a:fld>
             <a:endParaRPr lang="en-US"/>
           </a:p>
@@ -7429,6 +7336,270 @@
 </file>
 
 <file path=ppt/slides/slide20.xml><?xml version="1.0" encoding="utf-8"?>
+<p:sld xmlns:a="http://schemas.openxmlformats.org/drawingml/2006/main" xmlns:r="http://schemas.openxmlformats.org/officeDocument/2006/relationships" xmlns:p="http://schemas.openxmlformats.org/presentationml/2006/main">
+  <p:cSld>
+    <p:spTree>
+      <p:nvGrpSpPr>
+        <p:cNvPr id="1" name="">
+          <a:extLst>
+            <a:ext uri="{FF2B5EF4-FFF2-40B4-BE49-F238E27FC236}">
+              <a16:creationId xmlns:a16="http://schemas.microsoft.com/office/drawing/2014/main" id="{F01159C6-A844-0962-8335-8FBE1C2C5888}"/>
+            </a:ext>
+          </a:extLst>
+        </p:cNvPr>
+        <p:cNvGrpSpPr/>
+        <p:nvPr/>
+      </p:nvGrpSpPr>
+      <p:grpSpPr>
+        <a:xfrm>
+          <a:off x="0" y="0"/>
+          <a:ext cx="0" cy="0"/>
+          <a:chOff x="0" y="0"/>
+          <a:chExt cx="0" cy="0"/>
+        </a:xfrm>
+      </p:grpSpPr>
+      <p:sp>
+        <p:nvSpPr>
+          <p:cNvPr id="2" name="Title 1">
+            <a:extLst>
+              <a:ext uri="{FF2B5EF4-FFF2-40B4-BE49-F238E27FC236}">
+                <a16:creationId xmlns:a16="http://schemas.microsoft.com/office/drawing/2014/main" id="{DA18550B-7BEF-7806-3281-FAF7C45D472D}"/>
+              </a:ext>
+            </a:extLst>
+          </p:cNvPr>
+          <p:cNvSpPr>
+            <a:spLocks noGrp="1"/>
+          </p:cNvSpPr>
+          <p:nvPr>
+            <p:ph type="title"/>
+          </p:nvPr>
+        </p:nvSpPr>
+        <p:spPr/>
+        <p:txBody>
+          <a:bodyPr>
+            <a:normAutofit fontScale="90000"/>
+          </a:bodyPr>
+          <a:lstStyle/>
+          <a:p>
+            <a:r>
+              <a:rPr lang="en-US" dirty="0"/>
+              <a:t>Period Highlight – 10</a:t>
+            </a:r>
+            <a:br>
+              <a:rPr lang="en-US" dirty="0"/>
+            </a:br>
+            <a:r>
+              <a:rPr lang="en-US" sz="3200" dirty="0"/>
+              <a:t>Networking Preparations</a:t>
+            </a:r>
+          </a:p>
+        </p:txBody>
+      </p:sp>
+      <p:sp>
+        <p:nvSpPr>
+          <p:cNvPr id="3" name="Content Placeholder 2">
+            <a:extLst>
+              <a:ext uri="{FF2B5EF4-FFF2-40B4-BE49-F238E27FC236}">
+                <a16:creationId xmlns:a16="http://schemas.microsoft.com/office/drawing/2014/main" id="{A873E215-2F00-163D-D15B-8990AAC91003}"/>
+              </a:ext>
+            </a:extLst>
+          </p:cNvPr>
+          <p:cNvSpPr>
+            <a:spLocks noGrp="1"/>
+          </p:cNvSpPr>
+          <p:nvPr>
+            <p:ph idx="1"/>
+          </p:nvPr>
+        </p:nvSpPr>
+        <p:spPr/>
+        <p:txBody>
+          <a:bodyPr>
+            <a:normAutofit fontScale="85000" lnSpcReduction="20000"/>
+          </a:bodyPr>
+          <a:lstStyle/>
+          <a:p>
+            <a:r>
+              <a:rPr lang="en-US" dirty="0"/>
+              <a:t>Got in contact with Dr. Alexis Kostas from Norway.</a:t>
+            </a:r>
+          </a:p>
+          <a:p>
+            <a:pPr lvl="1"/>
+            <a:r>
+              <a:rPr lang="en-US" dirty="0">
+                <a:hlinkClick r:id="rId2"/>
+              </a:rPr>
+              <a:t>Radar-Inertial ICP-based Pose Graph SLAM</a:t>
+            </a:r>
+            <a:endParaRPr lang="en-US" dirty="0"/>
+          </a:p>
+          <a:p>
+            <a:pPr lvl="1"/>
+            <a:endParaRPr lang="en-US" dirty="0"/>
+          </a:p>
+          <a:p>
+            <a:r>
+              <a:rPr lang="en-US" dirty="0"/>
+              <a:t>Which later direct me to Morten Nissov, also from Norway.</a:t>
+            </a:r>
+          </a:p>
+          <a:p>
+            <a:pPr lvl="1"/>
+            <a:r>
+              <a:rPr lang="en-US" dirty="0"/>
+              <a:t>Explain about the project that was implemented before and current work.</a:t>
+            </a:r>
+          </a:p>
+          <a:p>
+            <a:r>
+              <a:rPr lang="en-US" dirty="0"/>
+              <a:t>New material provided by them:</a:t>
+            </a:r>
+          </a:p>
+          <a:p>
+            <a:pPr lvl="1"/>
+            <a:r>
+              <a:rPr lang="en-US" dirty="0"/>
+              <a:t>Instantaneous ego-motion estimation using Doppler radar</a:t>
+            </a:r>
+          </a:p>
+          <a:p>
+            <a:pPr lvl="2"/>
+            <a:r>
+              <a:rPr lang="en-US" dirty="0"/>
+              <a:t>According to the paper results, this was done in last semester project.</a:t>
+            </a:r>
+          </a:p>
+          <a:p>
+            <a:pPr lvl="2"/>
+            <a:r>
+              <a:rPr lang="en-US" dirty="0"/>
+              <a:t>Fusion of this work and current one is on the way.</a:t>
+            </a:r>
+          </a:p>
+          <a:p>
+            <a:pPr lvl="1"/>
+            <a:endParaRPr lang="en-US" dirty="0"/>
+          </a:p>
+        </p:txBody>
+      </p:sp>
+      <p:sp>
+        <p:nvSpPr>
+          <p:cNvPr id="4" name="Date Placeholder 3">
+            <a:extLst>
+              <a:ext uri="{FF2B5EF4-FFF2-40B4-BE49-F238E27FC236}">
+                <a16:creationId xmlns:a16="http://schemas.microsoft.com/office/drawing/2014/main" id="{B6306280-94DF-A4B1-1837-D11D0EBC955E}"/>
+              </a:ext>
+            </a:extLst>
+          </p:cNvPr>
+          <p:cNvSpPr>
+            <a:spLocks noGrp="1"/>
+          </p:cNvSpPr>
+          <p:nvPr>
+            <p:ph type="dt" sz="half" idx="10"/>
+          </p:nvPr>
+        </p:nvSpPr>
+        <p:spPr/>
+        <p:txBody>
+          <a:bodyPr/>
+          <a:lstStyle/>
+          <a:p>
+            <a:fld id="{0EFBEC3F-4208-4590-BA97-4119A385DFD9}" type="datetime1">
+              <a:rPr lang="en-US" smtClean="0"/>
+              <a:t>9/7/2025</a:t>
+            </a:fld>
+            <a:endParaRPr lang="en-US"/>
+          </a:p>
+        </p:txBody>
+      </p:sp>
+      <p:sp>
+        <p:nvSpPr>
+          <p:cNvPr id="5" name="Slide Number Placeholder 4">
+            <a:extLst>
+              <a:ext uri="{FF2B5EF4-FFF2-40B4-BE49-F238E27FC236}">
+                <a16:creationId xmlns:a16="http://schemas.microsoft.com/office/drawing/2014/main" id="{606CF556-F433-C4C6-FDF5-CCBF58BCFAAF}"/>
+              </a:ext>
+            </a:extLst>
+          </p:cNvPr>
+          <p:cNvSpPr>
+            <a:spLocks noGrp="1"/>
+          </p:cNvSpPr>
+          <p:nvPr>
+            <p:ph type="sldNum" sz="quarter" idx="12"/>
+          </p:nvPr>
+        </p:nvSpPr>
+        <p:spPr/>
+        <p:txBody>
+          <a:bodyPr/>
+          <a:lstStyle/>
+          <a:p>
+            <a:fld id="{C1FF6DA9-008F-8B48-92A6-B652298478BF}" type="slidenum">
+              <a:rPr lang="en-US" smtClean="0"/>
+              <a:t>20</a:t>
+            </a:fld>
+            <a:endParaRPr lang="en-US"/>
+          </a:p>
+        </p:txBody>
+      </p:sp>
+      <p:sp>
+        <p:nvSpPr>
+          <p:cNvPr id="6" name="AutoShape 2">
+            <a:extLst>
+              <a:ext uri="{FF2B5EF4-FFF2-40B4-BE49-F238E27FC236}">
+                <a16:creationId xmlns:a16="http://schemas.microsoft.com/office/drawing/2014/main" id="{3C658808-0ABF-1700-BF70-62A78709EBFC}"/>
+              </a:ext>
+            </a:extLst>
+          </p:cNvPr>
+          <p:cNvSpPr>
+            <a:spLocks noChangeAspect="1" noChangeArrowheads="1"/>
+          </p:cNvSpPr>
+          <p:nvPr/>
+        </p:nvSpPr>
+        <p:spPr bwMode="auto">
+          <a:xfrm>
+            <a:off x="4419600" y="3276600"/>
+            <a:ext cx="304800" cy="304800"/>
+          </a:xfrm>
+          <a:prstGeom prst="rect">
+            <a:avLst/>
+          </a:prstGeom>
+          <a:noFill/>
+          <a:extLst>
+            <a:ext uri="{909E8E84-426E-40DD-AFC4-6F175D3DCCD1}">
+              <a14:hiddenFill xmlns:a14="http://schemas.microsoft.com/office/drawing/2010/main">
+                <a:solidFill>
+                  <a:srgbClr val="FFFFFF"/>
+                </a:solidFill>
+              </a14:hiddenFill>
+            </a:ext>
+          </a:extLst>
+        </p:spPr>
+        <p:txBody>
+          <a:bodyPr vert="horz" wrap="square" lIns="91440" tIns="45720" rIns="91440" bIns="45720" numCol="1" anchor="t" anchorCtr="0" compatLnSpc="1">
+            <a:prstTxWarp prst="textNoShape">
+              <a:avLst/>
+            </a:prstTxWarp>
+          </a:bodyPr>
+          <a:lstStyle/>
+          <a:p>
+            <a:endParaRPr lang="en-US"/>
+          </a:p>
+        </p:txBody>
+      </p:sp>
+    </p:spTree>
+    <p:extLst>
+      <p:ext uri="{BB962C8B-B14F-4D97-AF65-F5344CB8AC3E}">
+        <p14:creationId xmlns:p14="http://schemas.microsoft.com/office/powerpoint/2010/main" val="3774724792"/>
+      </p:ext>
+    </p:extLst>
+  </p:cSld>
+  <p:clrMapOvr>
+    <a:masterClrMapping/>
+  </p:clrMapOvr>
+</p:sld>
+</file>
+
+<file path=ppt/slides/slide21.xml><?xml version="1.0" encoding="utf-8"?>
 <p:sld xmlns:a="http://schemas.openxmlformats.org/drawingml/2006/main" xmlns:r="http://schemas.openxmlformats.org/officeDocument/2006/relationships" xmlns:p="http://schemas.openxmlformats.org/presentationml/2006/main">
   <p:cSld>
     <p:spTree>
@@ -7546,7 +7717,7 @@
           <a:p>
             <a:fld id="{0EFBEC3F-4208-4590-BA97-4119A385DFD9}" type="datetime1">
               <a:rPr lang="en-US" smtClean="0"/>
-              <a:t>8/25/2025</a:t>
+              <a:t>9/7/2025</a:t>
             </a:fld>
             <a:endParaRPr lang="en-US"/>
           </a:p>
@@ -7575,7 +7746,7 @@
           <a:p>
             <a:fld id="{C1FF6DA9-008F-8B48-92A6-B652298478BF}" type="slidenum">
               <a:rPr lang="en-US" smtClean="0"/>
-              <a:t>20</a:t>
+              <a:t>21</a:t>
             </a:fld>
             <a:endParaRPr lang="en-US"/>
           </a:p>
@@ -7699,7 +7870,7 @@
 </p:sld>
 </file>
 
-<file path=ppt/slides/slide21.xml><?xml version="1.0" encoding="utf-8"?>
+<file path=ppt/slides/slide22.xml><?xml version="1.0" encoding="utf-8"?>
 <p:sld xmlns:a="http://schemas.openxmlformats.org/drawingml/2006/main" xmlns:r="http://schemas.openxmlformats.org/officeDocument/2006/relationships" xmlns:p="http://schemas.openxmlformats.org/presentationml/2006/main">
   <p:cSld>
     <p:spTree>
@@ -7817,7 +7988,7 @@
           <a:p>
             <a:fld id="{0EFBEC3F-4208-4590-BA97-4119A385DFD9}" type="datetime1">
               <a:rPr lang="en-US" smtClean="0"/>
-              <a:t>8/25/2025</a:t>
+              <a:t>9/7/2025</a:t>
             </a:fld>
             <a:endParaRPr lang="en-US"/>
           </a:p>
@@ -7846,7 +8017,7 @@
           <a:p>
             <a:fld id="{C1FF6DA9-008F-8B48-92A6-B652298478BF}" type="slidenum">
               <a:rPr lang="en-US" smtClean="0"/>
-              <a:t>21</a:t>
+              <a:t>22</a:t>
             </a:fld>
             <a:endParaRPr lang="en-US"/>
           </a:p>
@@ -7970,7 +8141,7 @@
 </p:sld>
 </file>
 
-<file path=ppt/slides/slide22.xml><?xml version="1.0" encoding="utf-8"?>
+<file path=ppt/slides/slide23.xml><?xml version="1.0" encoding="utf-8"?>
 <p:sld xmlns:a="http://schemas.openxmlformats.org/drawingml/2006/main" xmlns:r="http://schemas.openxmlformats.org/officeDocument/2006/relationships" xmlns:p="http://schemas.openxmlformats.org/presentationml/2006/main">
   <p:cSld>
     <p:spTree>
@@ -8088,7 +8259,7 @@
           <a:p>
             <a:fld id="{0EFBEC3F-4208-4590-BA97-4119A385DFD9}" type="datetime1">
               <a:rPr lang="en-US" smtClean="0"/>
-              <a:t>8/25/2025</a:t>
+              <a:t>9/7/2025</a:t>
             </a:fld>
             <a:endParaRPr lang="en-US"/>
           </a:p>
@@ -8117,7 +8288,7 @@
           <a:p>
             <a:fld id="{C1FF6DA9-008F-8B48-92A6-B652298478BF}" type="slidenum">
               <a:rPr lang="en-US" smtClean="0"/>
-              <a:t>22</a:t>
+              <a:t>23</a:t>
             </a:fld>
             <a:endParaRPr lang="en-US"/>
           </a:p>
@@ -8211,7 +8382,7 @@
 </p:sld>
 </file>
 
-<file path=ppt/slides/slide23.xml><?xml version="1.0" encoding="utf-8"?>
+<file path=ppt/slides/slide24.xml><?xml version="1.0" encoding="utf-8"?>
 <p:sld xmlns:a="http://schemas.openxmlformats.org/drawingml/2006/main" xmlns:r="http://schemas.openxmlformats.org/officeDocument/2006/relationships" xmlns:p="http://schemas.openxmlformats.org/presentationml/2006/main">
   <p:cSld>
     <p:spTree>
@@ -8329,7 +8500,7 @@
           <a:p>
             <a:fld id="{0EFBEC3F-4208-4590-BA97-4119A385DFD9}" type="datetime1">
               <a:rPr lang="en-US" smtClean="0"/>
-              <a:t>8/25/2025</a:t>
+              <a:t>9/7/2025</a:t>
             </a:fld>
             <a:endParaRPr lang="en-US"/>
           </a:p>
@@ -8358,7 +8529,7 @@
           <a:p>
             <a:fld id="{C1FF6DA9-008F-8B48-92A6-B652298478BF}" type="slidenum">
               <a:rPr lang="en-US" smtClean="0"/>
-              <a:t>23</a:t>
+              <a:t>24</a:t>
             </a:fld>
             <a:endParaRPr lang="en-US"/>
           </a:p>
@@ -8452,7 +8623,7 @@
 </p:sld>
 </file>
 
-<file path=ppt/slides/slide24.xml><?xml version="1.0" encoding="utf-8"?>
+<file path=ppt/slides/slide25.xml><?xml version="1.0" encoding="utf-8"?>
 <p:sld xmlns:a="http://schemas.openxmlformats.org/drawingml/2006/main" xmlns:r="http://schemas.openxmlformats.org/officeDocument/2006/relationships" xmlns:p="http://schemas.openxmlformats.org/presentationml/2006/main">
   <p:cSld>
     <p:spTree>
@@ -8570,7 +8741,7 @@
           <a:p>
             <a:fld id="{0EFBEC3F-4208-4590-BA97-4119A385DFD9}" type="datetime1">
               <a:rPr lang="en-US" smtClean="0"/>
-              <a:t>8/25/2025</a:t>
+              <a:t>9/7/2025</a:t>
             </a:fld>
             <a:endParaRPr lang="en-US"/>
           </a:p>
@@ -8599,7 +8770,7 @@
           <a:p>
             <a:fld id="{C1FF6DA9-008F-8B48-92A6-B652298478BF}" type="slidenum">
               <a:rPr lang="en-US" smtClean="0"/>
-              <a:t>24</a:t>
+              <a:t>25</a:t>
             </a:fld>
             <a:endParaRPr lang="en-US"/>
           </a:p>
@@ -8723,7 +8894,7 @@
 </p:sld>
 </file>
 
-<file path=ppt/slides/slide25.xml><?xml version="1.0" encoding="utf-8"?>
+<file path=ppt/slides/slide26.xml><?xml version="1.0" encoding="utf-8"?>
 <p:sld xmlns:a="http://schemas.openxmlformats.org/drawingml/2006/main" xmlns:r="http://schemas.openxmlformats.org/officeDocument/2006/relationships" xmlns:p="http://schemas.openxmlformats.org/presentationml/2006/main">
   <p:cSld>
     <p:spTree>
@@ -8853,7 +9024,7 @@
           <a:p>
             <a:fld id="{0EFBEC3F-4208-4590-BA97-4119A385DFD9}" type="datetime1">
               <a:rPr lang="en-US" smtClean="0"/>
-              <a:t>8/25/2025</a:t>
+              <a:t>9/7/2025</a:t>
             </a:fld>
             <a:endParaRPr lang="en-US"/>
           </a:p>
@@ -8882,7 +9053,7 @@
           <a:p>
             <a:fld id="{C1FF6DA9-008F-8B48-92A6-B652298478BF}" type="slidenum">
               <a:rPr lang="en-US" smtClean="0"/>
-              <a:t>25</a:t>
+              <a:t>26</a:t>
             </a:fld>
             <a:endParaRPr lang="en-US"/>
           </a:p>
@@ -9012,7 +9183,7 @@
 </p:sld>
 </file>
 
-<file path=ppt/slides/slide26.xml><?xml version="1.0" encoding="utf-8"?>
+<file path=ppt/slides/slide27.xml><?xml version="1.0" encoding="utf-8"?>
 <p:sld xmlns:a="http://schemas.openxmlformats.org/drawingml/2006/main" xmlns:r="http://schemas.openxmlformats.org/officeDocument/2006/relationships" xmlns:p="http://schemas.openxmlformats.org/presentationml/2006/main">
   <p:cSld>
     <p:spTree>
@@ -9127,7 +9298,7 @@
           <a:p>
             <a:fld id="{0EFBEC3F-4208-4590-BA97-4119A385DFD9}" type="datetime1">
               <a:rPr lang="en-US" smtClean="0"/>
-              <a:t>8/25/2025</a:t>
+              <a:t>9/7/2025</a:t>
             </a:fld>
             <a:endParaRPr lang="en-US"/>
           </a:p>
@@ -9156,7 +9327,7 @@
           <a:p>
             <a:fld id="{C1FF6DA9-008F-8B48-92A6-B652298478BF}" type="slidenum">
               <a:rPr lang="en-US" smtClean="0"/>
-              <a:t>26</a:t>
+              <a:t>27</a:t>
             </a:fld>
             <a:endParaRPr lang="en-US"/>
           </a:p>
@@ -9250,7 +9421,7 @@
 </p:sld>
 </file>
 
-<file path=ppt/slides/slide27.xml><?xml version="1.0" encoding="utf-8"?>
+<file path=ppt/slides/slide28.xml><?xml version="1.0" encoding="utf-8"?>
 <p:sld xmlns:a="http://schemas.openxmlformats.org/drawingml/2006/main" xmlns:r="http://schemas.openxmlformats.org/officeDocument/2006/relationships" xmlns:p="http://schemas.openxmlformats.org/presentationml/2006/main">
   <p:cSld>
     <p:spTree>
@@ -9365,7 +9536,7 @@
           <a:p>
             <a:fld id="{0EFBEC3F-4208-4590-BA97-4119A385DFD9}" type="datetime1">
               <a:rPr lang="en-US" smtClean="0"/>
-              <a:t>8/25/2025</a:t>
+              <a:t>9/7/2025</a:t>
             </a:fld>
             <a:endParaRPr lang="en-US"/>
           </a:p>
@@ -9394,7 +9565,7 @@
           <a:p>
             <a:fld id="{C1FF6DA9-008F-8B48-92A6-B652298478BF}" type="slidenum">
               <a:rPr lang="en-US" smtClean="0"/>
-              <a:t>27</a:t>
+              <a:t>28</a:t>
             </a:fld>
             <a:endParaRPr lang="en-US"/>
           </a:p>
@@ -9518,7 +9689,7 @@
 </p:sld>
 </file>
 
-<file path=ppt/slides/slide28.xml><?xml version="1.0" encoding="utf-8"?>
+<file path=ppt/slides/slide29.xml><?xml version="1.0" encoding="utf-8"?>
 <p:sld xmlns:a="http://schemas.openxmlformats.org/drawingml/2006/main" xmlns:r="http://schemas.openxmlformats.org/officeDocument/2006/relationships" xmlns:p="http://schemas.openxmlformats.org/presentationml/2006/main">
   <p:cSld>
     <p:spTree>
@@ -9669,7 +9840,7 @@
           <a:p>
             <a:fld id="{0EFBEC3F-4208-4590-BA97-4119A385DFD9}" type="datetime1">
               <a:rPr lang="en-US" smtClean="0"/>
-              <a:t>8/25/2025</a:t>
+              <a:t>9/7/2025</a:t>
             </a:fld>
             <a:endParaRPr lang="en-US"/>
           </a:p>
@@ -9698,7 +9869,7 @@
           <a:p>
             <a:fld id="{C1FF6DA9-008F-8B48-92A6-B652298478BF}" type="slidenum">
               <a:rPr lang="en-US" smtClean="0"/>
-              <a:t>28</a:t>
+              <a:t>29</a:t>
             </a:fld>
             <a:endParaRPr lang="en-US"/>
           </a:p>
@@ -9777,7 +9948,163 @@
 </p:sld>
 </file>
 
-<file path=ppt/slides/slide29.xml><?xml version="1.0" encoding="utf-8"?>
+<file path=ppt/slides/slide3.xml><?xml version="1.0" encoding="utf-8"?>
+<p:sld xmlns:a="http://schemas.openxmlformats.org/drawingml/2006/main" xmlns:r="http://schemas.openxmlformats.org/officeDocument/2006/relationships" xmlns:p="http://schemas.openxmlformats.org/presentationml/2006/main">
+  <p:cSld>
+    <p:spTree>
+      <p:nvGrpSpPr>
+        <p:cNvPr id="1" name=""/>
+        <p:cNvGrpSpPr/>
+        <p:nvPr/>
+      </p:nvGrpSpPr>
+      <p:grpSpPr>
+        <a:xfrm>
+          <a:off x="0" y="0"/>
+          <a:ext cx="0" cy="0"/>
+          <a:chOff x="0" y="0"/>
+          <a:chExt cx="0" cy="0"/>
+        </a:xfrm>
+      </p:grpSpPr>
+      <p:sp>
+        <p:nvSpPr>
+          <p:cNvPr id="2" name="Title 1">
+            <a:extLst>
+              <a:ext uri="{FF2B5EF4-FFF2-40B4-BE49-F238E27FC236}">
+                <a16:creationId xmlns:a16="http://schemas.microsoft.com/office/drawing/2014/main" id="{B9C0613F-E1A8-00E8-56D9-54D08CE43BF9}"/>
+              </a:ext>
+            </a:extLst>
+          </p:cNvPr>
+          <p:cNvSpPr>
+            <a:spLocks noGrp="1"/>
+          </p:cNvSpPr>
+          <p:nvPr>
+            <p:ph type="title"/>
+          </p:nvPr>
+        </p:nvSpPr>
+        <p:spPr/>
+        <p:txBody>
+          <a:bodyPr/>
+          <a:lstStyle/>
+          <a:p>
+            <a:r>
+              <a:rPr lang="en-US" dirty="0"/>
+              <a:t>Period Highlight - 4</a:t>
+            </a:r>
+          </a:p>
+        </p:txBody>
+      </p:sp>
+      <p:sp>
+        <p:nvSpPr>
+          <p:cNvPr id="3" name="Content Placeholder 2">
+            <a:extLst>
+              <a:ext uri="{FF2B5EF4-FFF2-40B4-BE49-F238E27FC236}">
+                <a16:creationId xmlns:a16="http://schemas.microsoft.com/office/drawing/2014/main" id="{08A4606F-6E0B-C26C-E39E-2025FA207242}"/>
+              </a:ext>
+            </a:extLst>
+          </p:cNvPr>
+          <p:cNvSpPr>
+            <a:spLocks noGrp="1"/>
+          </p:cNvSpPr>
+          <p:nvPr>
+            <p:ph idx="1"/>
+          </p:nvPr>
+        </p:nvSpPr>
+        <p:spPr/>
+        <p:txBody>
+          <a:bodyPr/>
+          <a:lstStyle/>
+          <a:p>
+            <a:r>
+              <a:rPr lang="en-US" dirty="0"/>
+              <a:t>Implementation of Vx and Vy</a:t>
+            </a:r>
+          </a:p>
+          <a:p>
+            <a:r>
+              <a:rPr lang="en-US" dirty="0"/>
+              <a:t>Validation of Vx and Vy</a:t>
+            </a:r>
+          </a:p>
+          <a:p>
+            <a:r>
+              <a:rPr lang="en-US" dirty="0"/>
+              <a:t>Obtain IMU</a:t>
+            </a:r>
+          </a:p>
+        </p:txBody>
+      </p:sp>
+      <p:sp>
+        <p:nvSpPr>
+          <p:cNvPr id="4" name="Date Placeholder 3">
+            <a:extLst>
+              <a:ext uri="{FF2B5EF4-FFF2-40B4-BE49-F238E27FC236}">
+                <a16:creationId xmlns:a16="http://schemas.microsoft.com/office/drawing/2014/main" id="{AF481221-112F-88F1-B090-32C47E3FB9AB}"/>
+              </a:ext>
+            </a:extLst>
+          </p:cNvPr>
+          <p:cNvSpPr>
+            <a:spLocks noGrp="1"/>
+          </p:cNvSpPr>
+          <p:nvPr>
+            <p:ph type="dt" sz="half" idx="10"/>
+          </p:nvPr>
+        </p:nvSpPr>
+        <p:spPr/>
+        <p:txBody>
+          <a:bodyPr/>
+          <a:lstStyle/>
+          <a:p>
+            <a:fld id="{0EFBEC3F-4208-4590-BA97-4119A385DFD9}" type="datetime1">
+              <a:rPr lang="en-US" smtClean="0"/>
+              <a:t>9/7/2025</a:t>
+            </a:fld>
+            <a:endParaRPr lang="en-US"/>
+          </a:p>
+        </p:txBody>
+      </p:sp>
+      <p:sp>
+        <p:nvSpPr>
+          <p:cNvPr id="5" name="Slide Number Placeholder 4">
+            <a:extLst>
+              <a:ext uri="{FF2B5EF4-FFF2-40B4-BE49-F238E27FC236}">
+                <a16:creationId xmlns:a16="http://schemas.microsoft.com/office/drawing/2014/main" id="{5708C3EC-3069-CF97-A1D8-B58BD7378B05}"/>
+              </a:ext>
+            </a:extLst>
+          </p:cNvPr>
+          <p:cNvSpPr>
+            <a:spLocks noGrp="1"/>
+          </p:cNvSpPr>
+          <p:nvPr>
+            <p:ph type="sldNum" sz="quarter" idx="12"/>
+          </p:nvPr>
+        </p:nvSpPr>
+        <p:spPr/>
+        <p:txBody>
+          <a:bodyPr/>
+          <a:lstStyle/>
+          <a:p>
+            <a:fld id="{C1FF6DA9-008F-8B48-92A6-B652298478BF}" type="slidenum">
+              <a:rPr lang="en-US" smtClean="0"/>
+              <a:t>3</a:t>
+            </a:fld>
+            <a:endParaRPr lang="en-US"/>
+          </a:p>
+        </p:txBody>
+      </p:sp>
+    </p:spTree>
+    <p:extLst>
+      <p:ext uri="{BB962C8B-B14F-4D97-AF65-F5344CB8AC3E}">
+        <p14:creationId xmlns:p14="http://schemas.microsoft.com/office/powerpoint/2010/main" val="4022417390"/>
+      </p:ext>
+    </p:extLst>
+  </p:cSld>
+  <p:clrMapOvr>
+    <a:masterClrMapping/>
+  </p:clrMapOvr>
+</p:sld>
+</file>
+
+<file path=ppt/slides/slide30.xml><?xml version="1.0" encoding="utf-8"?>
 <p:sld xmlns:a="http://schemas.openxmlformats.org/drawingml/2006/main" xmlns:r="http://schemas.openxmlformats.org/officeDocument/2006/relationships" xmlns:p="http://schemas.openxmlformats.org/presentationml/2006/main">
   <p:cSld>
     <p:spTree>
@@ -9896,7 +10223,7 @@
           <a:p>
             <a:fld id="{0EFBEC3F-4208-4590-BA97-4119A385DFD9}" type="datetime1">
               <a:rPr lang="en-US" smtClean="0"/>
-              <a:t>8/25/2025</a:t>
+              <a:t>9/7/2025</a:t>
             </a:fld>
             <a:endParaRPr lang="en-US"/>
           </a:p>
@@ -9925,7 +10252,7 @@
           <a:p>
             <a:fld id="{C1FF6DA9-008F-8B48-92A6-B652298478BF}" type="slidenum">
               <a:rPr lang="en-US" smtClean="0"/>
-              <a:t>29</a:t>
+              <a:t>30</a:t>
             </a:fld>
             <a:endParaRPr lang="en-US"/>
           </a:p>
@@ -10004,163 +10331,7 @@
 </p:sld>
 </file>
 
-<file path=ppt/slides/slide3.xml><?xml version="1.0" encoding="utf-8"?>
-<p:sld xmlns:a="http://schemas.openxmlformats.org/drawingml/2006/main" xmlns:r="http://schemas.openxmlformats.org/officeDocument/2006/relationships" xmlns:p="http://schemas.openxmlformats.org/presentationml/2006/main">
-  <p:cSld>
-    <p:spTree>
-      <p:nvGrpSpPr>
-        <p:cNvPr id="1" name=""/>
-        <p:cNvGrpSpPr/>
-        <p:nvPr/>
-      </p:nvGrpSpPr>
-      <p:grpSpPr>
-        <a:xfrm>
-          <a:off x="0" y="0"/>
-          <a:ext cx="0" cy="0"/>
-          <a:chOff x="0" y="0"/>
-          <a:chExt cx="0" cy="0"/>
-        </a:xfrm>
-      </p:grpSpPr>
-      <p:sp>
-        <p:nvSpPr>
-          <p:cNvPr id="2" name="Title 1">
-            <a:extLst>
-              <a:ext uri="{FF2B5EF4-FFF2-40B4-BE49-F238E27FC236}">
-                <a16:creationId xmlns:a16="http://schemas.microsoft.com/office/drawing/2014/main" id="{B9C0613F-E1A8-00E8-56D9-54D08CE43BF9}"/>
-              </a:ext>
-            </a:extLst>
-          </p:cNvPr>
-          <p:cNvSpPr>
-            <a:spLocks noGrp="1"/>
-          </p:cNvSpPr>
-          <p:nvPr>
-            <p:ph type="title"/>
-          </p:nvPr>
-        </p:nvSpPr>
-        <p:spPr/>
-        <p:txBody>
-          <a:bodyPr/>
-          <a:lstStyle/>
-          <a:p>
-            <a:r>
-              <a:rPr lang="en-US" dirty="0"/>
-              <a:t>Period Highlight - 4</a:t>
-            </a:r>
-          </a:p>
-        </p:txBody>
-      </p:sp>
-      <p:sp>
-        <p:nvSpPr>
-          <p:cNvPr id="3" name="Content Placeholder 2">
-            <a:extLst>
-              <a:ext uri="{FF2B5EF4-FFF2-40B4-BE49-F238E27FC236}">
-                <a16:creationId xmlns:a16="http://schemas.microsoft.com/office/drawing/2014/main" id="{08A4606F-6E0B-C26C-E39E-2025FA207242}"/>
-              </a:ext>
-            </a:extLst>
-          </p:cNvPr>
-          <p:cNvSpPr>
-            <a:spLocks noGrp="1"/>
-          </p:cNvSpPr>
-          <p:nvPr>
-            <p:ph idx="1"/>
-          </p:nvPr>
-        </p:nvSpPr>
-        <p:spPr/>
-        <p:txBody>
-          <a:bodyPr/>
-          <a:lstStyle/>
-          <a:p>
-            <a:r>
-              <a:rPr lang="en-US" dirty="0"/>
-              <a:t>Implementation of Vx and Vy</a:t>
-            </a:r>
-          </a:p>
-          <a:p>
-            <a:r>
-              <a:rPr lang="en-US" dirty="0"/>
-              <a:t>Validation of Vx and Vy</a:t>
-            </a:r>
-          </a:p>
-          <a:p>
-            <a:r>
-              <a:rPr lang="en-US" dirty="0"/>
-              <a:t>Obtain IMU</a:t>
-            </a:r>
-          </a:p>
-        </p:txBody>
-      </p:sp>
-      <p:sp>
-        <p:nvSpPr>
-          <p:cNvPr id="4" name="Date Placeholder 3">
-            <a:extLst>
-              <a:ext uri="{FF2B5EF4-FFF2-40B4-BE49-F238E27FC236}">
-                <a16:creationId xmlns:a16="http://schemas.microsoft.com/office/drawing/2014/main" id="{AF481221-112F-88F1-B090-32C47E3FB9AB}"/>
-              </a:ext>
-            </a:extLst>
-          </p:cNvPr>
-          <p:cNvSpPr>
-            <a:spLocks noGrp="1"/>
-          </p:cNvSpPr>
-          <p:nvPr>
-            <p:ph type="dt" sz="half" idx="10"/>
-          </p:nvPr>
-        </p:nvSpPr>
-        <p:spPr/>
-        <p:txBody>
-          <a:bodyPr/>
-          <a:lstStyle/>
-          <a:p>
-            <a:fld id="{0EFBEC3F-4208-4590-BA97-4119A385DFD9}" type="datetime1">
-              <a:rPr lang="en-US" smtClean="0"/>
-              <a:t>8/25/2025</a:t>
-            </a:fld>
-            <a:endParaRPr lang="en-US"/>
-          </a:p>
-        </p:txBody>
-      </p:sp>
-      <p:sp>
-        <p:nvSpPr>
-          <p:cNvPr id="5" name="Slide Number Placeholder 4">
-            <a:extLst>
-              <a:ext uri="{FF2B5EF4-FFF2-40B4-BE49-F238E27FC236}">
-                <a16:creationId xmlns:a16="http://schemas.microsoft.com/office/drawing/2014/main" id="{5708C3EC-3069-CF97-A1D8-B58BD7378B05}"/>
-              </a:ext>
-            </a:extLst>
-          </p:cNvPr>
-          <p:cNvSpPr>
-            <a:spLocks noGrp="1"/>
-          </p:cNvSpPr>
-          <p:nvPr>
-            <p:ph type="sldNum" sz="quarter" idx="12"/>
-          </p:nvPr>
-        </p:nvSpPr>
-        <p:spPr/>
-        <p:txBody>
-          <a:bodyPr/>
-          <a:lstStyle/>
-          <a:p>
-            <a:fld id="{C1FF6DA9-008F-8B48-92A6-B652298478BF}" type="slidenum">
-              <a:rPr lang="en-US" smtClean="0"/>
-              <a:t>3</a:t>
-            </a:fld>
-            <a:endParaRPr lang="en-US"/>
-          </a:p>
-        </p:txBody>
-      </p:sp>
-    </p:spTree>
-    <p:extLst>
-      <p:ext uri="{BB962C8B-B14F-4D97-AF65-F5344CB8AC3E}">
-        <p14:creationId xmlns:p14="http://schemas.microsoft.com/office/powerpoint/2010/main" val="4022417390"/>
-      </p:ext>
-    </p:extLst>
-  </p:cSld>
-  <p:clrMapOvr>
-    <a:masterClrMapping/>
-  </p:clrMapOvr>
-</p:sld>
-</file>
-
-<file path=ppt/slides/slide30.xml><?xml version="1.0" encoding="utf-8"?>
+<file path=ppt/slides/slide31.xml><?xml version="1.0" encoding="utf-8"?>
 <p:sld xmlns:a="http://schemas.openxmlformats.org/drawingml/2006/main" xmlns:r="http://schemas.openxmlformats.org/officeDocument/2006/relationships" xmlns:p="http://schemas.openxmlformats.org/presentationml/2006/main">
   <p:cSld>
     <p:spTree>
@@ -10168,7 +10339,7 @@
         <p:cNvPr id="1" name="">
           <a:extLst>
             <a:ext uri="{FF2B5EF4-FFF2-40B4-BE49-F238E27FC236}">
-              <a16:creationId xmlns:a16="http://schemas.microsoft.com/office/drawing/2014/main" id="{FF24E9B9-4751-0E76-AD11-7DC3656C5FB4}"/>
+              <a16:creationId xmlns:a16="http://schemas.microsoft.com/office/drawing/2014/main" id="{449713CB-B900-6BBD-32D3-0C165AF0D63D}"/>
             </a:ext>
           </a:extLst>
         </p:cNvPr>
@@ -10188,7 +10359,7 @@
           <p:cNvPr id="2" name="Title 1">
             <a:extLst>
               <a:ext uri="{FF2B5EF4-FFF2-40B4-BE49-F238E27FC236}">
-                <a16:creationId xmlns:a16="http://schemas.microsoft.com/office/drawing/2014/main" id="{FFCB1F6A-BE60-9CE3-1B89-77DAA7FD74E4}"/>
+                <a16:creationId xmlns:a16="http://schemas.microsoft.com/office/drawing/2014/main" id="{89A89B8D-A90B-D887-A9F6-9E23A7A5521B}"/>
               </a:ext>
             </a:extLst>
           </p:cNvPr>
@@ -10208,14 +10379,14 @@
           <a:p>
             <a:r>
               <a:rPr lang="en-US" dirty="0"/>
-              <a:t>Period Highlight – 11</a:t>
+              <a:t>Period Highlight – 12</a:t>
             </a:r>
             <a:br>
               <a:rPr lang="en-US" dirty="0"/>
             </a:br>
             <a:r>
               <a:rPr lang="en-US" sz="3200" dirty="0"/>
-              <a:t>Software Progress</a:t>
+              <a:t>Missed</a:t>
             </a:r>
             <a:endParaRPr lang="en-US" dirty="0"/>
           </a:p>
@@ -10226,7 +10397,7 @@
           <p:cNvPr id="3" name="Content Placeholder 2">
             <a:extLst>
               <a:ext uri="{FF2B5EF4-FFF2-40B4-BE49-F238E27FC236}">
-                <a16:creationId xmlns:a16="http://schemas.microsoft.com/office/drawing/2014/main" id="{712E0224-EBCF-5274-8104-E61FDBBF917B}"/>
+                <a16:creationId xmlns:a16="http://schemas.microsoft.com/office/drawing/2014/main" id="{5400EFD1-05BA-D32C-E771-68AA8A9B8C81}"/>
               </a:ext>
             </a:extLst>
           </p:cNvPr>
@@ -10249,10 +10420,7 @@
           </a:bodyPr>
           <a:lstStyle/>
           <a:p>
-            <a:r>
-              <a:rPr lang="en-US" sz="1800" dirty="0"/>
-              <a:t>Implementation with single sensor.</a:t>
-            </a:r>
+            <a:endParaRPr lang="en-US" sz="1800" dirty="0"/>
           </a:p>
         </p:txBody>
       </p:sp>
@@ -10261,7 +10429,7 @@
           <p:cNvPr id="4" name="Date Placeholder 3">
             <a:extLst>
               <a:ext uri="{FF2B5EF4-FFF2-40B4-BE49-F238E27FC236}">
-                <a16:creationId xmlns:a16="http://schemas.microsoft.com/office/drawing/2014/main" id="{D0970F29-5651-901E-F5D5-CED095FBACF3}"/>
+                <a16:creationId xmlns:a16="http://schemas.microsoft.com/office/drawing/2014/main" id="{A06125E1-E10A-5F21-00EB-F48E6AB9D0D0}"/>
               </a:ext>
             </a:extLst>
           </p:cNvPr>
@@ -10279,7 +10447,7 @@
           <a:p>
             <a:fld id="{0EFBEC3F-4208-4590-BA97-4119A385DFD9}" type="datetime1">
               <a:rPr lang="en-US" smtClean="0"/>
-              <a:t>8/25/2025</a:t>
+              <a:t>9/7/2025</a:t>
             </a:fld>
             <a:endParaRPr lang="en-US"/>
           </a:p>
@@ -10290,7 +10458,7 @@
           <p:cNvPr id="5" name="Slide Number Placeholder 4">
             <a:extLst>
               <a:ext uri="{FF2B5EF4-FFF2-40B4-BE49-F238E27FC236}">
-                <a16:creationId xmlns:a16="http://schemas.microsoft.com/office/drawing/2014/main" id="{1B93056D-3405-AF6F-78BF-AFA38045C391}"/>
+                <a16:creationId xmlns:a16="http://schemas.microsoft.com/office/drawing/2014/main" id="{D46A549D-70EC-45C3-843F-B448EABDB474}"/>
               </a:ext>
             </a:extLst>
           </p:cNvPr>
@@ -10308,7 +10476,7 @@
           <a:p>
             <a:fld id="{C1FF6DA9-008F-8B48-92A6-B652298478BF}" type="slidenum">
               <a:rPr lang="en-US" smtClean="0"/>
-              <a:t>30</a:t>
+              <a:t>31</a:t>
             </a:fld>
             <a:endParaRPr lang="en-US"/>
           </a:p>
@@ -10317,7 +10485,7 @@
     </p:spTree>
     <p:extLst>
       <p:ext uri="{BB962C8B-B14F-4D97-AF65-F5344CB8AC3E}">
-        <p14:creationId xmlns:p14="http://schemas.microsoft.com/office/powerpoint/2010/main" val="3156544465"/>
+        <p14:creationId xmlns:p14="http://schemas.microsoft.com/office/powerpoint/2010/main" val="1383330149"/>
       </p:ext>
     </p:extLst>
   </p:cSld>
@@ -10327,7 +10495,7 @@
 </p:sld>
 </file>
 
-<file path=ppt/slides/slide31.xml><?xml version="1.0" encoding="utf-8"?>
+<file path=ppt/slides/slide32.xml><?xml version="1.0" encoding="utf-8"?>
 <p:sld xmlns:a="http://schemas.openxmlformats.org/drawingml/2006/main" xmlns:r="http://schemas.openxmlformats.org/officeDocument/2006/relationships" xmlns:p="http://schemas.openxmlformats.org/presentationml/2006/main">
   <p:cSld>
     <p:spTree>
@@ -10335,7 +10503,7 @@
         <p:cNvPr id="1" name="">
           <a:extLst>
             <a:ext uri="{FF2B5EF4-FFF2-40B4-BE49-F238E27FC236}">
-              <a16:creationId xmlns:a16="http://schemas.microsoft.com/office/drawing/2014/main" id="{C7E76805-6940-E5D9-7F60-7B6767121A21}"/>
+              <a16:creationId xmlns:a16="http://schemas.microsoft.com/office/drawing/2014/main" id="{8224175E-9BCA-7358-2C52-0A8FE6866A47}"/>
             </a:ext>
           </a:extLst>
         </p:cNvPr>
@@ -10355,7 +10523,7 @@
           <p:cNvPr id="2" name="Title 1">
             <a:extLst>
               <a:ext uri="{FF2B5EF4-FFF2-40B4-BE49-F238E27FC236}">
-                <a16:creationId xmlns:a16="http://schemas.microsoft.com/office/drawing/2014/main" id="{7F4FD00F-4637-06A1-2B28-8BC9FF091AD1}"/>
+                <a16:creationId xmlns:a16="http://schemas.microsoft.com/office/drawing/2014/main" id="{5909DE93-AC33-B767-04A5-24ADEF0FA2F5}"/>
               </a:ext>
             </a:extLst>
           </p:cNvPr>
@@ -10375,14 +10543,14 @@
           <a:p>
             <a:r>
               <a:rPr lang="en-US" dirty="0"/>
-              <a:t>Period Highlight – 11</a:t>
+              <a:t>Period Highlight – 13</a:t>
             </a:r>
             <a:br>
               <a:rPr lang="en-US" dirty="0"/>
             </a:br>
             <a:r>
               <a:rPr lang="en-US" sz="3200" dirty="0"/>
-              <a:t>Software Progress</a:t>
+              <a:t>Hardware Preparations</a:t>
             </a:r>
             <a:endParaRPr lang="en-US" dirty="0"/>
           </a:p>
@@ -10393,7 +10561,7 @@
           <p:cNvPr id="3" name="Content Placeholder 2">
             <a:extLst>
               <a:ext uri="{FF2B5EF4-FFF2-40B4-BE49-F238E27FC236}">
-                <a16:creationId xmlns:a16="http://schemas.microsoft.com/office/drawing/2014/main" id="{31B5BF06-E570-A7EF-36AA-416CA639FC8C}"/>
+                <a16:creationId xmlns:a16="http://schemas.microsoft.com/office/drawing/2014/main" id="{0DC83C99-DB1D-741D-5BC7-23A22BE5320A}"/>
               </a:ext>
             </a:extLst>
           </p:cNvPr>
@@ -10406,7 +10574,7 @@
         </p:nvSpPr>
         <p:spPr>
           <a:xfrm>
-            <a:off x="457200" y="1417638"/>
+            <a:off x="457200" y="1600201"/>
             <a:ext cx="5202936" cy="3054096"/>
           </a:xfrm>
         </p:spPr>
@@ -10418,20 +10586,39 @@
           <a:p>
             <a:r>
               <a:rPr lang="en-US" sz="1800" dirty="0"/>
-              <a:t>Implementation with dual sensor.</a:t>
+              <a:t>Implementation of both sensors.</a:t>
             </a:r>
           </a:p>
           <a:p>
             <a:r>
               <a:rPr lang="en-US" sz="1800" dirty="0"/>
-              <a:t>Improvements needed, at some point the recordings were working better than latest version.</a:t>
+              <a:t>Frequency offset: 1,9GHz</a:t>
+            </a:r>
+          </a:p>
+          <a:p>
+            <a:r>
+              <a:rPr lang="en-US" sz="1800" dirty="0"/>
+              <a:t>Sensor A (Left)</a:t>
             </a:r>
           </a:p>
           <a:p>
             <a:pPr lvl="1"/>
             <a:r>
-              <a:rPr lang="en-US" sz="1400" dirty="0"/>
-              <a:t>Next goal is to roll back to that point and start from there.</a:t>
+              <a:rPr lang="en-US" sz="1800" dirty="0"/>
+              <a:t>60 GHz to 61,98GHz</a:t>
+            </a:r>
+          </a:p>
+          <a:p>
+            <a:r>
+              <a:rPr lang="en-US" sz="1800" dirty="0"/>
+              <a:t>Sensor B (right)</a:t>
+            </a:r>
+          </a:p>
+          <a:p>
+            <a:pPr lvl="1"/>
+            <a:r>
+              <a:rPr lang="en-US" sz="1800" dirty="0"/>
+              <a:t>62 GHz to 63,98 GHz</a:t>
             </a:r>
           </a:p>
         </p:txBody>
@@ -10441,7 +10628,7 @@
           <p:cNvPr id="4" name="Date Placeholder 3">
             <a:extLst>
               <a:ext uri="{FF2B5EF4-FFF2-40B4-BE49-F238E27FC236}">
-                <a16:creationId xmlns:a16="http://schemas.microsoft.com/office/drawing/2014/main" id="{11853BB6-0F5B-10FE-1B68-64E4B86239E7}"/>
+                <a16:creationId xmlns:a16="http://schemas.microsoft.com/office/drawing/2014/main" id="{E4BB1F48-8E26-824A-24CA-EBCA5FE788D5}"/>
               </a:ext>
             </a:extLst>
           </p:cNvPr>
@@ -10459,7 +10646,7 @@
           <a:p>
             <a:fld id="{0EFBEC3F-4208-4590-BA97-4119A385DFD9}" type="datetime1">
               <a:rPr lang="en-US" smtClean="0"/>
-              <a:t>8/25/2025</a:t>
+              <a:t>9/7/2025</a:t>
             </a:fld>
             <a:endParaRPr lang="en-US"/>
           </a:p>
@@ -10470,7 +10657,7 @@
           <p:cNvPr id="5" name="Slide Number Placeholder 4">
             <a:extLst>
               <a:ext uri="{FF2B5EF4-FFF2-40B4-BE49-F238E27FC236}">
-                <a16:creationId xmlns:a16="http://schemas.microsoft.com/office/drawing/2014/main" id="{C59461A5-100A-6288-55EC-78AAD7083E18}"/>
+                <a16:creationId xmlns:a16="http://schemas.microsoft.com/office/drawing/2014/main" id="{F7CE029E-CD7F-C479-0488-AF1BB934013F}"/>
               </a:ext>
             </a:extLst>
           </p:cNvPr>
@@ -10488,7 +10675,7 @@
           <a:p>
             <a:fld id="{C1FF6DA9-008F-8B48-92A6-B652298478BF}" type="slidenum">
               <a:rPr lang="en-US" smtClean="0"/>
-              <a:t>31</a:t>
+              <a:t>32</a:t>
             </a:fld>
             <a:endParaRPr lang="en-US"/>
           </a:p>
@@ -10496,10 +10683,10 @@
       </p:sp>
       <p:pic>
         <p:nvPicPr>
-          <p:cNvPr id="6" name="Picture 5">
-            <a:extLst>
-              <a:ext uri="{FF2B5EF4-FFF2-40B4-BE49-F238E27FC236}">
-                <a16:creationId xmlns:a16="http://schemas.microsoft.com/office/drawing/2014/main" id="{FFEA1CB0-4D8B-082E-52D2-93CB3678D796}"/>
+          <p:cNvPr id="6" name="Picture 5" descr="A graph of a car sensor&#10;&#10;AI-generated content may be incorrect.">
+            <a:extLst>
+              <a:ext uri="{FF2B5EF4-FFF2-40B4-BE49-F238E27FC236}">
+                <a16:creationId xmlns:a16="http://schemas.microsoft.com/office/drawing/2014/main" id="{EE1F35F8-C4F8-2046-29DC-A6730937D5E7}"/>
               </a:ext>
             </a:extLst>
           </p:cNvPr>
@@ -10516,8 +10703,38 @@
         </p:blipFill>
         <p:spPr>
           <a:xfrm>
-            <a:off x="2942360" y="3311588"/>
-            <a:ext cx="6201640" cy="3029373"/>
+            <a:off x="4376430" y="2614861"/>
+            <a:ext cx="4353540" cy="3511302"/>
+          </a:xfrm>
+          <a:prstGeom prst="rect">
+            <a:avLst/>
+          </a:prstGeom>
+        </p:spPr>
+      </p:pic>
+      <p:pic>
+        <p:nvPicPr>
+          <p:cNvPr id="7" name="Picture 6" descr="A graph of a graph showing a variety of colors&#10;&#10;AI-generated content may be incorrect.">
+            <a:extLst>
+              <a:ext uri="{FF2B5EF4-FFF2-40B4-BE49-F238E27FC236}">
+                <a16:creationId xmlns:a16="http://schemas.microsoft.com/office/drawing/2014/main" id="{032953F9-2752-3BEE-0216-4416E40A88A1}"/>
+              </a:ext>
+            </a:extLst>
+          </p:cNvPr>
+          <p:cNvPicPr>
+            <a:picLocks noChangeAspect="1"/>
+          </p:cNvPicPr>
+          <p:nvPr/>
+        </p:nvPicPr>
+        <p:blipFill>
+          <a:blip r:embed="rId3"/>
+          <a:stretch>
+            <a:fillRect/>
+          </a:stretch>
+        </p:blipFill>
+        <p:spPr>
+          <a:xfrm>
+            <a:off x="380389" y="4279070"/>
+            <a:ext cx="3952871" cy="1957460"/>
           </a:xfrm>
           <a:prstGeom prst="rect">
             <a:avLst/>
@@ -10527,7 +10744,7 @@
     </p:spTree>
     <p:extLst>
       <p:ext uri="{BB962C8B-B14F-4D97-AF65-F5344CB8AC3E}">
-        <p14:creationId xmlns:p14="http://schemas.microsoft.com/office/powerpoint/2010/main" val="1199941006"/>
+        <p14:creationId xmlns:p14="http://schemas.microsoft.com/office/powerpoint/2010/main" val="4032189293"/>
       </p:ext>
     </p:extLst>
   </p:cSld>
@@ -10537,7 +10754,2752 @@
 </p:sld>
 </file>
 
-<file path=ppt/slides/slide32.xml><?xml version="1.0" encoding="utf-8"?>
+<file path=ppt/slides/slide33.xml><?xml version="1.0" encoding="utf-8"?>
+<p:sld xmlns:a="http://schemas.openxmlformats.org/drawingml/2006/main" xmlns:r="http://schemas.openxmlformats.org/officeDocument/2006/relationships" xmlns:p="http://schemas.openxmlformats.org/presentationml/2006/main">
+  <p:cSld>
+    <p:spTree>
+      <p:nvGrpSpPr>
+        <p:cNvPr id="1" name="">
+          <a:extLst>
+            <a:ext uri="{FF2B5EF4-FFF2-40B4-BE49-F238E27FC236}">
+              <a16:creationId xmlns:a16="http://schemas.microsoft.com/office/drawing/2014/main" id="{B4142424-A2CA-2B4B-D296-8BEA4CCDEBE7}"/>
+            </a:ext>
+          </a:extLst>
+        </p:cNvPr>
+        <p:cNvGrpSpPr/>
+        <p:nvPr/>
+      </p:nvGrpSpPr>
+      <p:grpSpPr>
+        <a:xfrm>
+          <a:off x="0" y="0"/>
+          <a:ext cx="0" cy="0"/>
+          <a:chOff x="0" y="0"/>
+          <a:chExt cx="0" cy="0"/>
+        </a:xfrm>
+      </p:grpSpPr>
+      <p:sp>
+        <p:nvSpPr>
+          <p:cNvPr id="2" name="Title 1">
+            <a:extLst>
+              <a:ext uri="{FF2B5EF4-FFF2-40B4-BE49-F238E27FC236}">
+                <a16:creationId xmlns:a16="http://schemas.microsoft.com/office/drawing/2014/main" id="{3B1B33DD-A7DE-FE01-E5B5-29E583517FE0}"/>
+              </a:ext>
+            </a:extLst>
+          </p:cNvPr>
+          <p:cNvSpPr>
+            <a:spLocks noGrp="1"/>
+          </p:cNvSpPr>
+          <p:nvPr>
+            <p:ph type="title"/>
+          </p:nvPr>
+        </p:nvSpPr>
+        <p:spPr/>
+        <p:txBody>
+          <a:bodyPr>
+            <a:normAutofit fontScale="90000"/>
+          </a:bodyPr>
+          <a:lstStyle/>
+          <a:p>
+            <a:r>
+              <a:rPr lang="en-US" dirty="0"/>
+              <a:t>Period Highlight – 13</a:t>
+            </a:r>
+            <a:br>
+              <a:rPr lang="en-US" dirty="0"/>
+            </a:br>
+            <a:r>
+              <a:rPr lang="en-US" sz="3200" dirty="0"/>
+              <a:t>Software Progress</a:t>
+            </a:r>
+            <a:endParaRPr lang="en-US" dirty="0"/>
+          </a:p>
+        </p:txBody>
+      </p:sp>
+      <p:sp>
+        <p:nvSpPr>
+          <p:cNvPr id="3" name="Content Placeholder 2">
+            <a:extLst>
+              <a:ext uri="{FF2B5EF4-FFF2-40B4-BE49-F238E27FC236}">
+                <a16:creationId xmlns:a16="http://schemas.microsoft.com/office/drawing/2014/main" id="{4B190110-6E99-6ABF-FA5F-CFA1FD66BEF6}"/>
+              </a:ext>
+            </a:extLst>
+          </p:cNvPr>
+          <p:cNvSpPr>
+            <a:spLocks noGrp="1"/>
+          </p:cNvSpPr>
+          <p:nvPr>
+            <p:ph idx="1"/>
+          </p:nvPr>
+        </p:nvSpPr>
+        <p:spPr>
+          <a:xfrm>
+            <a:off x="457200" y="1417638"/>
+            <a:ext cx="3840480" cy="1307274"/>
+          </a:xfrm>
+        </p:spPr>
+        <p:txBody>
+          <a:bodyPr>
+            <a:normAutofit fontScale="85000" lnSpcReduction="10000"/>
+          </a:bodyPr>
+          <a:lstStyle/>
+          <a:p>
+            <a:r>
+              <a:rPr lang="en-US" sz="1800" dirty="0"/>
+              <a:t>Implementation with dual sensor.</a:t>
+            </a:r>
+          </a:p>
+          <a:p>
+            <a:r>
+              <a:rPr lang="en-US" sz="1800" dirty="0"/>
+              <a:t>Measurements taken outside.</a:t>
+            </a:r>
+          </a:p>
+          <a:p>
+            <a:r>
+              <a:rPr lang="en-US" sz="1800" dirty="0"/>
+              <a:t>Given priority from most tracked cluster.</a:t>
+            </a:r>
+          </a:p>
+          <a:p>
+            <a:r>
+              <a:rPr lang="en-US" sz="1800" dirty="0"/>
+              <a:t>Distance still needs to be validated.</a:t>
+            </a:r>
+          </a:p>
+          <a:p>
+            <a:r>
+              <a:rPr lang="en-US" sz="1800" dirty="0"/>
+              <a:t>Rotation obtained with IMU.</a:t>
+            </a:r>
+          </a:p>
+          <a:p>
+            <a:endParaRPr lang="en-US" sz="1800" dirty="0"/>
+          </a:p>
+        </p:txBody>
+      </p:sp>
+      <p:sp>
+        <p:nvSpPr>
+          <p:cNvPr id="4" name="Date Placeholder 3">
+            <a:extLst>
+              <a:ext uri="{FF2B5EF4-FFF2-40B4-BE49-F238E27FC236}">
+                <a16:creationId xmlns:a16="http://schemas.microsoft.com/office/drawing/2014/main" id="{089B5388-F971-E68F-2AE3-ABFEB3D81DB2}"/>
+              </a:ext>
+            </a:extLst>
+          </p:cNvPr>
+          <p:cNvSpPr>
+            <a:spLocks noGrp="1"/>
+          </p:cNvSpPr>
+          <p:nvPr>
+            <p:ph type="dt" sz="half" idx="10"/>
+          </p:nvPr>
+        </p:nvSpPr>
+        <p:spPr/>
+        <p:txBody>
+          <a:bodyPr/>
+          <a:lstStyle/>
+          <a:p>
+            <a:fld id="{0EFBEC3F-4208-4590-BA97-4119A385DFD9}" type="datetime1">
+              <a:rPr lang="en-US" smtClean="0"/>
+              <a:t>9/7/2025</a:t>
+            </a:fld>
+            <a:endParaRPr lang="en-US"/>
+          </a:p>
+        </p:txBody>
+      </p:sp>
+      <p:sp>
+        <p:nvSpPr>
+          <p:cNvPr id="5" name="Slide Number Placeholder 4">
+            <a:extLst>
+              <a:ext uri="{FF2B5EF4-FFF2-40B4-BE49-F238E27FC236}">
+                <a16:creationId xmlns:a16="http://schemas.microsoft.com/office/drawing/2014/main" id="{DBD3CF9C-08EE-EC21-018A-BB6388ADC6BC}"/>
+              </a:ext>
+            </a:extLst>
+          </p:cNvPr>
+          <p:cNvSpPr>
+            <a:spLocks noGrp="1"/>
+          </p:cNvSpPr>
+          <p:nvPr>
+            <p:ph type="sldNum" sz="quarter" idx="12"/>
+          </p:nvPr>
+        </p:nvSpPr>
+        <p:spPr/>
+        <p:txBody>
+          <a:bodyPr/>
+          <a:lstStyle/>
+          <a:p>
+            <a:fld id="{C1FF6DA9-008F-8B48-92A6-B652298478BF}" type="slidenum">
+              <a:rPr lang="en-US" smtClean="0"/>
+              <a:t>33</a:t>
+            </a:fld>
+            <a:endParaRPr lang="en-US"/>
+          </a:p>
+        </p:txBody>
+      </p:sp>
+      <p:pic>
+        <p:nvPicPr>
+          <p:cNvPr id="7" name="Picture 6">
+            <a:extLst>
+              <a:ext uri="{FF2B5EF4-FFF2-40B4-BE49-F238E27FC236}">
+                <a16:creationId xmlns:a16="http://schemas.microsoft.com/office/drawing/2014/main" id="{82B0DA36-EE99-B6C5-D1DF-07B573D282DF}"/>
+              </a:ext>
+            </a:extLst>
+          </p:cNvPr>
+          <p:cNvPicPr>
+            <a:picLocks noChangeAspect="1"/>
+          </p:cNvPicPr>
+          <p:nvPr/>
+        </p:nvPicPr>
+        <p:blipFill>
+          <a:blip r:embed="rId2"/>
+          <a:stretch>
+            <a:fillRect/>
+          </a:stretch>
+        </p:blipFill>
+        <p:spPr>
+          <a:xfrm>
+            <a:off x="1201623" y="3155047"/>
+            <a:ext cx="6192114" cy="2943636"/>
+          </a:xfrm>
+          <a:prstGeom prst="rect">
+            <a:avLst/>
+          </a:prstGeom>
+        </p:spPr>
+      </p:pic>
+      <p:sp>
+        <p:nvSpPr>
+          <p:cNvPr id="10" name="Content Placeholder 2">
+            <a:extLst>
+              <a:ext uri="{FF2B5EF4-FFF2-40B4-BE49-F238E27FC236}">
+                <a16:creationId xmlns:a16="http://schemas.microsoft.com/office/drawing/2014/main" id="{81ADA64C-B009-E98E-9E9C-8A851E5749BE}"/>
+              </a:ext>
+            </a:extLst>
+          </p:cNvPr>
+          <p:cNvSpPr txBox="1">
+            <a:spLocks/>
+          </p:cNvSpPr>
+          <p:nvPr/>
+        </p:nvSpPr>
+        <p:spPr>
+          <a:xfrm>
+            <a:off x="4297680" y="1417638"/>
+            <a:ext cx="3840480" cy="1307274"/>
+          </a:xfrm>
+          <a:prstGeom prst="rect">
+            <a:avLst/>
+          </a:prstGeom>
+        </p:spPr>
+        <p:txBody>
+          <a:bodyPr vert="horz" lIns="91440" tIns="45720" rIns="91440" bIns="45720" rtlCol="0">
+            <a:normAutofit fontScale="92500" lnSpcReduction="20000"/>
+          </a:bodyPr>
+          <a:lstStyle>
+            <a:lvl1pPr marL="342900" indent="-342900" algn="l" defTabSz="457200" rtl="0" eaLnBrk="1" latinLnBrk="0" hangingPunct="1">
+              <a:spcBef>
+                <a:spcPct val="20000"/>
+              </a:spcBef>
+              <a:buFont typeface="Arial"/>
+              <a:buChar char="•"/>
+              <a:defRPr sz="3200" kern="1200">
+                <a:solidFill>
+                  <a:schemeClr val="tx1"/>
+                </a:solidFill>
+                <a:latin typeface="+mn-lt"/>
+                <a:ea typeface="+mn-ea"/>
+                <a:cs typeface="+mn-cs"/>
+              </a:defRPr>
+            </a:lvl1pPr>
+            <a:lvl2pPr marL="742950" indent="-285750" algn="l" defTabSz="457200" rtl="0" eaLnBrk="1" latinLnBrk="0" hangingPunct="1">
+              <a:spcBef>
+                <a:spcPct val="20000"/>
+              </a:spcBef>
+              <a:buFont typeface="Arial"/>
+              <a:buChar char="–"/>
+              <a:defRPr sz="2800" kern="1200">
+                <a:solidFill>
+                  <a:schemeClr val="tx1"/>
+                </a:solidFill>
+                <a:latin typeface="+mn-lt"/>
+                <a:ea typeface="+mn-ea"/>
+                <a:cs typeface="+mn-cs"/>
+              </a:defRPr>
+            </a:lvl2pPr>
+            <a:lvl3pPr marL="1143000" indent="-228600" algn="l" defTabSz="457200" rtl="0" eaLnBrk="1" latinLnBrk="0" hangingPunct="1">
+              <a:spcBef>
+                <a:spcPct val="20000"/>
+              </a:spcBef>
+              <a:buFont typeface="Arial"/>
+              <a:buChar char="•"/>
+              <a:defRPr sz="2400" kern="1200">
+                <a:solidFill>
+                  <a:schemeClr val="tx1"/>
+                </a:solidFill>
+                <a:latin typeface="+mn-lt"/>
+                <a:ea typeface="+mn-ea"/>
+                <a:cs typeface="+mn-cs"/>
+              </a:defRPr>
+            </a:lvl3pPr>
+            <a:lvl4pPr marL="1600200" indent="-228600" algn="l" defTabSz="457200" rtl="0" eaLnBrk="1" latinLnBrk="0" hangingPunct="1">
+              <a:spcBef>
+                <a:spcPct val="20000"/>
+              </a:spcBef>
+              <a:buFont typeface="Arial"/>
+              <a:buChar char="–"/>
+              <a:defRPr sz="2000" kern="1200">
+                <a:solidFill>
+                  <a:schemeClr val="tx1"/>
+                </a:solidFill>
+                <a:latin typeface="+mn-lt"/>
+                <a:ea typeface="+mn-ea"/>
+                <a:cs typeface="+mn-cs"/>
+              </a:defRPr>
+            </a:lvl4pPr>
+            <a:lvl5pPr marL="2057400" indent="-228600" algn="l" defTabSz="457200" rtl="0" eaLnBrk="1" latinLnBrk="0" hangingPunct="1">
+              <a:spcBef>
+                <a:spcPct val="20000"/>
+              </a:spcBef>
+              <a:buFont typeface="Arial"/>
+              <a:buChar char="»"/>
+              <a:defRPr sz="2000" kern="1200">
+                <a:solidFill>
+                  <a:schemeClr val="tx1"/>
+                </a:solidFill>
+                <a:latin typeface="+mn-lt"/>
+                <a:ea typeface="+mn-ea"/>
+                <a:cs typeface="+mn-cs"/>
+              </a:defRPr>
+            </a:lvl5pPr>
+            <a:lvl6pPr marL="2514600" indent="-228600" algn="l" defTabSz="457200" rtl="0" eaLnBrk="1" latinLnBrk="0" hangingPunct="1">
+              <a:spcBef>
+                <a:spcPct val="20000"/>
+              </a:spcBef>
+              <a:buFont typeface="Arial"/>
+              <a:buChar char="•"/>
+              <a:defRPr sz="2000" kern="1200">
+                <a:solidFill>
+                  <a:schemeClr val="tx1"/>
+                </a:solidFill>
+                <a:latin typeface="+mn-lt"/>
+                <a:ea typeface="+mn-ea"/>
+                <a:cs typeface="+mn-cs"/>
+              </a:defRPr>
+            </a:lvl6pPr>
+            <a:lvl7pPr marL="2971800" indent="-228600" algn="l" defTabSz="457200" rtl="0" eaLnBrk="1" latinLnBrk="0" hangingPunct="1">
+              <a:spcBef>
+                <a:spcPct val="20000"/>
+              </a:spcBef>
+              <a:buFont typeface="Arial"/>
+              <a:buChar char="•"/>
+              <a:defRPr sz="2000" kern="1200">
+                <a:solidFill>
+                  <a:schemeClr val="tx1"/>
+                </a:solidFill>
+                <a:latin typeface="+mn-lt"/>
+                <a:ea typeface="+mn-ea"/>
+                <a:cs typeface="+mn-cs"/>
+              </a:defRPr>
+            </a:lvl7pPr>
+            <a:lvl8pPr marL="3429000" indent="-228600" algn="l" defTabSz="457200" rtl="0" eaLnBrk="1" latinLnBrk="0" hangingPunct="1">
+              <a:spcBef>
+                <a:spcPct val="20000"/>
+              </a:spcBef>
+              <a:buFont typeface="Arial"/>
+              <a:buChar char="•"/>
+              <a:defRPr sz="2000" kern="1200">
+                <a:solidFill>
+                  <a:schemeClr val="tx1"/>
+                </a:solidFill>
+                <a:latin typeface="+mn-lt"/>
+                <a:ea typeface="+mn-ea"/>
+                <a:cs typeface="+mn-cs"/>
+              </a:defRPr>
+            </a:lvl8pPr>
+            <a:lvl9pPr marL="3886200" indent="-228600" algn="l" defTabSz="457200" rtl="0" eaLnBrk="1" latinLnBrk="0" hangingPunct="1">
+              <a:spcBef>
+                <a:spcPct val="20000"/>
+              </a:spcBef>
+              <a:buFont typeface="Arial"/>
+              <a:buChar char="•"/>
+              <a:defRPr sz="2000" kern="1200">
+                <a:solidFill>
+                  <a:schemeClr val="tx1"/>
+                </a:solidFill>
+                <a:latin typeface="+mn-lt"/>
+                <a:ea typeface="+mn-ea"/>
+                <a:cs typeface="+mn-cs"/>
+              </a:defRPr>
+            </a:lvl9pPr>
+          </a:lstStyle>
+          <a:p>
+            <a:r>
+              <a:rPr lang="en-US" sz="1800" dirty="0"/>
+              <a:t>Total of 7 recording were taken.</a:t>
+            </a:r>
+          </a:p>
+          <a:p>
+            <a:r>
+              <a:rPr lang="en-US" sz="1800" dirty="0"/>
+              <a:t>Lots of ground noise, due to bumpy road in parking lot.</a:t>
+            </a:r>
+          </a:p>
+          <a:p>
+            <a:r>
+              <a:rPr lang="en-US" sz="1800" dirty="0"/>
+              <a:t>Fixed with physical filtering and increasing </a:t>
+            </a:r>
+            <a:r>
+              <a:rPr lang="en-US" sz="1800"/>
+              <a:t>the inclination of the radar.</a:t>
+            </a:r>
+            <a:endParaRPr lang="en-US" sz="1800" dirty="0"/>
+          </a:p>
+        </p:txBody>
+      </p:sp>
+    </p:spTree>
+    <p:extLst>
+      <p:ext uri="{BB962C8B-B14F-4D97-AF65-F5344CB8AC3E}">
+        <p14:creationId xmlns:p14="http://schemas.microsoft.com/office/powerpoint/2010/main" val="3154210527"/>
+      </p:ext>
+    </p:extLst>
+  </p:cSld>
+  <p:clrMapOvr>
+    <a:masterClrMapping/>
+  </p:clrMapOvr>
+</p:sld>
+</file>
+
+<file path=ppt/slides/slide34.xml><?xml version="1.0" encoding="utf-8"?>
+<p:sld xmlns:a="http://schemas.openxmlformats.org/drawingml/2006/main" xmlns:r="http://schemas.openxmlformats.org/officeDocument/2006/relationships" xmlns:p="http://schemas.openxmlformats.org/presentationml/2006/main">
+  <p:cSld>
+    <p:spTree>
+      <p:nvGrpSpPr>
+        <p:cNvPr id="1" name="">
+          <a:extLst>
+            <a:ext uri="{FF2B5EF4-FFF2-40B4-BE49-F238E27FC236}">
+              <a16:creationId xmlns:a16="http://schemas.microsoft.com/office/drawing/2014/main" id="{F34843AB-366F-6962-24C9-0B693F7FD0F9}"/>
+            </a:ext>
+          </a:extLst>
+        </p:cNvPr>
+        <p:cNvGrpSpPr/>
+        <p:nvPr/>
+      </p:nvGrpSpPr>
+      <p:grpSpPr>
+        <a:xfrm>
+          <a:off x="0" y="0"/>
+          <a:ext cx="0" cy="0"/>
+          <a:chOff x="0" y="0"/>
+          <a:chExt cx="0" cy="0"/>
+        </a:xfrm>
+      </p:grpSpPr>
+      <p:sp>
+        <p:nvSpPr>
+          <p:cNvPr id="2" name="Title 1">
+            <a:extLst>
+              <a:ext uri="{FF2B5EF4-FFF2-40B4-BE49-F238E27FC236}">
+                <a16:creationId xmlns:a16="http://schemas.microsoft.com/office/drawing/2014/main" id="{6F035A37-007B-CFE5-8B19-FEF40CD53366}"/>
+              </a:ext>
+            </a:extLst>
+          </p:cNvPr>
+          <p:cNvSpPr>
+            <a:spLocks noGrp="1"/>
+          </p:cNvSpPr>
+          <p:nvPr>
+            <p:ph type="title"/>
+          </p:nvPr>
+        </p:nvSpPr>
+        <p:spPr/>
+        <p:txBody>
+          <a:bodyPr>
+            <a:normAutofit fontScale="90000"/>
+          </a:bodyPr>
+          <a:lstStyle/>
+          <a:p>
+            <a:r>
+              <a:rPr lang="en-US" dirty="0"/>
+              <a:t>Period Highlight – 13</a:t>
+            </a:r>
+            <a:br>
+              <a:rPr lang="en-US" dirty="0"/>
+            </a:br>
+            <a:r>
+              <a:rPr lang="en-US" sz="3200" dirty="0"/>
+              <a:t>Software Progress</a:t>
+            </a:r>
+            <a:endParaRPr lang="en-US" dirty="0"/>
+          </a:p>
+        </p:txBody>
+      </p:sp>
+      <p:sp>
+        <p:nvSpPr>
+          <p:cNvPr id="3" name="Content Placeholder 2">
+            <a:extLst>
+              <a:ext uri="{FF2B5EF4-FFF2-40B4-BE49-F238E27FC236}">
+                <a16:creationId xmlns:a16="http://schemas.microsoft.com/office/drawing/2014/main" id="{7E5BF5CF-7854-1085-A1D1-2F0338D5DAC1}"/>
+              </a:ext>
+            </a:extLst>
+          </p:cNvPr>
+          <p:cNvSpPr>
+            <a:spLocks noGrp="1"/>
+          </p:cNvSpPr>
+          <p:nvPr>
+            <p:ph idx="1"/>
+          </p:nvPr>
+        </p:nvSpPr>
+        <p:spPr>
+          <a:xfrm>
+            <a:off x="457200" y="1417638"/>
+            <a:ext cx="3840480" cy="1307274"/>
+          </a:xfrm>
+        </p:spPr>
+        <p:txBody>
+          <a:bodyPr>
+            <a:normAutofit fontScale="85000" lnSpcReduction="20000"/>
+          </a:bodyPr>
+          <a:lstStyle/>
+          <a:p>
+            <a:r>
+              <a:rPr lang="en-US" sz="1800" dirty="0"/>
+              <a:t>Point cloud improved.</a:t>
+            </a:r>
+          </a:p>
+          <a:p>
+            <a:r>
+              <a:rPr lang="en-US" sz="1800" dirty="0"/>
+              <a:t>Target use Doppler heatmap to increase results of </a:t>
+            </a:r>
+            <a:r>
+              <a:rPr lang="en-US" sz="1800" dirty="0" err="1"/>
+              <a:t>pointcloud</a:t>
+            </a:r>
+            <a:r>
+              <a:rPr lang="en-US" sz="1800" dirty="0"/>
+              <a:t>.</a:t>
+            </a:r>
+          </a:p>
+          <a:p>
+            <a:r>
+              <a:rPr lang="en-US" sz="1800" dirty="0"/>
+              <a:t>2 Sensors.</a:t>
+            </a:r>
+          </a:p>
+          <a:p>
+            <a:pPr lvl="1"/>
+            <a:r>
+              <a:rPr lang="en-US" sz="1400" dirty="0"/>
+              <a:t>Green color left sensor</a:t>
+            </a:r>
+          </a:p>
+          <a:p>
+            <a:pPr lvl="1"/>
+            <a:r>
+              <a:rPr lang="en-US" sz="1400" dirty="0"/>
+              <a:t>Blue color right sensor.</a:t>
+            </a:r>
+          </a:p>
+          <a:p>
+            <a:endParaRPr lang="en-US" sz="1800" dirty="0"/>
+          </a:p>
+          <a:p>
+            <a:endParaRPr lang="en-US" sz="1800" dirty="0"/>
+          </a:p>
+          <a:p>
+            <a:endParaRPr lang="en-US" sz="1800" dirty="0"/>
+          </a:p>
+        </p:txBody>
+      </p:sp>
+      <p:sp>
+        <p:nvSpPr>
+          <p:cNvPr id="4" name="Date Placeholder 3">
+            <a:extLst>
+              <a:ext uri="{FF2B5EF4-FFF2-40B4-BE49-F238E27FC236}">
+                <a16:creationId xmlns:a16="http://schemas.microsoft.com/office/drawing/2014/main" id="{C667EFB2-605C-1C49-903E-22AFAF70D101}"/>
+              </a:ext>
+            </a:extLst>
+          </p:cNvPr>
+          <p:cNvSpPr>
+            <a:spLocks noGrp="1"/>
+          </p:cNvSpPr>
+          <p:nvPr>
+            <p:ph type="dt" sz="half" idx="10"/>
+          </p:nvPr>
+        </p:nvSpPr>
+        <p:spPr/>
+        <p:txBody>
+          <a:bodyPr/>
+          <a:lstStyle/>
+          <a:p>
+            <a:fld id="{0EFBEC3F-4208-4590-BA97-4119A385DFD9}" type="datetime1">
+              <a:rPr lang="en-US" smtClean="0"/>
+              <a:t>9/7/2025</a:t>
+            </a:fld>
+            <a:endParaRPr lang="en-US"/>
+          </a:p>
+        </p:txBody>
+      </p:sp>
+      <p:sp>
+        <p:nvSpPr>
+          <p:cNvPr id="5" name="Slide Number Placeholder 4">
+            <a:extLst>
+              <a:ext uri="{FF2B5EF4-FFF2-40B4-BE49-F238E27FC236}">
+                <a16:creationId xmlns:a16="http://schemas.microsoft.com/office/drawing/2014/main" id="{829872AC-4CB1-EF36-84BC-C694D78C2CAF}"/>
+              </a:ext>
+            </a:extLst>
+          </p:cNvPr>
+          <p:cNvSpPr>
+            <a:spLocks noGrp="1"/>
+          </p:cNvSpPr>
+          <p:nvPr>
+            <p:ph type="sldNum" sz="quarter" idx="12"/>
+          </p:nvPr>
+        </p:nvSpPr>
+        <p:spPr/>
+        <p:txBody>
+          <a:bodyPr/>
+          <a:lstStyle/>
+          <a:p>
+            <a:fld id="{C1FF6DA9-008F-8B48-92A6-B652298478BF}" type="slidenum">
+              <a:rPr lang="en-US" smtClean="0"/>
+              <a:t>34</a:t>
+            </a:fld>
+            <a:endParaRPr lang="en-US"/>
+          </a:p>
+        </p:txBody>
+      </p:sp>
+      <p:sp>
+        <p:nvSpPr>
+          <p:cNvPr id="10" name="Content Placeholder 2">
+            <a:extLst>
+              <a:ext uri="{FF2B5EF4-FFF2-40B4-BE49-F238E27FC236}">
+                <a16:creationId xmlns:a16="http://schemas.microsoft.com/office/drawing/2014/main" id="{2C5E4489-3114-0494-384D-707476DE4B41}"/>
+              </a:ext>
+            </a:extLst>
+          </p:cNvPr>
+          <p:cNvSpPr txBox="1">
+            <a:spLocks/>
+          </p:cNvSpPr>
+          <p:nvPr/>
+        </p:nvSpPr>
+        <p:spPr>
+          <a:xfrm>
+            <a:off x="4297680" y="1417638"/>
+            <a:ext cx="3840480" cy="1307274"/>
+          </a:xfrm>
+          <a:prstGeom prst="rect">
+            <a:avLst/>
+          </a:prstGeom>
+        </p:spPr>
+        <p:txBody>
+          <a:bodyPr vert="horz" lIns="91440" tIns="45720" rIns="91440" bIns="45720" rtlCol="0">
+            <a:normAutofit fontScale="85000" lnSpcReduction="20000"/>
+          </a:bodyPr>
+          <a:lstStyle>
+            <a:lvl1pPr marL="342900" indent="-342900" algn="l" defTabSz="457200" rtl="0" eaLnBrk="1" latinLnBrk="0" hangingPunct="1">
+              <a:spcBef>
+                <a:spcPct val="20000"/>
+              </a:spcBef>
+              <a:buFont typeface="Arial"/>
+              <a:buChar char="•"/>
+              <a:defRPr sz="3200" kern="1200">
+                <a:solidFill>
+                  <a:schemeClr val="tx1"/>
+                </a:solidFill>
+                <a:latin typeface="+mn-lt"/>
+                <a:ea typeface="+mn-ea"/>
+                <a:cs typeface="+mn-cs"/>
+              </a:defRPr>
+            </a:lvl1pPr>
+            <a:lvl2pPr marL="742950" indent="-285750" algn="l" defTabSz="457200" rtl="0" eaLnBrk="1" latinLnBrk="0" hangingPunct="1">
+              <a:spcBef>
+                <a:spcPct val="20000"/>
+              </a:spcBef>
+              <a:buFont typeface="Arial"/>
+              <a:buChar char="–"/>
+              <a:defRPr sz="2800" kern="1200">
+                <a:solidFill>
+                  <a:schemeClr val="tx1"/>
+                </a:solidFill>
+                <a:latin typeface="+mn-lt"/>
+                <a:ea typeface="+mn-ea"/>
+                <a:cs typeface="+mn-cs"/>
+              </a:defRPr>
+            </a:lvl2pPr>
+            <a:lvl3pPr marL="1143000" indent="-228600" algn="l" defTabSz="457200" rtl="0" eaLnBrk="1" latinLnBrk="0" hangingPunct="1">
+              <a:spcBef>
+                <a:spcPct val="20000"/>
+              </a:spcBef>
+              <a:buFont typeface="Arial"/>
+              <a:buChar char="•"/>
+              <a:defRPr sz="2400" kern="1200">
+                <a:solidFill>
+                  <a:schemeClr val="tx1"/>
+                </a:solidFill>
+                <a:latin typeface="+mn-lt"/>
+                <a:ea typeface="+mn-ea"/>
+                <a:cs typeface="+mn-cs"/>
+              </a:defRPr>
+            </a:lvl3pPr>
+            <a:lvl4pPr marL="1600200" indent="-228600" algn="l" defTabSz="457200" rtl="0" eaLnBrk="1" latinLnBrk="0" hangingPunct="1">
+              <a:spcBef>
+                <a:spcPct val="20000"/>
+              </a:spcBef>
+              <a:buFont typeface="Arial"/>
+              <a:buChar char="–"/>
+              <a:defRPr sz="2000" kern="1200">
+                <a:solidFill>
+                  <a:schemeClr val="tx1"/>
+                </a:solidFill>
+                <a:latin typeface="+mn-lt"/>
+                <a:ea typeface="+mn-ea"/>
+                <a:cs typeface="+mn-cs"/>
+              </a:defRPr>
+            </a:lvl4pPr>
+            <a:lvl5pPr marL="2057400" indent="-228600" algn="l" defTabSz="457200" rtl="0" eaLnBrk="1" latinLnBrk="0" hangingPunct="1">
+              <a:spcBef>
+                <a:spcPct val="20000"/>
+              </a:spcBef>
+              <a:buFont typeface="Arial"/>
+              <a:buChar char="»"/>
+              <a:defRPr sz="2000" kern="1200">
+                <a:solidFill>
+                  <a:schemeClr val="tx1"/>
+                </a:solidFill>
+                <a:latin typeface="+mn-lt"/>
+                <a:ea typeface="+mn-ea"/>
+                <a:cs typeface="+mn-cs"/>
+              </a:defRPr>
+            </a:lvl5pPr>
+            <a:lvl6pPr marL="2514600" indent="-228600" algn="l" defTabSz="457200" rtl="0" eaLnBrk="1" latinLnBrk="0" hangingPunct="1">
+              <a:spcBef>
+                <a:spcPct val="20000"/>
+              </a:spcBef>
+              <a:buFont typeface="Arial"/>
+              <a:buChar char="•"/>
+              <a:defRPr sz="2000" kern="1200">
+                <a:solidFill>
+                  <a:schemeClr val="tx1"/>
+                </a:solidFill>
+                <a:latin typeface="+mn-lt"/>
+                <a:ea typeface="+mn-ea"/>
+                <a:cs typeface="+mn-cs"/>
+              </a:defRPr>
+            </a:lvl6pPr>
+            <a:lvl7pPr marL="2971800" indent="-228600" algn="l" defTabSz="457200" rtl="0" eaLnBrk="1" latinLnBrk="0" hangingPunct="1">
+              <a:spcBef>
+                <a:spcPct val="20000"/>
+              </a:spcBef>
+              <a:buFont typeface="Arial"/>
+              <a:buChar char="•"/>
+              <a:defRPr sz="2000" kern="1200">
+                <a:solidFill>
+                  <a:schemeClr val="tx1"/>
+                </a:solidFill>
+                <a:latin typeface="+mn-lt"/>
+                <a:ea typeface="+mn-ea"/>
+                <a:cs typeface="+mn-cs"/>
+              </a:defRPr>
+            </a:lvl7pPr>
+            <a:lvl8pPr marL="3429000" indent="-228600" algn="l" defTabSz="457200" rtl="0" eaLnBrk="1" latinLnBrk="0" hangingPunct="1">
+              <a:spcBef>
+                <a:spcPct val="20000"/>
+              </a:spcBef>
+              <a:buFont typeface="Arial"/>
+              <a:buChar char="•"/>
+              <a:defRPr sz="2000" kern="1200">
+                <a:solidFill>
+                  <a:schemeClr val="tx1"/>
+                </a:solidFill>
+                <a:latin typeface="+mn-lt"/>
+                <a:ea typeface="+mn-ea"/>
+                <a:cs typeface="+mn-cs"/>
+              </a:defRPr>
+            </a:lvl8pPr>
+            <a:lvl9pPr marL="3886200" indent="-228600" algn="l" defTabSz="457200" rtl="0" eaLnBrk="1" latinLnBrk="0" hangingPunct="1">
+              <a:spcBef>
+                <a:spcPct val="20000"/>
+              </a:spcBef>
+              <a:buFont typeface="Arial"/>
+              <a:buChar char="•"/>
+              <a:defRPr sz="2000" kern="1200">
+                <a:solidFill>
+                  <a:schemeClr val="tx1"/>
+                </a:solidFill>
+                <a:latin typeface="+mn-lt"/>
+                <a:ea typeface="+mn-ea"/>
+                <a:cs typeface="+mn-cs"/>
+              </a:defRPr>
+            </a:lvl9pPr>
+          </a:lstStyle>
+          <a:p>
+            <a:r>
+              <a:rPr lang="en-US" sz="1800" dirty="0"/>
+              <a:t>Problems with interference.</a:t>
+            </a:r>
+          </a:p>
+          <a:p>
+            <a:r>
+              <a:rPr lang="en-US" sz="1800" dirty="0"/>
+              <a:t>Problems after the 6mts mark.</a:t>
+            </a:r>
+          </a:p>
+          <a:p>
+            <a:pPr lvl="1"/>
+            <a:r>
+              <a:rPr lang="en-US" sz="1400" dirty="0"/>
+              <a:t>Noise area as geometrical safe zone ends at 5 mts.</a:t>
+            </a:r>
+          </a:p>
+          <a:p>
+            <a:r>
+              <a:rPr lang="en-US" sz="1800" dirty="0"/>
+              <a:t>This due to the theoretical 90 degrees </a:t>
+            </a:r>
+            <a:r>
+              <a:rPr lang="en-US" sz="1800" dirty="0" err="1"/>
+              <a:t>AoA</a:t>
+            </a:r>
+            <a:r>
+              <a:rPr lang="en-US" sz="1800" dirty="0"/>
+              <a:t> (Angle of Arrival).</a:t>
+            </a:r>
+          </a:p>
+        </p:txBody>
+      </p:sp>
+      <p:pic>
+        <p:nvPicPr>
+          <p:cNvPr id="11" name="Picture 10">
+            <a:extLst>
+              <a:ext uri="{FF2B5EF4-FFF2-40B4-BE49-F238E27FC236}">
+                <a16:creationId xmlns:a16="http://schemas.microsoft.com/office/drawing/2014/main" id="{27A73D70-6746-F562-3A20-BC2343691845}"/>
+              </a:ext>
+            </a:extLst>
+          </p:cNvPr>
+          <p:cNvPicPr>
+            <a:picLocks noChangeAspect="1"/>
+          </p:cNvPicPr>
+          <p:nvPr/>
+        </p:nvPicPr>
+        <p:blipFill>
+          <a:blip r:embed="rId2"/>
+          <a:stretch>
+            <a:fillRect/>
+          </a:stretch>
+        </p:blipFill>
+        <p:spPr>
+          <a:xfrm>
+            <a:off x="183504" y="3111414"/>
+            <a:ext cx="4114176" cy="3019846"/>
+          </a:xfrm>
+          <a:prstGeom prst="rect">
+            <a:avLst/>
+          </a:prstGeom>
+        </p:spPr>
+      </p:pic>
+      <p:pic>
+        <p:nvPicPr>
+          <p:cNvPr id="15" name="Picture 14">
+            <a:extLst>
+              <a:ext uri="{FF2B5EF4-FFF2-40B4-BE49-F238E27FC236}">
+                <a16:creationId xmlns:a16="http://schemas.microsoft.com/office/drawing/2014/main" id="{6DC7562E-C831-2333-E8C3-FA3962F72AF0}"/>
+              </a:ext>
+            </a:extLst>
+          </p:cNvPr>
+          <p:cNvPicPr>
+            <a:picLocks noChangeAspect="1"/>
+          </p:cNvPicPr>
+          <p:nvPr/>
+        </p:nvPicPr>
+        <p:blipFill>
+          <a:blip r:embed="rId3"/>
+          <a:stretch>
+            <a:fillRect/>
+          </a:stretch>
+        </p:blipFill>
+        <p:spPr>
+          <a:xfrm>
+            <a:off x="4206241" y="3111413"/>
+            <a:ext cx="4937760" cy="3028295"/>
+          </a:xfrm>
+          <a:prstGeom prst="rect">
+            <a:avLst/>
+          </a:prstGeom>
+        </p:spPr>
+      </p:pic>
+    </p:spTree>
+    <p:extLst>
+      <p:ext uri="{BB962C8B-B14F-4D97-AF65-F5344CB8AC3E}">
+        <p14:creationId xmlns:p14="http://schemas.microsoft.com/office/powerpoint/2010/main" val="956642526"/>
+      </p:ext>
+    </p:extLst>
+  </p:cSld>
+  <p:clrMapOvr>
+    <a:masterClrMapping/>
+  </p:clrMapOvr>
+</p:sld>
+</file>
+
+<file path=ppt/slides/slide35.xml><?xml version="1.0" encoding="utf-8"?>
+<p:sld xmlns:a="http://schemas.openxmlformats.org/drawingml/2006/main" xmlns:r="http://schemas.openxmlformats.org/officeDocument/2006/relationships" xmlns:p="http://schemas.openxmlformats.org/presentationml/2006/main">
+  <p:cSld>
+    <p:spTree>
+      <p:nvGrpSpPr>
+        <p:cNvPr id="1" name="">
+          <a:extLst>
+            <a:ext uri="{FF2B5EF4-FFF2-40B4-BE49-F238E27FC236}">
+              <a16:creationId xmlns:a16="http://schemas.microsoft.com/office/drawing/2014/main" id="{2C575A40-9A21-09B4-FE0A-B88C8B2E05E5}"/>
+            </a:ext>
+          </a:extLst>
+        </p:cNvPr>
+        <p:cNvGrpSpPr/>
+        <p:nvPr/>
+      </p:nvGrpSpPr>
+      <p:grpSpPr>
+        <a:xfrm>
+          <a:off x="0" y="0"/>
+          <a:ext cx="0" cy="0"/>
+          <a:chOff x="0" y="0"/>
+          <a:chExt cx="0" cy="0"/>
+        </a:xfrm>
+      </p:grpSpPr>
+      <p:sp>
+        <p:nvSpPr>
+          <p:cNvPr id="2" name="Title 1">
+            <a:extLst>
+              <a:ext uri="{FF2B5EF4-FFF2-40B4-BE49-F238E27FC236}">
+                <a16:creationId xmlns:a16="http://schemas.microsoft.com/office/drawing/2014/main" id="{658070D3-0E21-330A-5880-6E6C7CE802DD}"/>
+              </a:ext>
+            </a:extLst>
+          </p:cNvPr>
+          <p:cNvSpPr>
+            <a:spLocks noGrp="1"/>
+          </p:cNvSpPr>
+          <p:nvPr>
+            <p:ph type="title"/>
+          </p:nvPr>
+        </p:nvSpPr>
+        <p:spPr/>
+        <p:txBody>
+          <a:bodyPr>
+            <a:normAutofit fontScale="90000"/>
+          </a:bodyPr>
+          <a:lstStyle/>
+          <a:p>
+            <a:r>
+              <a:rPr lang="en-US" dirty="0"/>
+              <a:t>Period Highlight – 13</a:t>
+            </a:r>
+            <a:br>
+              <a:rPr lang="en-US" dirty="0"/>
+            </a:br>
+            <a:r>
+              <a:rPr lang="en-US" sz="3200" dirty="0"/>
+              <a:t>Software Progress</a:t>
+            </a:r>
+            <a:endParaRPr lang="en-US" dirty="0"/>
+          </a:p>
+        </p:txBody>
+      </p:sp>
+      <p:sp>
+        <p:nvSpPr>
+          <p:cNvPr id="3" name="Content Placeholder 2">
+            <a:extLst>
+              <a:ext uri="{FF2B5EF4-FFF2-40B4-BE49-F238E27FC236}">
+                <a16:creationId xmlns:a16="http://schemas.microsoft.com/office/drawing/2014/main" id="{D26EB26B-A0FE-2F78-4DAC-4B7BDFD42611}"/>
+              </a:ext>
+            </a:extLst>
+          </p:cNvPr>
+          <p:cNvSpPr>
+            <a:spLocks noGrp="1"/>
+          </p:cNvSpPr>
+          <p:nvPr>
+            <p:ph idx="1"/>
+          </p:nvPr>
+        </p:nvSpPr>
+        <p:spPr>
+          <a:xfrm>
+            <a:off x="457200" y="1417638"/>
+            <a:ext cx="3840480" cy="1589468"/>
+          </a:xfrm>
+        </p:spPr>
+        <p:txBody>
+          <a:bodyPr>
+            <a:normAutofit fontScale="92500" lnSpcReduction="10000"/>
+          </a:bodyPr>
+          <a:lstStyle/>
+          <a:p>
+            <a:r>
+              <a:rPr lang="en-US" sz="1800" dirty="0"/>
+              <a:t>Problems when detecting moving targets.</a:t>
+            </a:r>
+          </a:p>
+          <a:p>
+            <a:pPr lvl="1"/>
+            <a:r>
+              <a:rPr lang="en-US" sz="1000" dirty="0"/>
+              <a:t>Either not moving fast enough or problem with RANSAC config.</a:t>
+            </a:r>
+          </a:p>
+          <a:p>
+            <a:r>
+              <a:rPr lang="en-US" sz="1800" dirty="0"/>
+              <a:t>If moving target is close to out own self speed estimation. It can be perceived as static object.</a:t>
+            </a:r>
+          </a:p>
+          <a:p>
+            <a:endParaRPr lang="en-US" sz="1800" dirty="0"/>
+          </a:p>
+          <a:p>
+            <a:endParaRPr lang="en-US" sz="1800" dirty="0"/>
+          </a:p>
+        </p:txBody>
+      </p:sp>
+      <p:sp>
+        <p:nvSpPr>
+          <p:cNvPr id="4" name="Date Placeholder 3">
+            <a:extLst>
+              <a:ext uri="{FF2B5EF4-FFF2-40B4-BE49-F238E27FC236}">
+                <a16:creationId xmlns:a16="http://schemas.microsoft.com/office/drawing/2014/main" id="{C99FBC2D-58D7-CDE0-013B-01FD3E352CC7}"/>
+              </a:ext>
+            </a:extLst>
+          </p:cNvPr>
+          <p:cNvSpPr>
+            <a:spLocks noGrp="1"/>
+          </p:cNvSpPr>
+          <p:nvPr>
+            <p:ph type="dt" sz="half" idx="10"/>
+          </p:nvPr>
+        </p:nvSpPr>
+        <p:spPr/>
+        <p:txBody>
+          <a:bodyPr/>
+          <a:lstStyle/>
+          <a:p>
+            <a:fld id="{0EFBEC3F-4208-4590-BA97-4119A385DFD9}" type="datetime1">
+              <a:rPr lang="en-US" smtClean="0"/>
+              <a:t>9/7/2025</a:t>
+            </a:fld>
+            <a:endParaRPr lang="en-US"/>
+          </a:p>
+        </p:txBody>
+      </p:sp>
+      <p:sp>
+        <p:nvSpPr>
+          <p:cNvPr id="5" name="Slide Number Placeholder 4">
+            <a:extLst>
+              <a:ext uri="{FF2B5EF4-FFF2-40B4-BE49-F238E27FC236}">
+                <a16:creationId xmlns:a16="http://schemas.microsoft.com/office/drawing/2014/main" id="{F221DA01-AB1F-4ED2-5E80-3183C71AEAE6}"/>
+              </a:ext>
+            </a:extLst>
+          </p:cNvPr>
+          <p:cNvSpPr>
+            <a:spLocks noGrp="1"/>
+          </p:cNvSpPr>
+          <p:nvPr>
+            <p:ph type="sldNum" sz="quarter" idx="12"/>
+          </p:nvPr>
+        </p:nvSpPr>
+        <p:spPr/>
+        <p:txBody>
+          <a:bodyPr/>
+          <a:lstStyle/>
+          <a:p>
+            <a:fld id="{C1FF6DA9-008F-8B48-92A6-B652298478BF}" type="slidenum">
+              <a:rPr lang="en-US" smtClean="0"/>
+              <a:t>35</a:t>
+            </a:fld>
+            <a:endParaRPr lang="en-US"/>
+          </a:p>
+        </p:txBody>
+      </p:sp>
+      <p:sp>
+        <p:nvSpPr>
+          <p:cNvPr id="10" name="Content Placeholder 2">
+            <a:extLst>
+              <a:ext uri="{FF2B5EF4-FFF2-40B4-BE49-F238E27FC236}">
+                <a16:creationId xmlns:a16="http://schemas.microsoft.com/office/drawing/2014/main" id="{2BEDDF98-D9C6-1524-54B3-1604E3D9296D}"/>
+              </a:ext>
+            </a:extLst>
+          </p:cNvPr>
+          <p:cNvSpPr txBox="1">
+            <a:spLocks/>
+          </p:cNvSpPr>
+          <p:nvPr/>
+        </p:nvSpPr>
+        <p:spPr>
+          <a:xfrm>
+            <a:off x="4297680" y="1417638"/>
+            <a:ext cx="3840480" cy="1307274"/>
+          </a:xfrm>
+          <a:prstGeom prst="rect">
+            <a:avLst/>
+          </a:prstGeom>
+        </p:spPr>
+        <p:txBody>
+          <a:bodyPr vert="horz" lIns="91440" tIns="45720" rIns="91440" bIns="45720" rtlCol="0">
+            <a:normAutofit/>
+          </a:bodyPr>
+          <a:lstStyle>
+            <a:lvl1pPr marL="342900" indent="-342900" algn="l" defTabSz="457200" rtl="0" eaLnBrk="1" latinLnBrk="0" hangingPunct="1">
+              <a:spcBef>
+                <a:spcPct val="20000"/>
+              </a:spcBef>
+              <a:buFont typeface="Arial"/>
+              <a:buChar char="•"/>
+              <a:defRPr sz="3200" kern="1200">
+                <a:solidFill>
+                  <a:schemeClr val="tx1"/>
+                </a:solidFill>
+                <a:latin typeface="+mn-lt"/>
+                <a:ea typeface="+mn-ea"/>
+                <a:cs typeface="+mn-cs"/>
+              </a:defRPr>
+            </a:lvl1pPr>
+            <a:lvl2pPr marL="742950" indent="-285750" algn="l" defTabSz="457200" rtl="0" eaLnBrk="1" latinLnBrk="0" hangingPunct="1">
+              <a:spcBef>
+                <a:spcPct val="20000"/>
+              </a:spcBef>
+              <a:buFont typeface="Arial"/>
+              <a:buChar char="–"/>
+              <a:defRPr sz="2800" kern="1200">
+                <a:solidFill>
+                  <a:schemeClr val="tx1"/>
+                </a:solidFill>
+                <a:latin typeface="+mn-lt"/>
+                <a:ea typeface="+mn-ea"/>
+                <a:cs typeface="+mn-cs"/>
+              </a:defRPr>
+            </a:lvl2pPr>
+            <a:lvl3pPr marL="1143000" indent="-228600" algn="l" defTabSz="457200" rtl="0" eaLnBrk="1" latinLnBrk="0" hangingPunct="1">
+              <a:spcBef>
+                <a:spcPct val="20000"/>
+              </a:spcBef>
+              <a:buFont typeface="Arial"/>
+              <a:buChar char="•"/>
+              <a:defRPr sz="2400" kern="1200">
+                <a:solidFill>
+                  <a:schemeClr val="tx1"/>
+                </a:solidFill>
+                <a:latin typeface="+mn-lt"/>
+                <a:ea typeface="+mn-ea"/>
+                <a:cs typeface="+mn-cs"/>
+              </a:defRPr>
+            </a:lvl3pPr>
+            <a:lvl4pPr marL="1600200" indent="-228600" algn="l" defTabSz="457200" rtl="0" eaLnBrk="1" latinLnBrk="0" hangingPunct="1">
+              <a:spcBef>
+                <a:spcPct val="20000"/>
+              </a:spcBef>
+              <a:buFont typeface="Arial"/>
+              <a:buChar char="–"/>
+              <a:defRPr sz="2000" kern="1200">
+                <a:solidFill>
+                  <a:schemeClr val="tx1"/>
+                </a:solidFill>
+                <a:latin typeface="+mn-lt"/>
+                <a:ea typeface="+mn-ea"/>
+                <a:cs typeface="+mn-cs"/>
+              </a:defRPr>
+            </a:lvl4pPr>
+            <a:lvl5pPr marL="2057400" indent="-228600" algn="l" defTabSz="457200" rtl="0" eaLnBrk="1" latinLnBrk="0" hangingPunct="1">
+              <a:spcBef>
+                <a:spcPct val="20000"/>
+              </a:spcBef>
+              <a:buFont typeface="Arial"/>
+              <a:buChar char="»"/>
+              <a:defRPr sz="2000" kern="1200">
+                <a:solidFill>
+                  <a:schemeClr val="tx1"/>
+                </a:solidFill>
+                <a:latin typeface="+mn-lt"/>
+                <a:ea typeface="+mn-ea"/>
+                <a:cs typeface="+mn-cs"/>
+              </a:defRPr>
+            </a:lvl5pPr>
+            <a:lvl6pPr marL="2514600" indent="-228600" algn="l" defTabSz="457200" rtl="0" eaLnBrk="1" latinLnBrk="0" hangingPunct="1">
+              <a:spcBef>
+                <a:spcPct val="20000"/>
+              </a:spcBef>
+              <a:buFont typeface="Arial"/>
+              <a:buChar char="•"/>
+              <a:defRPr sz="2000" kern="1200">
+                <a:solidFill>
+                  <a:schemeClr val="tx1"/>
+                </a:solidFill>
+                <a:latin typeface="+mn-lt"/>
+                <a:ea typeface="+mn-ea"/>
+                <a:cs typeface="+mn-cs"/>
+              </a:defRPr>
+            </a:lvl6pPr>
+            <a:lvl7pPr marL="2971800" indent="-228600" algn="l" defTabSz="457200" rtl="0" eaLnBrk="1" latinLnBrk="0" hangingPunct="1">
+              <a:spcBef>
+                <a:spcPct val="20000"/>
+              </a:spcBef>
+              <a:buFont typeface="Arial"/>
+              <a:buChar char="•"/>
+              <a:defRPr sz="2000" kern="1200">
+                <a:solidFill>
+                  <a:schemeClr val="tx1"/>
+                </a:solidFill>
+                <a:latin typeface="+mn-lt"/>
+                <a:ea typeface="+mn-ea"/>
+                <a:cs typeface="+mn-cs"/>
+              </a:defRPr>
+            </a:lvl7pPr>
+            <a:lvl8pPr marL="3429000" indent="-228600" algn="l" defTabSz="457200" rtl="0" eaLnBrk="1" latinLnBrk="0" hangingPunct="1">
+              <a:spcBef>
+                <a:spcPct val="20000"/>
+              </a:spcBef>
+              <a:buFont typeface="Arial"/>
+              <a:buChar char="•"/>
+              <a:defRPr sz="2000" kern="1200">
+                <a:solidFill>
+                  <a:schemeClr val="tx1"/>
+                </a:solidFill>
+                <a:latin typeface="+mn-lt"/>
+                <a:ea typeface="+mn-ea"/>
+                <a:cs typeface="+mn-cs"/>
+              </a:defRPr>
+            </a:lvl8pPr>
+            <a:lvl9pPr marL="3886200" indent="-228600" algn="l" defTabSz="457200" rtl="0" eaLnBrk="1" latinLnBrk="0" hangingPunct="1">
+              <a:spcBef>
+                <a:spcPct val="20000"/>
+              </a:spcBef>
+              <a:buFont typeface="Arial"/>
+              <a:buChar char="•"/>
+              <a:defRPr sz="2000" kern="1200">
+                <a:solidFill>
+                  <a:schemeClr val="tx1"/>
+                </a:solidFill>
+                <a:latin typeface="+mn-lt"/>
+                <a:ea typeface="+mn-ea"/>
+                <a:cs typeface="+mn-cs"/>
+              </a:defRPr>
+            </a:lvl9pPr>
+          </a:lstStyle>
+          <a:p>
+            <a:endParaRPr lang="en-US" sz="1800" dirty="0"/>
+          </a:p>
+        </p:txBody>
+      </p:sp>
+      <p:pic>
+        <p:nvPicPr>
+          <p:cNvPr id="7" name="Picture 6">
+            <a:extLst>
+              <a:ext uri="{FF2B5EF4-FFF2-40B4-BE49-F238E27FC236}">
+                <a16:creationId xmlns:a16="http://schemas.microsoft.com/office/drawing/2014/main" id="{C0CF72EE-074B-70B6-8663-BF9EA4E09CE6}"/>
+              </a:ext>
+            </a:extLst>
+          </p:cNvPr>
+          <p:cNvPicPr>
+            <a:picLocks noChangeAspect="1"/>
+          </p:cNvPicPr>
+          <p:nvPr/>
+        </p:nvPicPr>
+        <p:blipFill>
+          <a:blip r:embed="rId2">
+            <a:alphaModFix amt="35000"/>
+          </a:blip>
+          <a:stretch>
+            <a:fillRect/>
+          </a:stretch>
+        </p:blipFill>
+        <p:spPr>
+          <a:xfrm>
+            <a:off x="1680488" y="3176568"/>
+            <a:ext cx="6201640" cy="3010320"/>
+          </a:xfrm>
+          <a:prstGeom prst="rect">
+            <a:avLst/>
+          </a:prstGeom>
+          <a:solidFill>
+            <a:schemeClr val="tx1"/>
+          </a:solidFill>
+        </p:spPr>
+      </p:pic>
+      <p:pic>
+        <p:nvPicPr>
+          <p:cNvPr id="9" name="Picture 8">
+            <a:extLst>
+              <a:ext uri="{FF2B5EF4-FFF2-40B4-BE49-F238E27FC236}">
+                <a16:creationId xmlns:a16="http://schemas.microsoft.com/office/drawing/2014/main" id="{6B7F8732-824A-1CDE-26AF-9979BF4B54EE}"/>
+              </a:ext>
+            </a:extLst>
+          </p:cNvPr>
+          <p:cNvPicPr>
+            <a:picLocks noChangeAspect="1"/>
+          </p:cNvPicPr>
+          <p:nvPr/>
+        </p:nvPicPr>
+        <p:blipFill>
+          <a:blip r:embed="rId2"/>
+          <a:srcRect l="43529" t="19322" r="39220" b="47873"/>
+          <a:stretch>
+            <a:fillRect/>
+          </a:stretch>
+        </p:blipFill>
+        <p:spPr>
+          <a:xfrm>
+            <a:off x="4379976" y="3758184"/>
+            <a:ext cx="1069848" cy="987552"/>
+          </a:xfrm>
+          <a:prstGeom prst="ellipse">
+            <a:avLst/>
+          </a:prstGeom>
+        </p:spPr>
+      </p:pic>
+    </p:spTree>
+    <p:extLst>
+      <p:ext uri="{BB962C8B-B14F-4D97-AF65-F5344CB8AC3E}">
+        <p14:creationId xmlns:p14="http://schemas.microsoft.com/office/powerpoint/2010/main" val="973057944"/>
+      </p:ext>
+    </p:extLst>
+  </p:cSld>
+  <p:clrMapOvr>
+    <a:masterClrMapping/>
+  </p:clrMapOvr>
+</p:sld>
+</file>
+
+<file path=ppt/slides/slide36.xml><?xml version="1.0" encoding="utf-8"?>
+<p:sld xmlns:a="http://schemas.openxmlformats.org/drawingml/2006/main" xmlns:r="http://schemas.openxmlformats.org/officeDocument/2006/relationships" xmlns:p="http://schemas.openxmlformats.org/presentationml/2006/main">
+  <p:cSld>
+    <p:spTree>
+      <p:nvGrpSpPr>
+        <p:cNvPr id="1" name="">
+          <a:extLst>
+            <a:ext uri="{FF2B5EF4-FFF2-40B4-BE49-F238E27FC236}">
+              <a16:creationId xmlns:a16="http://schemas.microsoft.com/office/drawing/2014/main" id="{9BE617C5-9C9D-F693-6EF4-8C1ADD69BCE8}"/>
+            </a:ext>
+          </a:extLst>
+        </p:cNvPr>
+        <p:cNvGrpSpPr/>
+        <p:nvPr/>
+      </p:nvGrpSpPr>
+      <p:grpSpPr>
+        <a:xfrm>
+          <a:off x="0" y="0"/>
+          <a:ext cx="0" cy="0"/>
+          <a:chOff x="0" y="0"/>
+          <a:chExt cx="0" cy="0"/>
+        </a:xfrm>
+      </p:grpSpPr>
+      <p:sp>
+        <p:nvSpPr>
+          <p:cNvPr id="2" name="Title 1">
+            <a:extLst>
+              <a:ext uri="{FF2B5EF4-FFF2-40B4-BE49-F238E27FC236}">
+                <a16:creationId xmlns:a16="http://schemas.microsoft.com/office/drawing/2014/main" id="{BE094785-259A-7159-1AD2-7994A70A2A04}"/>
+              </a:ext>
+            </a:extLst>
+          </p:cNvPr>
+          <p:cNvSpPr>
+            <a:spLocks noGrp="1"/>
+          </p:cNvSpPr>
+          <p:nvPr>
+            <p:ph type="title"/>
+          </p:nvPr>
+        </p:nvSpPr>
+        <p:spPr/>
+        <p:txBody>
+          <a:bodyPr>
+            <a:normAutofit fontScale="90000"/>
+          </a:bodyPr>
+          <a:lstStyle/>
+          <a:p>
+            <a:r>
+              <a:rPr lang="en-US" dirty="0"/>
+              <a:t>Period Highlight – 13</a:t>
+            </a:r>
+            <a:br>
+              <a:rPr lang="en-US" dirty="0"/>
+            </a:br>
+            <a:r>
+              <a:rPr lang="en-US" sz="3200" dirty="0"/>
+              <a:t>Software Progress</a:t>
+            </a:r>
+            <a:endParaRPr lang="en-US" dirty="0"/>
+          </a:p>
+        </p:txBody>
+      </p:sp>
+      <p:sp>
+        <p:nvSpPr>
+          <p:cNvPr id="3" name="Content Placeholder 2">
+            <a:extLst>
+              <a:ext uri="{FF2B5EF4-FFF2-40B4-BE49-F238E27FC236}">
+                <a16:creationId xmlns:a16="http://schemas.microsoft.com/office/drawing/2014/main" id="{CDE84BA9-88A7-B0FC-A440-4ECD51F3103A}"/>
+              </a:ext>
+            </a:extLst>
+          </p:cNvPr>
+          <p:cNvSpPr>
+            <a:spLocks noGrp="1"/>
+          </p:cNvSpPr>
+          <p:nvPr>
+            <p:ph idx="1"/>
+          </p:nvPr>
+        </p:nvSpPr>
+        <p:spPr>
+          <a:xfrm>
+            <a:off x="2651760" y="1413747"/>
+            <a:ext cx="3840480" cy="1307274"/>
+          </a:xfrm>
+        </p:spPr>
+        <p:txBody>
+          <a:bodyPr>
+            <a:normAutofit/>
+          </a:bodyPr>
+          <a:lstStyle/>
+          <a:p>
+            <a:r>
+              <a:rPr lang="en-US" sz="1800" dirty="0"/>
+              <a:t>Static vs Moving Objects</a:t>
+            </a:r>
+          </a:p>
+          <a:p>
+            <a:r>
+              <a:rPr lang="en-US" sz="1800" dirty="0"/>
+              <a:t>Not in scope but it can be refined.</a:t>
+            </a:r>
+          </a:p>
+          <a:p>
+            <a:pPr lvl="1"/>
+            <a:r>
+              <a:rPr lang="en-US" sz="1000" dirty="0"/>
+              <a:t>Improve RANSAC logic now that 2 sensors are incorporated to filter out moving objects, even at low speed.</a:t>
+            </a:r>
+          </a:p>
+          <a:p>
+            <a:endParaRPr lang="en-US" sz="1800" dirty="0"/>
+          </a:p>
+          <a:p>
+            <a:endParaRPr lang="en-US" sz="1800" dirty="0"/>
+          </a:p>
+        </p:txBody>
+      </p:sp>
+      <p:sp>
+        <p:nvSpPr>
+          <p:cNvPr id="4" name="Date Placeholder 3">
+            <a:extLst>
+              <a:ext uri="{FF2B5EF4-FFF2-40B4-BE49-F238E27FC236}">
+                <a16:creationId xmlns:a16="http://schemas.microsoft.com/office/drawing/2014/main" id="{61399DF9-00FB-347E-A7F0-94B10DD7866D}"/>
+              </a:ext>
+            </a:extLst>
+          </p:cNvPr>
+          <p:cNvSpPr>
+            <a:spLocks noGrp="1"/>
+          </p:cNvSpPr>
+          <p:nvPr>
+            <p:ph type="dt" sz="half" idx="10"/>
+          </p:nvPr>
+        </p:nvSpPr>
+        <p:spPr/>
+        <p:txBody>
+          <a:bodyPr/>
+          <a:lstStyle/>
+          <a:p>
+            <a:fld id="{0EFBEC3F-4208-4590-BA97-4119A385DFD9}" type="datetime1">
+              <a:rPr lang="en-US" smtClean="0"/>
+              <a:t>9/7/2025</a:t>
+            </a:fld>
+            <a:endParaRPr lang="en-US"/>
+          </a:p>
+        </p:txBody>
+      </p:sp>
+      <p:sp>
+        <p:nvSpPr>
+          <p:cNvPr id="5" name="Slide Number Placeholder 4">
+            <a:extLst>
+              <a:ext uri="{FF2B5EF4-FFF2-40B4-BE49-F238E27FC236}">
+                <a16:creationId xmlns:a16="http://schemas.microsoft.com/office/drawing/2014/main" id="{428C0D8D-DD47-765E-B2A9-E3E92453CE6B}"/>
+              </a:ext>
+            </a:extLst>
+          </p:cNvPr>
+          <p:cNvSpPr>
+            <a:spLocks noGrp="1"/>
+          </p:cNvSpPr>
+          <p:nvPr>
+            <p:ph type="sldNum" sz="quarter" idx="12"/>
+          </p:nvPr>
+        </p:nvSpPr>
+        <p:spPr/>
+        <p:txBody>
+          <a:bodyPr/>
+          <a:lstStyle/>
+          <a:p>
+            <a:fld id="{C1FF6DA9-008F-8B48-92A6-B652298478BF}" type="slidenum">
+              <a:rPr lang="en-US" smtClean="0"/>
+              <a:t>36</a:t>
+            </a:fld>
+            <a:endParaRPr lang="en-US"/>
+          </a:p>
+        </p:txBody>
+      </p:sp>
+      <p:sp>
+        <p:nvSpPr>
+          <p:cNvPr id="10" name="Content Placeholder 2">
+            <a:extLst>
+              <a:ext uri="{FF2B5EF4-FFF2-40B4-BE49-F238E27FC236}">
+                <a16:creationId xmlns:a16="http://schemas.microsoft.com/office/drawing/2014/main" id="{C0FA9A61-220D-3095-39AF-4301F33C24A8}"/>
+              </a:ext>
+            </a:extLst>
+          </p:cNvPr>
+          <p:cNvSpPr txBox="1">
+            <a:spLocks/>
+          </p:cNvSpPr>
+          <p:nvPr/>
+        </p:nvSpPr>
+        <p:spPr>
+          <a:xfrm>
+            <a:off x="4297680" y="1417638"/>
+            <a:ext cx="3840480" cy="1307274"/>
+          </a:xfrm>
+          <a:prstGeom prst="rect">
+            <a:avLst/>
+          </a:prstGeom>
+        </p:spPr>
+        <p:txBody>
+          <a:bodyPr vert="horz" lIns="91440" tIns="45720" rIns="91440" bIns="45720" rtlCol="0">
+            <a:normAutofit/>
+          </a:bodyPr>
+          <a:lstStyle>
+            <a:lvl1pPr marL="342900" indent="-342900" algn="l" defTabSz="457200" rtl="0" eaLnBrk="1" latinLnBrk="0" hangingPunct="1">
+              <a:spcBef>
+                <a:spcPct val="20000"/>
+              </a:spcBef>
+              <a:buFont typeface="Arial"/>
+              <a:buChar char="•"/>
+              <a:defRPr sz="3200" kern="1200">
+                <a:solidFill>
+                  <a:schemeClr val="tx1"/>
+                </a:solidFill>
+                <a:latin typeface="+mn-lt"/>
+                <a:ea typeface="+mn-ea"/>
+                <a:cs typeface="+mn-cs"/>
+              </a:defRPr>
+            </a:lvl1pPr>
+            <a:lvl2pPr marL="742950" indent="-285750" algn="l" defTabSz="457200" rtl="0" eaLnBrk="1" latinLnBrk="0" hangingPunct="1">
+              <a:spcBef>
+                <a:spcPct val="20000"/>
+              </a:spcBef>
+              <a:buFont typeface="Arial"/>
+              <a:buChar char="–"/>
+              <a:defRPr sz="2800" kern="1200">
+                <a:solidFill>
+                  <a:schemeClr val="tx1"/>
+                </a:solidFill>
+                <a:latin typeface="+mn-lt"/>
+                <a:ea typeface="+mn-ea"/>
+                <a:cs typeface="+mn-cs"/>
+              </a:defRPr>
+            </a:lvl2pPr>
+            <a:lvl3pPr marL="1143000" indent="-228600" algn="l" defTabSz="457200" rtl="0" eaLnBrk="1" latinLnBrk="0" hangingPunct="1">
+              <a:spcBef>
+                <a:spcPct val="20000"/>
+              </a:spcBef>
+              <a:buFont typeface="Arial"/>
+              <a:buChar char="•"/>
+              <a:defRPr sz="2400" kern="1200">
+                <a:solidFill>
+                  <a:schemeClr val="tx1"/>
+                </a:solidFill>
+                <a:latin typeface="+mn-lt"/>
+                <a:ea typeface="+mn-ea"/>
+                <a:cs typeface="+mn-cs"/>
+              </a:defRPr>
+            </a:lvl3pPr>
+            <a:lvl4pPr marL="1600200" indent="-228600" algn="l" defTabSz="457200" rtl="0" eaLnBrk="1" latinLnBrk="0" hangingPunct="1">
+              <a:spcBef>
+                <a:spcPct val="20000"/>
+              </a:spcBef>
+              <a:buFont typeface="Arial"/>
+              <a:buChar char="–"/>
+              <a:defRPr sz="2000" kern="1200">
+                <a:solidFill>
+                  <a:schemeClr val="tx1"/>
+                </a:solidFill>
+                <a:latin typeface="+mn-lt"/>
+                <a:ea typeface="+mn-ea"/>
+                <a:cs typeface="+mn-cs"/>
+              </a:defRPr>
+            </a:lvl4pPr>
+            <a:lvl5pPr marL="2057400" indent="-228600" algn="l" defTabSz="457200" rtl="0" eaLnBrk="1" latinLnBrk="0" hangingPunct="1">
+              <a:spcBef>
+                <a:spcPct val="20000"/>
+              </a:spcBef>
+              <a:buFont typeface="Arial"/>
+              <a:buChar char="»"/>
+              <a:defRPr sz="2000" kern="1200">
+                <a:solidFill>
+                  <a:schemeClr val="tx1"/>
+                </a:solidFill>
+                <a:latin typeface="+mn-lt"/>
+                <a:ea typeface="+mn-ea"/>
+                <a:cs typeface="+mn-cs"/>
+              </a:defRPr>
+            </a:lvl5pPr>
+            <a:lvl6pPr marL="2514600" indent="-228600" algn="l" defTabSz="457200" rtl="0" eaLnBrk="1" latinLnBrk="0" hangingPunct="1">
+              <a:spcBef>
+                <a:spcPct val="20000"/>
+              </a:spcBef>
+              <a:buFont typeface="Arial"/>
+              <a:buChar char="•"/>
+              <a:defRPr sz="2000" kern="1200">
+                <a:solidFill>
+                  <a:schemeClr val="tx1"/>
+                </a:solidFill>
+                <a:latin typeface="+mn-lt"/>
+                <a:ea typeface="+mn-ea"/>
+                <a:cs typeface="+mn-cs"/>
+              </a:defRPr>
+            </a:lvl6pPr>
+            <a:lvl7pPr marL="2971800" indent="-228600" algn="l" defTabSz="457200" rtl="0" eaLnBrk="1" latinLnBrk="0" hangingPunct="1">
+              <a:spcBef>
+                <a:spcPct val="20000"/>
+              </a:spcBef>
+              <a:buFont typeface="Arial"/>
+              <a:buChar char="•"/>
+              <a:defRPr sz="2000" kern="1200">
+                <a:solidFill>
+                  <a:schemeClr val="tx1"/>
+                </a:solidFill>
+                <a:latin typeface="+mn-lt"/>
+                <a:ea typeface="+mn-ea"/>
+                <a:cs typeface="+mn-cs"/>
+              </a:defRPr>
+            </a:lvl7pPr>
+            <a:lvl8pPr marL="3429000" indent="-228600" algn="l" defTabSz="457200" rtl="0" eaLnBrk="1" latinLnBrk="0" hangingPunct="1">
+              <a:spcBef>
+                <a:spcPct val="20000"/>
+              </a:spcBef>
+              <a:buFont typeface="Arial"/>
+              <a:buChar char="•"/>
+              <a:defRPr sz="2000" kern="1200">
+                <a:solidFill>
+                  <a:schemeClr val="tx1"/>
+                </a:solidFill>
+                <a:latin typeface="+mn-lt"/>
+                <a:ea typeface="+mn-ea"/>
+                <a:cs typeface="+mn-cs"/>
+              </a:defRPr>
+            </a:lvl8pPr>
+            <a:lvl9pPr marL="3886200" indent="-228600" algn="l" defTabSz="457200" rtl="0" eaLnBrk="1" latinLnBrk="0" hangingPunct="1">
+              <a:spcBef>
+                <a:spcPct val="20000"/>
+              </a:spcBef>
+              <a:buFont typeface="Arial"/>
+              <a:buChar char="•"/>
+              <a:defRPr sz="2000" kern="1200">
+                <a:solidFill>
+                  <a:schemeClr val="tx1"/>
+                </a:solidFill>
+                <a:latin typeface="+mn-lt"/>
+                <a:ea typeface="+mn-ea"/>
+                <a:cs typeface="+mn-cs"/>
+              </a:defRPr>
+            </a:lvl9pPr>
+          </a:lstStyle>
+          <a:p>
+            <a:endParaRPr lang="en-US" sz="1800" dirty="0"/>
+          </a:p>
+        </p:txBody>
+      </p:sp>
+      <p:pic>
+        <p:nvPicPr>
+          <p:cNvPr id="8" name="Picture 7">
+            <a:extLst>
+              <a:ext uri="{FF2B5EF4-FFF2-40B4-BE49-F238E27FC236}">
+                <a16:creationId xmlns:a16="http://schemas.microsoft.com/office/drawing/2014/main" id="{C4A66AD1-CDBD-8D7E-D977-73E0D41F4C88}"/>
+              </a:ext>
+            </a:extLst>
+          </p:cNvPr>
+          <p:cNvPicPr>
+            <a:picLocks noChangeAspect="1"/>
+          </p:cNvPicPr>
+          <p:nvPr/>
+        </p:nvPicPr>
+        <p:blipFill>
+          <a:blip r:embed="rId2">
+            <a:alphaModFix amt="35000"/>
+          </a:blip>
+          <a:stretch>
+            <a:fillRect/>
+          </a:stretch>
+        </p:blipFill>
+        <p:spPr>
+          <a:xfrm>
+            <a:off x="450850" y="3096390"/>
+            <a:ext cx="3572374" cy="2676899"/>
+          </a:xfrm>
+          <a:prstGeom prst="rect">
+            <a:avLst/>
+          </a:prstGeom>
+          <a:solidFill>
+            <a:schemeClr val="tx1"/>
+          </a:solidFill>
+        </p:spPr>
+      </p:pic>
+      <p:pic>
+        <p:nvPicPr>
+          <p:cNvPr id="12" name="Picture 11">
+            <a:extLst>
+              <a:ext uri="{FF2B5EF4-FFF2-40B4-BE49-F238E27FC236}">
+                <a16:creationId xmlns:a16="http://schemas.microsoft.com/office/drawing/2014/main" id="{DEF9E92E-BBD8-2A92-EE4D-11BBFDAB0349}"/>
+              </a:ext>
+            </a:extLst>
+          </p:cNvPr>
+          <p:cNvPicPr>
+            <a:picLocks noChangeAspect="1"/>
+          </p:cNvPicPr>
+          <p:nvPr/>
+        </p:nvPicPr>
+        <p:blipFill>
+          <a:blip r:embed="rId3">
+            <a:alphaModFix amt="35000"/>
+          </a:blip>
+          <a:stretch>
+            <a:fillRect/>
+          </a:stretch>
+        </p:blipFill>
+        <p:spPr>
+          <a:xfrm>
+            <a:off x="4676502" y="3096390"/>
+            <a:ext cx="3905795" cy="2610214"/>
+          </a:xfrm>
+          <a:prstGeom prst="rect">
+            <a:avLst/>
+          </a:prstGeom>
+          <a:solidFill>
+            <a:schemeClr val="tx1"/>
+          </a:solidFill>
+        </p:spPr>
+      </p:pic>
+      <p:pic>
+        <p:nvPicPr>
+          <p:cNvPr id="13" name="Picture 12">
+            <a:extLst>
+              <a:ext uri="{FF2B5EF4-FFF2-40B4-BE49-F238E27FC236}">
+                <a16:creationId xmlns:a16="http://schemas.microsoft.com/office/drawing/2014/main" id="{BF787677-4A59-67CE-5396-49A1111E2697}"/>
+              </a:ext>
+            </a:extLst>
+          </p:cNvPr>
+          <p:cNvPicPr>
+            <a:picLocks noChangeAspect="1"/>
+          </p:cNvPicPr>
+          <p:nvPr/>
+        </p:nvPicPr>
+        <p:blipFill>
+          <a:blip r:embed="rId2"/>
+          <a:srcRect l="54697" t="37702" r="15098" b="23699"/>
+          <a:stretch>
+            <a:fillRect/>
+          </a:stretch>
+        </p:blipFill>
+        <p:spPr>
+          <a:xfrm>
+            <a:off x="2404872" y="4105655"/>
+            <a:ext cx="1078992" cy="1033273"/>
+          </a:xfrm>
+          <a:prstGeom prst="ellipse">
+            <a:avLst/>
+          </a:prstGeom>
+        </p:spPr>
+      </p:pic>
+      <p:pic>
+        <p:nvPicPr>
+          <p:cNvPr id="15" name="Picture 14">
+            <a:extLst>
+              <a:ext uri="{FF2B5EF4-FFF2-40B4-BE49-F238E27FC236}">
+                <a16:creationId xmlns:a16="http://schemas.microsoft.com/office/drawing/2014/main" id="{585435FB-32A9-30E5-08AF-F421B26ED451}"/>
+              </a:ext>
+            </a:extLst>
+          </p:cNvPr>
+          <p:cNvPicPr>
+            <a:picLocks noChangeAspect="1"/>
+          </p:cNvPicPr>
+          <p:nvPr/>
+        </p:nvPicPr>
+        <p:blipFill>
+          <a:blip r:embed="rId3"/>
+          <a:srcRect l="53980" t="46023" r="24013" b="28054"/>
+          <a:stretch>
+            <a:fillRect/>
+          </a:stretch>
+        </p:blipFill>
+        <p:spPr>
+          <a:xfrm>
+            <a:off x="6784848" y="4297680"/>
+            <a:ext cx="859536" cy="676656"/>
+          </a:xfrm>
+          <a:prstGeom prst="ellipse">
+            <a:avLst/>
+          </a:prstGeom>
+        </p:spPr>
+      </p:pic>
+    </p:spTree>
+    <p:extLst>
+      <p:ext uri="{BB962C8B-B14F-4D97-AF65-F5344CB8AC3E}">
+        <p14:creationId xmlns:p14="http://schemas.microsoft.com/office/powerpoint/2010/main" val="3208002025"/>
+      </p:ext>
+    </p:extLst>
+  </p:cSld>
+  <p:clrMapOvr>
+    <a:masterClrMapping/>
+  </p:clrMapOvr>
+</p:sld>
+</file>
+
+<file path=ppt/slides/slide37.xml><?xml version="1.0" encoding="utf-8"?>
+<p:sld xmlns:a="http://schemas.openxmlformats.org/drawingml/2006/main" xmlns:r="http://schemas.openxmlformats.org/officeDocument/2006/relationships" xmlns:p="http://schemas.openxmlformats.org/presentationml/2006/main">
+  <p:cSld>
+    <p:spTree>
+      <p:nvGrpSpPr>
+        <p:cNvPr id="1" name="">
+          <a:extLst>
+            <a:ext uri="{FF2B5EF4-FFF2-40B4-BE49-F238E27FC236}">
+              <a16:creationId xmlns:a16="http://schemas.microsoft.com/office/drawing/2014/main" id="{880DC97C-27E4-BF74-D516-296A7C6D2361}"/>
+            </a:ext>
+          </a:extLst>
+        </p:cNvPr>
+        <p:cNvGrpSpPr/>
+        <p:nvPr/>
+      </p:nvGrpSpPr>
+      <p:grpSpPr>
+        <a:xfrm>
+          <a:off x="0" y="0"/>
+          <a:ext cx="0" cy="0"/>
+          <a:chOff x="0" y="0"/>
+          <a:chExt cx="0" cy="0"/>
+        </a:xfrm>
+      </p:grpSpPr>
+      <p:sp>
+        <p:nvSpPr>
+          <p:cNvPr id="2" name="Title 1">
+            <a:extLst>
+              <a:ext uri="{FF2B5EF4-FFF2-40B4-BE49-F238E27FC236}">
+                <a16:creationId xmlns:a16="http://schemas.microsoft.com/office/drawing/2014/main" id="{1CC1629E-1B90-456E-8D93-FBCA027CEBAB}"/>
+              </a:ext>
+            </a:extLst>
+          </p:cNvPr>
+          <p:cNvSpPr>
+            <a:spLocks noGrp="1"/>
+          </p:cNvSpPr>
+          <p:nvPr>
+            <p:ph type="title"/>
+          </p:nvPr>
+        </p:nvSpPr>
+        <p:spPr/>
+        <p:txBody>
+          <a:bodyPr>
+            <a:normAutofit fontScale="90000"/>
+          </a:bodyPr>
+          <a:lstStyle/>
+          <a:p>
+            <a:r>
+              <a:rPr lang="en-US" dirty="0"/>
+              <a:t>Period Highlight – 13</a:t>
+            </a:r>
+            <a:br>
+              <a:rPr lang="en-US" dirty="0"/>
+            </a:br>
+            <a:r>
+              <a:rPr lang="en-US" sz="3200" dirty="0"/>
+              <a:t>First result analysis</a:t>
+            </a:r>
+            <a:endParaRPr lang="en-US" dirty="0"/>
+          </a:p>
+        </p:txBody>
+      </p:sp>
+      <p:sp>
+        <p:nvSpPr>
+          <p:cNvPr id="3" name="Content Placeholder 2">
+            <a:extLst>
+              <a:ext uri="{FF2B5EF4-FFF2-40B4-BE49-F238E27FC236}">
+                <a16:creationId xmlns:a16="http://schemas.microsoft.com/office/drawing/2014/main" id="{BC3B1AE7-2FFF-EC28-0F82-5BD881A0CE45}"/>
+              </a:ext>
+            </a:extLst>
+          </p:cNvPr>
+          <p:cNvSpPr>
+            <a:spLocks noGrp="1"/>
+          </p:cNvSpPr>
+          <p:nvPr>
+            <p:ph idx="1"/>
+          </p:nvPr>
+        </p:nvSpPr>
+        <p:spPr>
+          <a:xfrm>
+            <a:off x="457200" y="1417638"/>
+            <a:ext cx="3840480" cy="1307274"/>
+          </a:xfrm>
+        </p:spPr>
+        <p:txBody>
+          <a:bodyPr>
+            <a:normAutofit fontScale="85000" lnSpcReduction="20000"/>
+          </a:bodyPr>
+          <a:lstStyle/>
+          <a:p>
+            <a:r>
+              <a:rPr lang="en-US" sz="1800" dirty="0"/>
+              <a:t>The Odometry and traction of the displacement is smoother using the whole point cloud.</a:t>
+            </a:r>
+          </a:p>
+          <a:p>
+            <a:r>
+              <a:rPr lang="en-US" sz="1800" dirty="0"/>
+              <a:t>However this can end with a lot of noise, meaning false targets since no post processing has been done.</a:t>
+            </a:r>
+            <a:endParaRPr lang="en-US" sz="1000" dirty="0"/>
+          </a:p>
+          <a:p>
+            <a:endParaRPr lang="en-US" sz="1800" dirty="0"/>
+          </a:p>
+          <a:p>
+            <a:endParaRPr lang="en-US" sz="1800" dirty="0"/>
+          </a:p>
+        </p:txBody>
+      </p:sp>
+      <p:sp>
+        <p:nvSpPr>
+          <p:cNvPr id="4" name="Date Placeholder 3">
+            <a:extLst>
+              <a:ext uri="{FF2B5EF4-FFF2-40B4-BE49-F238E27FC236}">
+                <a16:creationId xmlns:a16="http://schemas.microsoft.com/office/drawing/2014/main" id="{6C907518-80CD-B3DC-D5BA-CF12BC69580D}"/>
+              </a:ext>
+            </a:extLst>
+          </p:cNvPr>
+          <p:cNvSpPr>
+            <a:spLocks noGrp="1"/>
+          </p:cNvSpPr>
+          <p:nvPr>
+            <p:ph type="dt" sz="half" idx="10"/>
+          </p:nvPr>
+        </p:nvSpPr>
+        <p:spPr/>
+        <p:txBody>
+          <a:bodyPr/>
+          <a:lstStyle/>
+          <a:p>
+            <a:fld id="{0EFBEC3F-4208-4590-BA97-4119A385DFD9}" type="datetime1">
+              <a:rPr lang="en-US" smtClean="0"/>
+              <a:t>9/7/2025</a:t>
+            </a:fld>
+            <a:endParaRPr lang="en-US"/>
+          </a:p>
+        </p:txBody>
+      </p:sp>
+      <p:sp>
+        <p:nvSpPr>
+          <p:cNvPr id="5" name="Slide Number Placeholder 4">
+            <a:extLst>
+              <a:ext uri="{FF2B5EF4-FFF2-40B4-BE49-F238E27FC236}">
+                <a16:creationId xmlns:a16="http://schemas.microsoft.com/office/drawing/2014/main" id="{3E77936D-AF0C-54DB-5C5A-61670E40A31F}"/>
+              </a:ext>
+            </a:extLst>
+          </p:cNvPr>
+          <p:cNvSpPr>
+            <a:spLocks noGrp="1"/>
+          </p:cNvSpPr>
+          <p:nvPr>
+            <p:ph type="sldNum" sz="quarter" idx="12"/>
+          </p:nvPr>
+        </p:nvSpPr>
+        <p:spPr/>
+        <p:txBody>
+          <a:bodyPr/>
+          <a:lstStyle/>
+          <a:p>
+            <a:fld id="{C1FF6DA9-008F-8B48-92A6-B652298478BF}" type="slidenum">
+              <a:rPr lang="en-US" smtClean="0"/>
+              <a:t>37</a:t>
+            </a:fld>
+            <a:endParaRPr lang="en-US"/>
+          </a:p>
+        </p:txBody>
+      </p:sp>
+      <p:sp>
+        <p:nvSpPr>
+          <p:cNvPr id="10" name="Content Placeholder 2">
+            <a:extLst>
+              <a:ext uri="{FF2B5EF4-FFF2-40B4-BE49-F238E27FC236}">
+                <a16:creationId xmlns:a16="http://schemas.microsoft.com/office/drawing/2014/main" id="{7B78ED62-848F-5B63-4FB9-9052C80380A4}"/>
+              </a:ext>
+            </a:extLst>
+          </p:cNvPr>
+          <p:cNvSpPr txBox="1">
+            <a:spLocks/>
+          </p:cNvSpPr>
+          <p:nvPr/>
+        </p:nvSpPr>
+        <p:spPr>
+          <a:xfrm>
+            <a:off x="4297680" y="1417638"/>
+            <a:ext cx="3840480" cy="1307274"/>
+          </a:xfrm>
+          <a:prstGeom prst="rect">
+            <a:avLst/>
+          </a:prstGeom>
+        </p:spPr>
+        <p:txBody>
+          <a:bodyPr vert="horz" lIns="91440" tIns="45720" rIns="91440" bIns="45720" rtlCol="0">
+            <a:normAutofit/>
+          </a:bodyPr>
+          <a:lstStyle>
+            <a:lvl1pPr marL="342900" indent="-342900" algn="l" defTabSz="457200" rtl="0" eaLnBrk="1" latinLnBrk="0" hangingPunct="1">
+              <a:spcBef>
+                <a:spcPct val="20000"/>
+              </a:spcBef>
+              <a:buFont typeface="Arial"/>
+              <a:buChar char="•"/>
+              <a:defRPr sz="3200" kern="1200">
+                <a:solidFill>
+                  <a:schemeClr val="tx1"/>
+                </a:solidFill>
+                <a:latin typeface="+mn-lt"/>
+                <a:ea typeface="+mn-ea"/>
+                <a:cs typeface="+mn-cs"/>
+              </a:defRPr>
+            </a:lvl1pPr>
+            <a:lvl2pPr marL="742950" indent="-285750" algn="l" defTabSz="457200" rtl="0" eaLnBrk="1" latinLnBrk="0" hangingPunct="1">
+              <a:spcBef>
+                <a:spcPct val="20000"/>
+              </a:spcBef>
+              <a:buFont typeface="Arial"/>
+              <a:buChar char="–"/>
+              <a:defRPr sz="2800" kern="1200">
+                <a:solidFill>
+                  <a:schemeClr val="tx1"/>
+                </a:solidFill>
+                <a:latin typeface="+mn-lt"/>
+                <a:ea typeface="+mn-ea"/>
+                <a:cs typeface="+mn-cs"/>
+              </a:defRPr>
+            </a:lvl2pPr>
+            <a:lvl3pPr marL="1143000" indent="-228600" algn="l" defTabSz="457200" rtl="0" eaLnBrk="1" latinLnBrk="0" hangingPunct="1">
+              <a:spcBef>
+                <a:spcPct val="20000"/>
+              </a:spcBef>
+              <a:buFont typeface="Arial"/>
+              <a:buChar char="•"/>
+              <a:defRPr sz="2400" kern="1200">
+                <a:solidFill>
+                  <a:schemeClr val="tx1"/>
+                </a:solidFill>
+                <a:latin typeface="+mn-lt"/>
+                <a:ea typeface="+mn-ea"/>
+                <a:cs typeface="+mn-cs"/>
+              </a:defRPr>
+            </a:lvl3pPr>
+            <a:lvl4pPr marL="1600200" indent="-228600" algn="l" defTabSz="457200" rtl="0" eaLnBrk="1" latinLnBrk="0" hangingPunct="1">
+              <a:spcBef>
+                <a:spcPct val="20000"/>
+              </a:spcBef>
+              <a:buFont typeface="Arial"/>
+              <a:buChar char="–"/>
+              <a:defRPr sz="2000" kern="1200">
+                <a:solidFill>
+                  <a:schemeClr val="tx1"/>
+                </a:solidFill>
+                <a:latin typeface="+mn-lt"/>
+                <a:ea typeface="+mn-ea"/>
+                <a:cs typeface="+mn-cs"/>
+              </a:defRPr>
+            </a:lvl4pPr>
+            <a:lvl5pPr marL="2057400" indent="-228600" algn="l" defTabSz="457200" rtl="0" eaLnBrk="1" latinLnBrk="0" hangingPunct="1">
+              <a:spcBef>
+                <a:spcPct val="20000"/>
+              </a:spcBef>
+              <a:buFont typeface="Arial"/>
+              <a:buChar char="»"/>
+              <a:defRPr sz="2000" kern="1200">
+                <a:solidFill>
+                  <a:schemeClr val="tx1"/>
+                </a:solidFill>
+                <a:latin typeface="+mn-lt"/>
+                <a:ea typeface="+mn-ea"/>
+                <a:cs typeface="+mn-cs"/>
+              </a:defRPr>
+            </a:lvl5pPr>
+            <a:lvl6pPr marL="2514600" indent="-228600" algn="l" defTabSz="457200" rtl="0" eaLnBrk="1" latinLnBrk="0" hangingPunct="1">
+              <a:spcBef>
+                <a:spcPct val="20000"/>
+              </a:spcBef>
+              <a:buFont typeface="Arial"/>
+              <a:buChar char="•"/>
+              <a:defRPr sz="2000" kern="1200">
+                <a:solidFill>
+                  <a:schemeClr val="tx1"/>
+                </a:solidFill>
+                <a:latin typeface="+mn-lt"/>
+                <a:ea typeface="+mn-ea"/>
+                <a:cs typeface="+mn-cs"/>
+              </a:defRPr>
+            </a:lvl6pPr>
+            <a:lvl7pPr marL="2971800" indent="-228600" algn="l" defTabSz="457200" rtl="0" eaLnBrk="1" latinLnBrk="0" hangingPunct="1">
+              <a:spcBef>
+                <a:spcPct val="20000"/>
+              </a:spcBef>
+              <a:buFont typeface="Arial"/>
+              <a:buChar char="•"/>
+              <a:defRPr sz="2000" kern="1200">
+                <a:solidFill>
+                  <a:schemeClr val="tx1"/>
+                </a:solidFill>
+                <a:latin typeface="+mn-lt"/>
+                <a:ea typeface="+mn-ea"/>
+                <a:cs typeface="+mn-cs"/>
+              </a:defRPr>
+            </a:lvl7pPr>
+            <a:lvl8pPr marL="3429000" indent="-228600" algn="l" defTabSz="457200" rtl="0" eaLnBrk="1" latinLnBrk="0" hangingPunct="1">
+              <a:spcBef>
+                <a:spcPct val="20000"/>
+              </a:spcBef>
+              <a:buFont typeface="Arial"/>
+              <a:buChar char="•"/>
+              <a:defRPr sz="2000" kern="1200">
+                <a:solidFill>
+                  <a:schemeClr val="tx1"/>
+                </a:solidFill>
+                <a:latin typeface="+mn-lt"/>
+                <a:ea typeface="+mn-ea"/>
+                <a:cs typeface="+mn-cs"/>
+              </a:defRPr>
+            </a:lvl8pPr>
+            <a:lvl9pPr marL="3886200" indent="-228600" algn="l" defTabSz="457200" rtl="0" eaLnBrk="1" latinLnBrk="0" hangingPunct="1">
+              <a:spcBef>
+                <a:spcPct val="20000"/>
+              </a:spcBef>
+              <a:buFont typeface="Arial"/>
+              <a:buChar char="•"/>
+              <a:defRPr sz="2000" kern="1200">
+                <a:solidFill>
+                  <a:schemeClr val="tx1"/>
+                </a:solidFill>
+                <a:latin typeface="+mn-lt"/>
+                <a:ea typeface="+mn-ea"/>
+                <a:cs typeface="+mn-cs"/>
+              </a:defRPr>
+            </a:lvl9pPr>
+          </a:lstStyle>
+          <a:p>
+            <a:endParaRPr lang="en-US" sz="1800" dirty="0"/>
+          </a:p>
+        </p:txBody>
+      </p:sp>
+      <p:pic>
+        <p:nvPicPr>
+          <p:cNvPr id="7" name="Picture 6">
+            <a:extLst>
+              <a:ext uri="{FF2B5EF4-FFF2-40B4-BE49-F238E27FC236}">
+                <a16:creationId xmlns:a16="http://schemas.microsoft.com/office/drawing/2014/main" id="{12C208DD-9A94-95D2-2215-C1B367822E21}"/>
+              </a:ext>
+            </a:extLst>
+          </p:cNvPr>
+          <p:cNvPicPr>
+            <a:picLocks noChangeAspect="1"/>
+          </p:cNvPicPr>
+          <p:nvPr/>
+        </p:nvPicPr>
+        <p:blipFill>
+          <a:blip r:embed="rId2"/>
+          <a:stretch>
+            <a:fillRect/>
+          </a:stretch>
+        </p:blipFill>
+        <p:spPr>
+          <a:xfrm>
+            <a:off x="1060097" y="3429000"/>
+            <a:ext cx="7078063" cy="2572109"/>
+          </a:xfrm>
+          <a:prstGeom prst="rect">
+            <a:avLst/>
+          </a:prstGeom>
+        </p:spPr>
+      </p:pic>
+      <p:sp>
+        <p:nvSpPr>
+          <p:cNvPr id="9" name="Content Placeholder 2">
+            <a:extLst>
+              <a:ext uri="{FF2B5EF4-FFF2-40B4-BE49-F238E27FC236}">
+                <a16:creationId xmlns:a16="http://schemas.microsoft.com/office/drawing/2014/main" id="{1256A9B1-4875-555D-E606-FBC79B91A3FF}"/>
+              </a:ext>
+            </a:extLst>
+          </p:cNvPr>
+          <p:cNvSpPr txBox="1">
+            <a:spLocks/>
+          </p:cNvSpPr>
+          <p:nvPr/>
+        </p:nvSpPr>
+        <p:spPr>
+          <a:xfrm>
+            <a:off x="4572000" y="1417638"/>
+            <a:ext cx="3840480" cy="1819338"/>
+          </a:xfrm>
+          <a:prstGeom prst="rect">
+            <a:avLst/>
+          </a:prstGeom>
+        </p:spPr>
+        <p:txBody>
+          <a:bodyPr vert="horz" lIns="91440" tIns="45720" rIns="91440" bIns="45720" rtlCol="0">
+            <a:normAutofit fontScale="77500" lnSpcReduction="20000"/>
+          </a:bodyPr>
+          <a:lstStyle>
+            <a:lvl1pPr marL="342900" indent="-342900" algn="l" defTabSz="457200" rtl="0" eaLnBrk="1" latinLnBrk="0" hangingPunct="1">
+              <a:spcBef>
+                <a:spcPct val="20000"/>
+              </a:spcBef>
+              <a:buFont typeface="Arial"/>
+              <a:buChar char="•"/>
+              <a:defRPr sz="3200" kern="1200">
+                <a:solidFill>
+                  <a:schemeClr val="tx1"/>
+                </a:solidFill>
+                <a:latin typeface="+mn-lt"/>
+                <a:ea typeface="+mn-ea"/>
+                <a:cs typeface="+mn-cs"/>
+              </a:defRPr>
+            </a:lvl1pPr>
+            <a:lvl2pPr marL="742950" indent="-285750" algn="l" defTabSz="457200" rtl="0" eaLnBrk="1" latinLnBrk="0" hangingPunct="1">
+              <a:spcBef>
+                <a:spcPct val="20000"/>
+              </a:spcBef>
+              <a:buFont typeface="Arial"/>
+              <a:buChar char="–"/>
+              <a:defRPr sz="2800" kern="1200">
+                <a:solidFill>
+                  <a:schemeClr val="tx1"/>
+                </a:solidFill>
+                <a:latin typeface="+mn-lt"/>
+                <a:ea typeface="+mn-ea"/>
+                <a:cs typeface="+mn-cs"/>
+              </a:defRPr>
+            </a:lvl2pPr>
+            <a:lvl3pPr marL="1143000" indent="-228600" algn="l" defTabSz="457200" rtl="0" eaLnBrk="1" latinLnBrk="0" hangingPunct="1">
+              <a:spcBef>
+                <a:spcPct val="20000"/>
+              </a:spcBef>
+              <a:buFont typeface="Arial"/>
+              <a:buChar char="•"/>
+              <a:defRPr sz="2400" kern="1200">
+                <a:solidFill>
+                  <a:schemeClr val="tx1"/>
+                </a:solidFill>
+                <a:latin typeface="+mn-lt"/>
+                <a:ea typeface="+mn-ea"/>
+                <a:cs typeface="+mn-cs"/>
+              </a:defRPr>
+            </a:lvl3pPr>
+            <a:lvl4pPr marL="1600200" indent="-228600" algn="l" defTabSz="457200" rtl="0" eaLnBrk="1" latinLnBrk="0" hangingPunct="1">
+              <a:spcBef>
+                <a:spcPct val="20000"/>
+              </a:spcBef>
+              <a:buFont typeface="Arial"/>
+              <a:buChar char="–"/>
+              <a:defRPr sz="2000" kern="1200">
+                <a:solidFill>
+                  <a:schemeClr val="tx1"/>
+                </a:solidFill>
+                <a:latin typeface="+mn-lt"/>
+                <a:ea typeface="+mn-ea"/>
+                <a:cs typeface="+mn-cs"/>
+              </a:defRPr>
+            </a:lvl4pPr>
+            <a:lvl5pPr marL="2057400" indent="-228600" algn="l" defTabSz="457200" rtl="0" eaLnBrk="1" latinLnBrk="0" hangingPunct="1">
+              <a:spcBef>
+                <a:spcPct val="20000"/>
+              </a:spcBef>
+              <a:buFont typeface="Arial"/>
+              <a:buChar char="»"/>
+              <a:defRPr sz="2000" kern="1200">
+                <a:solidFill>
+                  <a:schemeClr val="tx1"/>
+                </a:solidFill>
+                <a:latin typeface="+mn-lt"/>
+                <a:ea typeface="+mn-ea"/>
+                <a:cs typeface="+mn-cs"/>
+              </a:defRPr>
+            </a:lvl5pPr>
+            <a:lvl6pPr marL="2514600" indent="-228600" algn="l" defTabSz="457200" rtl="0" eaLnBrk="1" latinLnBrk="0" hangingPunct="1">
+              <a:spcBef>
+                <a:spcPct val="20000"/>
+              </a:spcBef>
+              <a:buFont typeface="Arial"/>
+              <a:buChar char="•"/>
+              <a:defRPr sz="2000" kern="1200">
+                <a:solidFill>
+                  <a:schemeClr val="tx1"/>
+                </a:solidFill>
+                <a:latin typeface="+mn-lt"/>
+                <a:ea typeface="+mn-ea"/>
+                <a:cs typeface="+mn-cs"/>
+              </a:defRPr>
+            </a:lvl6pPr>
+            <a:lvl7pPr marL="2971800" indent="-228600" algn="l" defTabSz="457200" rtl="0" eaLnBrk="1" latinLnBrk="0" hangingPunct="1">
+              <a:spcBef>
+                <a:spcPct val="20000"/>
+              </a:spcBef>
+              <a:buFont typeface="Arial"/>
+              <a:buChar char="•"/>
+              <a:defRPr sz="2000" kern="1200">
+                <a:solidFill>
+                  <a:schemeClr val="tx1"/>
+                </a:solidFill>
+                <a:latin typeface="+mn-lt"/>
+                <a:ea typeface="+mn-ea"/>
+                <a:cs typeface="+mn-cs"/>
+              </a:defRPr>
+            </a:lvl7pPr>
+            <a:lvl8pPr marL="3429000" indent="-228600" algn="l" defTabSz="457200" rtl="0" eaLnBrk="1" latinLnBrk="0" hangingPunct="1">
+              <a:spcBef>
+                <a:spcPct val="20000"/>
+              </a:spcBef>
+              <a:buFont typeface="Arial"/>
+              <a:buChar char="•"/>
+              <a:defRPr sz="2000" kern="1200">
+                <a:solidFill>
+                  <a:schemeClr val="tx1"/>
+                </a:solidFill>
+                <a:latin typeface="+mn-lt"/>
+                <a:ea typeface="+mn-ea"/>
+                <a:cs typeface="+mn-cs"/>
+              </a:defRPr>
+            </a:lvl8pPr>
+            <a:lvl9pPr marL="3886200" indent="-228600" algn="l" defTabSz="457200" rtl="0" eaLnBrk="1" latinLnBrk="0" hangingPunct="1">
+              <a:spcBef>
+                <a:spcPct val="20000"/>
+              </a:spcBef>
+              <a:buFont typeface="Arial"/>
+              <a:buChar char="•"/>
+              <a:defRPr sz="2000" kern="1200">
+                <a:solidFill>
+                  <a:schemeClr val="tx1"/>
+                </a:solidFill>
+                <a:latin typeface="+mn-lt"/>
+                <a:ea typeface="+mn-ea"/>
+                <a:cs typeface="+mn-cs"/>
+              </a:defRPr>
+            </a:lvl9pPr>
+          </a:lstStyle>
+          <a:p>
+            <a:r>
+              <a:rPr lang="en-US" sz="1800" dirty="0"/>
+              <a:t>By tracking the most successful tracked cluster we can improve the actual displacement on the vehicle.</a:t>
+            </a:r>
+          </a:p>
+          <a:p>
+            <a:r>
+              <a:rPr lang="en-US" sz="1800" dirty="0"/>
+              <a:t>In case this cluster is lost, we simply move to the following most successful tracked cluster.</a:t>
+            </a:r>
+          </a:p>
+          <a:p>
+            <a:r>
+              <a:rPr lang="en-US" sz="1800" dirty="0"/>
+              <a:t>Negative side, if no information is being sensed from the vehicle, no cluster is registered. Meaning no motion to be tracked.</a:t>
+            </a:r>
+            <a:endParaRPr lang="en-US" sz="1000" dirty="0"/>
+          </a:p>
+          <a:p>
+            <a:endParaRPr lang="en-US" sz="1800" dirty="0"/>
+          </a:p>
+          <a:p>
+            <a:endParaRPr lang="en-US" sz="1800" dirty="0"/>
+          </a:p>
+        </p:txBody>
+      </p:sp>
+    </p:spTree>
+    <p:extLst>
+      <p:ext uri="{BB962C8B-B14F-4D97-AF65-F5344CB8AC3E}">
+        <p14:creationId xmlns:p14="http://schemas.microsoft.com/office/powerpoint/2010/main" val="1069782417"/>
+      </p:ext>
+    </p:extLst>
+  </p:cSld>
+  <p:clrMapOvr>
+    <a:masterClrMapping/>
+  </p:clrMapOvr>
+</p:sld>
+</file>
+
+<file path=ppt/slides/slide38.xml><?xml version="1.0" encoding="utf-8"?>
+<p:sld xmlns:a="http://schemas.openxmlformats.org/drawingml/2006/main" xmlns:r="http://schemas.openxmlformats.org/officeDocument/2006/relationships" xmlns:p="http://schemas.openxmlformats.org/presentationml/2006/main">
+  <p:cSld>
+    <p:spTree>
+      <p:nvGrpSpPr>
+        <p:cNvPr id="1" name="">
+          <a:extLst>
+            <a:ext uri="{FF2B5EF4-FFF2-40B4-BE49-F238E27FC236}">
+              <a16:creationId xmlns:a16="http://schemas.microsoft.com/office/drawing/2014/main" id="{76E198E6-0E03-110B-01F8-29A36DDF09DC}"/>
+            </a:ext>
+          </a:extLst>
+        </p:cNvPr>
+        <p:cNvGrpSpPr/>
+        <p:nvPr/>
+      </p:nvGrpSpPr>
+      <p:grpSpPr>
+        <a:xfrm>
+          <a:off x="0" y="0"/>
+          <a:ext cx="0" cy="0"/>
+          <a:chOff x="0" y="0"/>
+          <a:chExt cx="0" cy="0"/>
+        </a:xfrm>
+      </p:grpSpPr>
+      <p:sp>
+        <p:nvSpPr>
+          <p:cNvPr id="2" name="Title 1">
+            <a:extLst>
+              <a:ext uri="{FF2B5EF4-FFF2-40B4-BE49-F238E27FC236}">
+                <a16:creationId xmlns:a16="http://schemas.microsoft.com/office/drawing/2014/main" id="{35108556-2267-26BC-8822-389DB319B93E}"/>
+              </a:ext>
+            </a:extLst>
+          </p:cNvPr>
+          <p:cNvSpPr>
+            <a:spLocks noGrp="1"/>
+          </p:cNvSpPr>
+          <p:nvPr>
+            <p:ph type="title"/>
+          </p:nvPr>
+        </p:nvSpPr>
+        <p:spPr/>
+        <p:txBody>
+          <a:bodyPr>
+            <a:normAutofit fontScale="90000"/>
+          </a:bodyPr>
+          <a:lstStyle/>
+          <a:p>
+            <a:r>
+              <a:rPr lang="en-US" dirty="0"/>
+              <a:t>Period Highlight – 13</a:t>
+            </a:r>
+            <a:br>
+              <a:rPr lang="en-US" dirty="0"/>
+            </a:br>
+            <a:r>
+              <a:rPr lang="en-US" sz="3200" dirty="0"/>
+              <a:t>First result analysis</a:t>
+            </a:r>
+            <a:endParaRPr lang="en-US" dirty="0"/>
+          </a:p>
+        </p:txBody>
+      </p:sp>
+      <p:sp>
+        <p:nvSpPr>
+          <p:cNvPr id="3" name="Content Placeholder 2">
+            <a:extLst>
+              <a:ext uri="{FF2B5EF4-FFF2-40B4-BE49-F238E27FC236}">
+                <a16:creationId xmlns:a16="http://schemas.microsoft.com/office/drawing/2014/main" id="{2BEC3EB4-611B-B065-03DA-E0FF14FC832B}"/>
+              </a:ext>
+            </a:extLst>
+          </p:cNvPr>
+          <p:cNvSpPr>
+            <a:spLocks noGrp="1"/>
+          </p:cNvSpPr>
+          <p:nvPr>
+            <p:ph idx="1"/>
+          </p:nvPr>
+        </p:nvSpPr>
+        <p:spPr>
+          <a:xfrm>
+            <a:off x="457200" y="1417638"/>
+            <a:ext cx="8165592" cy="4352226"/>
+          </a:xfrm>
+        </p:spPr>
+        <p:txBody>
+          <a:bodyPr>
+            <a:normAutofit/>
+          </a:bodyPr>
+          <a:lstStyle/>
+          <a:p>
+            <a:r>
+              <a:rPr lang="en-US" sz="2000" dirty="0"/>
+              <a:t>Plan for the next 2 weeks:</a:t>
+            </a:r>
+          </a:p>
+          <a:p>
+            <a:pPr lvl="1"/>
+            <a:r>
+              <a:rPr lang="en-US" sz="2000" dirty="0"/>
+              <a:t>Fix rotation algorithm obtained from the point cloud.</a:t>
+            </a:r>
+          </a:p>
+          <a:p>
+            <a:pPr lvl="1"/>
+            <a:r>
+              <a:rPr lang="en-US" sz="2000" dirty="0"/>
+              <a:t>Work on the paper (currently working in it).</a:t>
+            </a:r>
+          </a:p>
+          <a:p>
+            <a:pPr lvl="1"/>
+            <a:r>
+              <a:rPr lang="en-US" sz="2000" dirty="0"/>
+              <a:t>Improve (if time allowed) filtering logic to avoid tracking moving targets.</a:t>
+            </a:r>
+          </a:p>
+          <a:p>
+            <a:pPr lvl="2"/>
+            <a:r>
+              <a:rPr lang="en-US" sz="2000" dirty="0"/>
+              <a:t>Differentiation between static vs moving targets.</a:t>
+            </a:r>
+          </a:p>
+          <a:p>
+            <a:pPr lvl="1"/>
+            <a:r>
+              <a:rPr lang="en-US" sz="2000" dirty="0"/>
+              <a:t>Possible live visualization.</a:t>
+            </a:r>
+          </a:p>
+          <a:p>
+            <a:pPr lvl="2"/>
+            <a:r>
+              <a:rPr lang="en-US" sz="2000" dirty="0"/>
+              <a:t>Currently simple implementation using TCP connection to laptop from RPi.</a:t>
+            </a:r>
+          </a:p>
+          <a:p>
+            <a:pPr lvl="2"/>
+            <a:r>
+              <a:rPr lang="en-US" sz="2000" dirty="0"/>
+              <a:t>Visualization implemented with QT frameworks.</a:t>
+            </a:r>
+          </a:p>
+        </p:txBody>
+      </p:sp>
+      <p:sp>
+        <p:nvSpPr>
+          <p:cNvPr id="4" name="Date Placeholder 3">
+            <a:extLst>
+              <a:ext uri="{FF2B5EF4-FFF2-40B4-BE49-F238E27FC236}">
+                <a16:creationId xmlns:a16="http://schemas.microsoft.com/office/drawing/2014/main" id="{2A893382-3837-98BF-E625-8282D3F00DE8}"/>
+              </a:ext>
+            </a:extLst>
+          </p:cNvPr>
+          <p:cNvSpPr>
+            <a:spLocks noGrp="1"/>
+          </p:cNvSpPr>
+          <p:nvPr>
+            <p:ph type="dt" sz="half" idx="10"/>
+          </p:nvPr>
+        </p:nvSpPr>
+        <p:spPr/>
+        <p:txBody>
+          <a:bodyPr/>
+          <a:lstStyle/>
+          <a:p>
+            <a:fld id="{0EFBEC3F-4208-4590-BA97-4119A385DFD9}" type="datetime1">
+              <a:rPr lang="en-US" smtClean="0"/>
+              <a:t>9/7/2025</a:t>
+            </a:fld>
+            <a:endParaRPr lang="en-US"/>
+          </a:p>
+        </p:txBody>
+      </p:sp>
+      <p:sp>
+        <p:nvSpPr>
+          <p:cNvPr id="5" name="Slide Number Placeholder 4">
+            <a:extLst>
+              <a:ext uri="{FF2B5EF4-FFF2-40B4-BE49-F238E27FC236}">
+                <a16:creationId xmlns:a16="http://schemas.microsoft.com/office/drawing/2014/main" id="{6C5FAE15-4954-E3D1-D712-0FB7E6F76E6D}"/>
+              </a:ext>
+            </a:extLst>
+          </p:cNvPr>
+          <p:cNvSpPr>
+            <a:spLocks noGrp="1"/>
+          </p:cNvSpPr>
+          <p:nvPr>
+            <p:ph type="sldNum" sz="quarter" idx="12"/>
+          </p:nvPr>
+        </p:nvSpPr>
+        <p:spPr/>
+        <p:txBody>
+          <a:bodyPr/>
+          <a:lstStyle/>
+          <a:p>
+            <a:fld id="{C1FF6DA9-008F-8B48-92A6-B652298478BF}" type="slidenum">
+              <a:rPr lang="en-US" smtClean="0"/>
+              <a:t>38</a:t>
+            </a:fld>
+            <a:endParaRPr lang="en-US"/>
+          </a:p>
+        </p:txBody>
+      </p:sp>
+      <p:sp>
+        <p:nvSpPr>
+          <p:cNvPr id="10" name="Content Placeholder 2">
+            <a:extLst>
+              <a:ext uri="{FF2B5EF4-FFF2-40B4-BE49-F238E27FC236}">
+                <a16:creationId xmlns:a16="http://schemas.microsoft.com/office/drawing/2014/main" id="{311CECC3-2414-E16A-0CE8-547BA5652599}"/>
+              </a:ext>
+            </a:extLst>
+          </p:cNvPr>
+          <p:cNvSpPr txBox="1">
+            <a:spLocks/>
+          </p:cNvSpPr>
+          <p:nvPr/>
+        </p:nvSpPr>
+        <p:spPr>
+          <a:xfrm>
+            <a:off x="4297680" y="1417638"/>
+            <a:ext cx="3840480" cy="1307274"/>
+          </a:xfrm>
+          <a:prstGeom prst="rect">
+            <a:avLst/>
+          </a:prstGeom>
+        </p:spPr>
+        <p:txBody>
+          <a:bodyPr vert="horz" lIns="91440" tIns="45720" rIns="91440" bIns="45720" rtlCol="0">
+            <a:normAutofit/>
+          </a:bodyPr>
+          <a:lstStyle>
+            <a:lvl1pPr marL="342900" indent="-342900" algn="l" defTabSz="457200" rtl="0" eaLnBrk="1" latinLnBrk="0" hangingPunct="1">
+              <a:spcBef>
+                <a:spcPct val="20000"/>
+              </a:spcBef>
+              <a:buFont typeface="Arial"/>
+              <a:buChar char="•"/>
+              <a:defRPr sz="3200" kern="1200">
+                <a:solidFill>
+                  <a:schemeClr val="tx1"/>
+                </a:solidFill>
+                <a:latin typeface="+mn-lt"/>
+                <a:ea typeface="+mn-ea"/>
+                <a:cs typeface="+mn-cs"/>
+              </a:defRPr>
+            </a:lvl1pPr>
+            <a:lvl2pPr marL="742950" indent="-285750" algn="l" defTabSz="457200" rtl="0" eaLnBrk="1" latinLnBrk="0" hangingPunct="1">
+              <a:spcBef>
+                <a:spcPct val="20000"/>
+              </a:spcBef>
+              <a:buFont typeface="Arial"/>
+              <a:buChar char="–"/>
+              <a:defRPr sz="2800" kern="1200">
+                <a:solidFill>
+                  <a:schemeClr val="tx1"/>
+                </a:solidFill>
+                <a:latin typeface="+mn-lt"/>
+                <a:ea typeface="+mn-ea"/>
+                <a:cs typeface="+mn-cs"/>
+              </a:defRPr>
+            </a:lvl2pPr>
+            <a:lvl3pPr marL="1143000" indent="-228600" algn="l" defTabSz="457200" rtl="0" eaLnBrk="1" latinLnBrk="0" hangingPunct="1">
+              <a:spcBef>
+                <a:spcPct val="20000"/>
+              </a:spcBef>
+              <a:buFont typeface="Arial"/>
+              <a:buChar char="•"/>
+              <a:defRPr sz="2400" kern="1200">
+                <a:solidFill>
+                  <a:schemeClr val="tx1"/>
+                </a:solidFill>
+                <a:latin typeface="+mn-lt"/>
+                <a:ea typeface="+mn-ea"/>
+                <a:cs typeface="+mn-cs"/>
+              </a:defRPr>
+            </a:lvl3pPr>
+            <a:lvl4pPr marL="1600200" indent="-228600" algn="l" defTabSz="457200" rtl="0" eaLnBrk="1" latinLnBrk="0" hangingPunct="1">
+              <a:spcBef>
+                <a:spcPct val="20000"/>
+              </a:spcBef>
+              <a:buFont typeface="Arial"/>
+              <a:buChar char="–"/>
+              <a:defRPr sz="2000" kern="1200">
+                <a:solidFill>
+                  <a:schemeClr val="tx1"/>
+                </a:solidFill>
+                <a:latin typeface="+mn-lt"/>
+                <a:ea typeface="+mn-ea"/>
+                <a:cs typeface="+mn-cs"/>
+              </a:defRPr>
+            </a:lvl4pPr>
+            <a:lvl5pPr marL="2057400" indent="-228600" algn="l" defTabSz="457200" rtl="0" eaLnBrk="1" latinLnBrk="0" hangingPunct="1">
+              <a:spcBef>
+                <a:spcPct val="20000"/>
+              </a:spcBef>
+              <a:buFont typeface="Arial"/>
+              <a:buChar char="»"/>
+              <a:defRPr sz="2000" kern="1200">
+                <a:solidFill>
+                  <a:schemeClr val="tx1"/>
+                </a:solidFill>
+                <a:latin typeface="+mn-lt"/>
+                <a:ea typeface="+mn-ea"/>
+                <a:cs typeface="+mn-cs"/>
+              </a:defRPr>
+            </a:lvl5pPr>
+            <a:lvl6pPr marL="2514600" indent="-228600" algn="l" defTabSz="457200" rtl="0" eaLnBrk="1" latinLnBrk="0" hangingPunct="1">
+              <a:spcBef>
+                <a:spcPct val="20000"/>
+              </a:spcBef>
+              <a:buFont typeface="Arial"/>
+              <a:buChar char="•"/>
+              <a:defRPr sz="2000" kern="1200">
+                <a:solidFill>
+                  <a:schemeClr val="tx1"/>
+                </a:solidFill>
+                <a:latin typeface="+mn-lt"/>
+                <a:ea typeface="+mn-ea"/>
+                <a:cs typeface="+mn-cs"/>
+              </a:defRPr>
+            </a:lvl6pPr>
+            <a:lvl7pPr marL="2971800" indent="-228600" algn="l" defTabSz="457200" rtl="0" eaLnBrk="1" latinLnBrk="0" hangingPunct="1">
+              <a:spcBef>
+                <a:spcPct val="20000"/>
+              </a:spcBef>
+              <a:buFont typeface="Arial"/>
+              <a:buChar char="•"/>
+              <a:defRPr sz="2000" kern="1200">
+                <a:solidFill>
+                  <a:schemeClr val="tx1"/>
+                </a:solidFill>
+                <a:latin typeface="+mn-lt"/>
+                <a:ea typeface="+mn-ea"/>
+                <a:cs typeface="+mn-cs"/>
+              </a:defRPr>
+            </a:lvl7pPr>
+            <a:lvl8pPr marL="3429000" indent="-228600" algn="l" defTabSz="457200" rtl="0" eaLnBrk="1" latinLnBrk="0" hangingPunct="1">
+              <a:spcBef>
+                <a:spcPct val="20000"/>
+              </a:spcBef>
+              <a:buFont typeface="Arial"/>
+              <a:buChar char="•"/>
+              <a:defRPr sz="2000" kern="1200">
+                <a:solidFill>
+                  <a:schemeClr val="tx1"/>
+                </a:solidFill>
+                <a:latin typeface="+mn-lt"/>
+                <a:ea typeface="+mn-ea"/>
+                <a:cs typeface="+mn-cs"/>
+              </a:defRPr>
+            </a:lvl8pPr>
+            <a:lvl9pPr marL="3886200" indent="-228600" algn="l" defTabSz="457200" rtl="0" eaLnBrk="1" latinLnBrk="0" hangingPunct="1">
+              <a:spcBef>
+                <a:spcPct val="20000"/>
+              </a:spcBef>
+              <a:buFont typeface="Arial"/>
+              <a:buChar char="•"/>
+              <a:defRPr sz="2000" kern="1200">
+                <a:solidFill>
+                  <a:schemeClr val="tx1"/>
+                </a:solidFill>
+                <a:latin typeface="+mn-lt"/>
+                <a:ea typeface="+mn-ea"/>
+                <a:cs typeface="+mn-cs"/>
+              </a:defRPr>
+            </a:lvl9pPr>
+          </a:lstStyle>
+          <a:p>
+            <a:endParaRPr lang="en-US" sz="1800" dirty="0"/>
+          </a:p>
+        </p:txBody>
+      </p:sp>
+    </p:spTree>
+    <p:extLst>
+      <p:ext uri="{BB962C8B-B14F-4D97-AF65-F5344CB8AC3E}">
+        <p14:creationId xmlns:p14="http://schemas.microsoft.com/office/powerpoint/2010/main" val="3851482068"/>
+      </p:ext>
+    </p:extLst>
+  </p:cSld>
+  <p:clrMapOvr>
+    <a:masterClrMapping/>
+  </p:clrMapOvr>
+</p:sld>
+</file>
+
+<file path=ppt/slides/slide39.xml><?xml version="1.0" encoding="utf-8"?>
 <p:sld xmlns:a="http://schemas.openxmlformats.org/drawingml/2006/main" xmlns:r="http://schemas.openxmlformats.org/officeDocument/2006/relationships" xmlns:p="http://schemas.openxmlformats.org/presentationml/2006/main">
   <p:cSld>
     <p:spTree>
@@ -10638,7 +13600,7 @@
           <a:p>
             <a:fld id="{0EFBEC3F-4208-4590-BA97-4119A385DFD9}" type="datetime1">
               <a:rPr lang="en-US" smtClean="0"/>
-              <a:t>8/25/2025</a:t>
+              <a:t>9/7/2025</a:t>
             </a:fld>
             <a:endParaRPr lang="en-US"/>
           </a:p>
@@ -10667,7 +13629,7 @@
           <a:p>
             <a:fld id="{C1FF6DA9-008F-8B48-92A6-B652298478BF}" type="slidenum">
               <a:rPr lang="en-US" smtClean="0"/>
-              <a:t>32</a:t>
+              <a:t>39</a:t>
             </a:fld>
             <a:endParaRPr lang="en-US"/>
           </a:p>
@@ -10839,7 +13801,7 @@
           <a:p>
             <a:fld id="{0EFBEC3F-4208-4590-BA97-4119A385DFD9}" type="datetime1">
               <a:rPr lang="en-US" smtClean="0"/>
-              <a:t>8/25/2025</a:t>
+              <a:t>9/7/2025</a:t>
             </a:fld>
             <a:endParaRPr lang="en-US"/>
           </a:p>
@@ -11181,7 +14143,7 @@
           <a:p>
             <a:fld id="{0EFBEC3F-4208-4590-BA97-4119A385DFD9}" type="datetime1">
               <a:rPr lang="en-US" smtClean="0"/>
-              <a:t>8/25/2025</a:t>
+              <a:t>9/7/2025</a:t>
             </a:fld>
             <a:endParaRPr lang="en-US"/>
           </a:p>
@@ -11432,7 +14394,7 @@
           <a:p>
             <a:fld id="{0EFBEC3F-4208-4590-BA97-4119A385DFD9}" type="datetime1">
               <a:rPr lang="en-US" smtClean="0"/>
-              <a:t>8/25/2025</a:t>
+              <a:t>9/7/2025</a:t>
             </a:fld>
             <a:endParaRPr lang="en-US"/>
           </a:p>
@@ -11588,7 +14550,7 @@
           <a:p>
             <a:fld id="{0EFBEC3F-4208-4590-BA97-4119A385DFD9}" type="datetime1">
               <a:rPr lang="en-US" smtClean="0"/>
-              <a:t>8/25/2025</a:t>
+              <a:t>9/7/2025</a:t>
             </a:fld>
             <a:endParaRPr lang="en-US"/>
           </a:p>
@@ -11907,7 +14869,7 @@
           <a:p>
             <a:fld id="{0EFBEC3F-4208-4590-BA97-4119A385DFD9}" type="datetime1">
               <a:rPr lang="en-US" smtClean="0"/>
-              <a:t>8/25/2025</a:t>
+              <a:t>9/7/2025</a:t>
             </a:fld>
             <a:endParaRPr lang="en-US"/>
           </a:p>
@@ -12220,7 +15182,7 @@
           <a:p>
             <a:fld id="{0EFBEC3F-4208-4590-BA97-4119A385DFD9}" type="datetime1">
               <a:rPr lang="en-US" smtClean="0"/>
-              <a:t>8/25/2025</a:t>
+              <a:t>9/7/2025</a:t>
             </a:fld>
             <a:endParaRPr lang="en-US"/>
           </a:p>

</xml_diff>

<commit_message>
saved UNDO information for reset changes and discarded files
</commit_message>
<xml_diff>
--- a/06_PresentationUpdates/Radar_ResearchProject.pptx
+++ b/06_PresentationUpdates/Radar_ResearchProject.pptx
@@ -5,7 +5,7 @@
     <p:sldMasterId id="2147483648" r:id="rId1"/>
   </p:sldMasterIdLst>
   <p:notesMasterIdLst>
-    <p:notesMasterId r:id="rId34"/>
+    <p:notesMasterId r:id="rId33"/>
   </p:notesMasterIdLst>
   <p:sldIdLst>
     <p:sldId id="380" r:id="rId2"/>
@@ -24,22 +24,21 @@
     <p:sldId id="395" r:id="rId15"/>
     <p:sldId id="396" r:id="rId16"/>
     <p:sldId id="397" r:id="rId17"/>
-    <p:sldId id="398" r:id="rId18"/>
-    <p:sldId id="399" r:id="rId19"/>
-    <p:sldId id="407" r:id="rId20"/>
-    <p:sldId id="408" r:id="rId21"/>
-    <p:sldId id="401" r:id="rId22"/>
-    <p:sldId id="402" r:id="rId23"/>
-    <p:sldId id="403" r:id="rId24"/>
-    <p:sldId id="400" r:id="rId25"/>
-    <p:sldId id="404" r:id="rId26"/>
-    <p:sldId id="405" r:id="rId27"/>
-    <p:sldId id="406" r:id="rId28"/>
-    <p:sldId id="384" r:id="rId29"/>
-    <p:sldId id="409" r:id="rId30"/>
-    <p:sldId id="411" r:id="rId31"/>
-    <p:sldId id="410" r:id="rId32"/>
-    <p:sldId id="385" r:id="rId33"/>
+    <p:sldId id="399" r:id="rId18"/>
+    <p:sldId id="407" r:id="rId19"/>
+    <p:sldId id="408" r:id="rId20"/>
+    <p:sldId id="401" r:id="rId21"/>
+    <p:sldId id="402" r:id="rId22"/>
+    <p:sldId id="403" r:id="rId23"/>
+    <p:sldId id="400" r:id="rId24"/>
+    <p:sldId id="404" r:id="rId25"/>
+    <p:sldId id="405" r:id="rId26"/>
+    <p:sldId id="406" r:id="rId27"/>
+    <p:sldId id="384" r:id="rId28"/>
+    <p:sldId id="409" r:id="rId29"/>
+    <p:sldId id="411" r:id="rId30"/>
+    <p:sldId id="410" r:id="rId31"/>
+    <p:sldId id="385" r:id="rId32"/>
   </p:sldIdLst>
   <p:sldSz cx="9144000" cy="6858000" type="screen4x3"/>
   <p:notesSz cx="6858000" cy="9144000"/>
@@ -1291,7 +1290,7 @@
           <a:p>
             <a:fld id="{914561EA-877F-40EB-BD03-9F9D93CF8F08}" type="datetimeFigureOut">
               <a:rPr lang="en-US" smtClean="0"/>
-              <a:t>8/25/2025</a:t>
+              <a:t>9/15/2025</a:t>
             </a:fld>
             <a:endParaRPr lang="en-US"/>
           </a:p>
@@ -1821,7 +1820,7 @@
           <a:p>
             <a:fld id="{AFA779F1-D9BB-4E74-86A2-2DC123167359}" type="datetime1">
               <a:rPr lang="en-US" smtClean="0"/>
-              <a:t>8/25/2025</a:t>
+              <a:t>9/15/2025</a:t>
             </a:fld>
             <a:endParaRPr lang="en-US" dirty="0"/>
           </a:p>
@@ -1997,7 +1996,7 @@
           <a:p>
             <a:fld id="{BD548D2B-CE3E-4EDD-9649-B6EE9E3C2340}" type="datetime1">
               <a:rPr lang="en-US" smtClean="0"/>
-              <a:t>8/25/2025</a:t>
+              <a:t>9/15/2025</a:t>
             </a:fld>
             <a:endParaRPr lang="en-US"/>
           </a:p>
@@ -2183,7 +2182,7 @@
           <a:p>
             <a:fld id="{ACEBBA4F-0F17-4FF1-AA6C-E0193917BC1E}" type="datetime1">
               <a:rPr lang="en-US" smtClean="0"/>
-              <a:t>8/25/2025</a:t>
+              <a:t>9/15/2025</a:t>
             </a:fld>
             <a:endParaRPr lang="en-US"/>
           </a:p>
@@ -2359,7 +2358,7 @@
           <a:p>
             <a:fld id="{0EFBEC3F-4208-4590-BA97-4119A385DFD9}" type="datetime1">
               <a:rPr lang="en-US" smtClean="0"/>
-              <a:t>8/25/2025</a:t>
+              <a:t>9/15/2025</a:t>
             </a:fld>
             <a:endParaRPr lang="en-US"/>
           </a:p>
@@ -2612,7 +2611,7 @@
           <a:p>
             <a:fld id="{B2D760EB-C9A5-467F-AA36-B176C44BCBF1}" type="datetime1">
               <a:rPr lang="en-US" smtClean="0"/>
-              <a:t>8/25/2025</a:t>
+              <a:t>9/15/2025</a:t>
             </a:fld>
             <a:endParaRPr lang="en-US"/>
           </a:p>
@@ -2905,7 +2904,7 @@
           <a:p>
             <a:fld id="{1C9B5E61-6324-405D-8AF5-05323E47D966}" type="datetime1">
               <a:rPr lang="en-US" smtClean="0"/>
-              <a:t>8/25/2025</a:t>
+              <a:t>9/15/2025</a:t>
             </a:fld>
             <a:endParaRPr lang="en-US"/>
           </a:p>
@@ -3332,7 +3331,7 @@
           <a:p>
             <a:fld id="{4A37807E-A869-4435-A051-311AEF96909D}" type="datetime1">
               <a:rPr lang="en-US" smtClean="0"/>
-              <a:t>8/25/2025</a:t>
+              <a:t>9/15/2025</a:t>
             </a:fld>
             <a:endParaRPr lang="en-US"/>
           </a:p>
@@ -3457,7 +3456,7 @@
           <a:p>
             <a:fld id="{1BC8686A-CD31-4B11-9B8F-A51012174BB0}" type="datetime1">
               <a:rPr lang="en-US" smtClean="0"/>
-              <a:t>8/25/2025</a:t>
+              <a:t>9/15/2025</a:t>
             </a:fld>
             <a:endParaRPr lang="en-US"/>
           </a:p>
@@ -3560,7 +3559,7 @@
           <a:p>
             <a:fld id="{4F4B4EA3-50E0-4631-85EF-BDA8608D293F}" type="datetime1">
               <a:rPr lang="en-US" smtClean="0"/>
-              <a:t>8/25/2025</a:t>
+              <a:t>9/15/2025</a:t>
             </a:fld>
             <a:endParaRPr lang="en-US"/>
           </a:p>
@@ -3843,7 +3842,7 @@
           <a:p>
             <a:fld id="{4BA8B4E6-89B0-4D9D-AC8C-3B8ECDAACC34}" type="datetime1">
               <a:rPr lang="en-US" smtClean="0"/>
-              <a:t>8/25/2025</a:t>
+              <a:t>9/15/2025</a:t>
             </a:fld>
             <a:endParaRPr lang="en-US"/>
           </a:p>
@@ -4103,7 +4102,7 @@
           <a:p>
             <a:fld id="{0A1BBC16-5931-43C3-BDFF-9B248A400D54}" type="datetime1">
               <a:rPr lang="en-US" smtClean="0"/>
-              <a:t>8/25/2025</a:t>
+              <a:t>9/15/2025</a:t>
             </a:fld>
             <a:endParaRPr lang="en-US"/>
           </a:p>
@@ -4414,7 +4413,7 @@
           <a:p>
             <a:fld id="{A7143E5B-78DF-476F-8A09-9FD612E00067}" type="datetime1">
               <a:rPr lang="en-US" smtClean="0"/>
-              <a:t>8/25/2025</a:t>
+              <a:t>9/15/2025</a:t>
             </a:fld>
             <a:endParaRPr lang="en-US" dirty="0"/>
           </a:p>
@@ -4949,7 +4948,7 @@
           <a:p>
             <a:fld id="{1FF5D759-AFA5-4CA4-8536-68E39A72291A}" type="datetime1">
               <a:rPr lang="en-US" smtClean="0"/>
-              <a:t>8/25/2025</a:t>
+              <a:t>9/15/2025</a:t>
             </a:fld>
             <a:endParaRPr lang="en-US" dirty="0"/>
           </a:p>
@@ -5051,7 +5050,7 @@
           <a:p>
             <a:fld id="{0EFBEC3F-4208-4590-BA97-4119A385DFD9}" type="datetime1">
               <a:rPr lang="en-US" smtClean="0"/>
-              <a:t>8/25/2025</a:t>
+              <a:t>9/15/2025</a:t>
             </a:fld>
             <a:endParaRPr lang="en-US"/>
           </a:p>
@@ -5206,7 +5205,7 @@
           <a:p>
             <a:fld id="{0EFBEC3F-4208-4590-BA97-4119A385DFD9}" type="datetime1">
               <a:rPr lang="en-US" smtClean="0"/>
-              <a:t>8/25/2025</a:t>
+              <a:t>9/15/2025</a:t>
             </a:fld>
             <a:endParaRPr lang="en-US"/>
           </a:p>
@@ -5391,7 +5390,7 @@
           <a:p>
             <a:fld id="{0EFBEC3F-4208-4590-BA97-4119A385DFD9}" type="datetime1">
               <a:rPr lang="en-US" smtClean="0"/>
-              <a:t>8/25/2025</a:t>
+              <a:t>9/15/2025</a:t>
             </a:fld>
             <a:endParaRPr lang="en-US"/>
           </a:p>
@@ -5688,7 +5687,7 @@
           <a:p>
             <a:fld id="{0EFBEC3F-4208-4590-BA97-4119A385DFD9}" type="datetime1">
               <a:rPr lang="en-US" smtClean="0"/>
-              <a:t>8/25/2025</a:t>
+              <a:t>9/15/2025</a:t>
             </a:fld>
             <a:endParaRPr lang="en-US"/>
           </a:p>
@@ -5866,7 +5865,7 @@
           <a:p>
             <a:fld id="{0EFBEC3F-4208-4590-BA97-4119A385DFD9}" type="datetime1">
               <a:rPr lang="en-US" smtClean="0"/>
-              <a:t>8/25/2025</a:t>
+              <a:t>9/15/2025</a:t>
             </a:fld>
             <a:endParaRPr lang="en-US"/>
           </a:p>
@@ -6105,7 +6104,7 @@
           <a:p>
             <a:fld id="{0EFBEC3F-4208-4590-BA97-4119A385DFD9}" type="datetime1">
               <a:rPr lang="en-US" smtClean="0"/>
-              <a:t>8/25/2025</a:t>
+              <a:t>9/15/2025</a:t>
             </a:fld>
             <a:endParaRPr lang="en-US"/>
           </a:p>
@@ -6374,7 +6373,7 @@
           <a:p>
             <a:fld id="{0EFBEC3F-4208-4590-BA97-4119A385DFD9}" type="datetime1">
               <a:rPr lang="en-US" smtClean="0"/>
-              <a:t>8/25/2025</a:t>
+              <a:t>9/15/2025</a:t>
             </a:fld>
             <a:endParaRPr lang="en-US"/>
           </a:p>
@@ -6522,261 +6521,6 @@
         <p:cNvPr id="1" name="">
           <a:extLst>
             <a:ext uri="{FF2B5EF4-FFF2-40B4-BE49-F238E27FC236}">
-              <a16:creationId xmlns:a16="http://schemas.microsoft.com/office/drawing/2014/main" id="{D58F2EF4-B822-3B58-1463-B38A92BCAC5C}"/>
-            </a:ext>
-          </a:extLst>
-        </p:cNvPr>
-        <p:cNvGrpSpPr/>
-        <p:nvPr/>
-      </p:nvGrpSpPr>
-      <p:grpSpPr>
-        <a:xfrm>
-          <a:off x="0" y="0"/>
-          <a:ext cx="0" cy="0"/>
-          <a:chOff x="0" y="0"/>
-          <a:chExt cx="0" cy="0"/>
-        </a:xfrm>
-      </p:grpSpPr>
-      <p:sp>
-        <p:nvSpPr>
-          <p:cNvPr id="2" name="Title 1">
-            <a:extLst>
-              <a:ext uri="{FF2B5EF4-FFF2-40B4-BE49-F238E27FC236}">
-                <a16:creationId xmlns:a16="http://schemas.microsoft.com/office/drawing/2014/main" id="{72B6D791-1351-9CB3-491E-FC8322A0B399}"/>
-              </a:ext>
-            </a:extLst>
-          </p:cNvPr>
-          <p:cNvSpPr>
-            <a:spLocks noGrp="1"/>
-          </p:cNvSpPr>
-          <p:nvPr>
-            <p:ph type="title"/>
-          </p:nvPr>
-        </p:nvSpPr>
-        <p:spPr/>
-        <p:txBody>
-          <a:bodyPr>
-            <a:normAutofit fontScale="90000"/>
-          </a:bodyPr>
-          <a:lstStyle/>
-          <a:p>
-            <a:r>
-              <a:rPr lang="en-US" dirty="0"/>
-              <a:t>Period Highlight – 8</a:t>
-            </a:r>
-            <a:br>
-              <a:rPr lang="en-US" dirty="0"/>
-            </a:br>
-            <a:r>
-              <a:rPr lang="en-US" sz="3200" dirty="0"/>
-              <a:t>Software Implementations</a:t>
-            </a:r>
-          </a:p>
-        </p:txBody>
-      </p:sp>
-      <p:sp>
-        <p:nvSpPr>
-          <p:cNvPr id="3" name="Content Placeholder 2">
-            <a:extLst>
-              <a:ext uri="{FF2B5EF4-FFF2-40B4-BE49-F238E27FC236}">
-                <a16:creationId xmlns:a16="http://schemas.microsoft.com/office/drawing/2014/main" id="{AAA5B113-DB6D-9981-08E1-359B4A31033D}"/>
-              </a:ext>
-            </a:extLst>
-          </p:cNvPr>
-          <p:cNvSpPr>
-            <a:spLocks noGrp="1"/>
-          </p:cNvSpPr>
-          <p:nvPr>
-            <p:ph idx="1"/>
-          </p:nvPr>
-        </p:nvSpPr>
-        <p:spPr/>
-        <p:txBody>
-          <a:bodyPr/>
-          <a:lstStyle/>
-          <a:p>
-            <a:r>
-              <a:rPr lang="en-US" dirty="0"/>
-              <a:t>Demonstration of the previous analysis.</a:t>
-            </a:r>
-          </a:p>
-          <a:p>
-            <a:pPr lvl="1"/>
-            <a:endParaRPr lang="en-US" dirty="0"/>
-          </a:p>
-        </p:txBody>
-      </p:sp>
-      <p:sp>
-        <p:nvSpPr>
-          <p:cNvPr id="4" name="Date Placeholder 3">
-            <a:extLst>
-              <a:ext uri="{FF2B5EF4-FFF2-40B4-BE49-F238E27FC236}">
-                <a16:creationId xmlns:a16="http://schemas.microsoft.com/office/drawing/2014/main" id="{AA86BCFF-C510-F986-B4B9-C8956246E715}"/>
-              </a:ext>
-            </a:extLst>
-          </p:cNvPr>
-          <p:cNvSpPr>
-            <a:spLocks noGrp="1"/>
-          </p:cNvSpPr>
-          <p:nvPr>
-            <p:ph type="dt" sz="half" idx="10"/>
-          </p:nvPr>
-        </p:nvSpPr>
-        <p:spPr/>
-        <p:txBody>
-          <a:bodyPr/>
-          <a:lstStyle/>
-          <a:p>
-            <a:fld id="{0EFBEC3F-4208-4590-BA97-4119A385DFD9}" type="datetime1">
-              <a:rPr lang="en-US" smtClean="0"/>
-              <a:t>8/25/2025</a:t>
-            </a:fld>
-            <a:endParaRPr lang="en-US"/>
-          </a:p>
-        </p:txBody>
-      </p:sp>
-      <p:sp>
-        <p:nvSpPr>
-          <p:cNvPr id="5" name="Slide Number Placeholder 4">
-            <a:extLst>
-              <a:ext uri="{FF2B5EF4-FFF2-40B4-BE49-F238E27FC236}">
-                <a16:creationId xmlns:a16="http://schemas.microsoft.com/office/drawing/2014/main" id="{EAF81237-0BA8-4790-B81C-13F8A266CEED}"/>
-              </a:ext>
-            </a:extLst>
-          </p:cNvPr>
-          <p:cNvSpPr>
-            <a:spLocks noGrp="1"/>
-          </p:cNvSpPr>
-          <p:nvPr>
-            <p:ph type="sldNum" sz="quarter" idx="12"/>
-          </p:nvPr>
-        </p:nvSpPr>
-        <p:spPr/>
-        <p:txBody>
-          <a:bodyPr/>
-          <a:lstStyle/>
-          <a:p>
-            <a:fld id="{C1FF6DA9-008F-8B48-92A6-B652298478BF}" type="slidenum">
-              <a:rPr lang="en-US" smtClean="0"/>
-              <a:t>17</a:t>
-            </a:fld>
-            <a:endParaRPr lang="en-US"/>
-          </a:p>
-        </p:txBody>
-      </p:sp>
-      <p:sp>
-        <p:nvSpPr>
-          <p:cNvPr id="6" name="AutoShape 2">
-            <a:extLst>
-              <a:ext uri="{FF2B5EF4-FFF2-40B4-BE49-F238E27FC236}">
-                <a16:creationId xmlns:a16="http://schemas.microsoft.com/office/drawing/2014/main" id="{2A17A4EE-6890-0577-252E-7E2942491D34}"/>
-              </a:ext>
-            </a:extLst>
-          </p:cNvPr>
-          <p:cNvSpPr>
-            <a:spLocks noChangeAspect="1" noChangeArrowheads="1"/>
-          </p:cNvSpPr>
-          <p:nvPr/>
-        </p:nvSpPr>
-        <p:spPr bwMode="auto">
-          <a:xfrm>
-            <a:off x="4419600" y="3276600"/>
-            <a:ext cx="304800" cy="304800"/>
-          </a:xfrm>
-          <a:prstGeom prst="rect">
-            <a:avLst/>
-          </a:prstGeom>
-          <a:noFill/>
-          <a:extLst>
-            <a:ext uri="{909E8E84-426E-40DD-AFC4-6F175D3DCCD1}">
-              <a14:hiddenFill xmlns:a14="http://schemas.microsoft.com/office/drawing/2010/main">
-                <a:solidFill>
-                  <a:srgbClr val="FFFFFF"/>
-                </a:solidFill>
-              </a14:hiddenFill>
-            </a:ext>
-          </a:extLst>
-        </p:spPr>
-        <p:txBody>
-          <a:bodyPr vert="horz" wrap="square" lIns="91440" tIns="45720" rIns="91440" bIns="45720" numCol="1" anchor="t" anchorCtr="0" compatLnSpc="1">
-            <a:prstTxWarp prst="textNoShape">
-              <a:avLst/>
-            </a:prstTxWarp>
-          </a:bodyPr>
-          <a:lstStyle/>
-          <a:p>
-            <a:endParaRPr lang="en-US"/>
-          </a:p>
-        </p:txBody>
-      </p:sp>
-      <p:pic>
-        <p:nvPicPr>
-          <p:cNvPr id="3074" name="Picture 2" descr="Output image">
-            <a:extLst>
-              <a:ext uri="{FF2B5EF4-FFF2-40B4-BE49-F238E27FC236}">
-                <a16:creationId xmlns:a16="http://schemas.microsoft.com/office/drawing/2014/main" id="{0867B836-5264-44C5-BB10-61F0B5C2849B}"/>
-              </a:ext>
-            </a:extLst>
-          </p:cNvPr>
-          <p:cNvPicPr>
-            <a:picLocks noChangeAspect="1" noChangeArrowheads="1"/>
-          </p:cNvPicPr>
-          <p:nvPr/>
-        </p:nvPicPr>
-        <p:blipFill>
-          <a:blip r:embed="rId2">
-            <a:extLst>
-              <a:ext uri="{28A0092B-C50C-407E-A947-70E740481C1C}">
-                <a14:useLocalDpi xmlns:a14="http://schemas.microsoft.com/office/drawing/2010/main" val="0"/>
-              </a:ext>
-            </a:extLst>
-          </a:blip>
-          <a:srcRect/>
-          <a:stretch>
-            <a:fillRect/>
-          </a:stretch>
-        </p:blipFill>
-        <p:spPr bwMode="auto">
-          <a:xfrm>
-            <a:off x="2359819" y="2231923"/>
-            <a:ext cx="4213216" cy="4124427"/>
-          </a:xfrm>
-          <a:prstGeom prst="rect">
-            <a:avLst/>
-          </a:prstGeom>
-          <a:noFill/>
-          <a:extLst>
-            <a:ext uri="{909E8E84-426E-40DD-AFC4-6F175D3DCCD1}">
-              <a14:hiddenFill xmlns:a14="http://schemas.microsoft.com/office/drawing/2010/main">
-                <a:solidFill>
-                  <a:srgbClr val="FFFFFF"/>
-                </a:solidFill>
-              </a14:hiddenFill>
-            </a:ext>
-          </a:extLst>
-        </p:spPr>
-      </p:pic>
-    </p:spTree>
-    <p:extLst>
-      <p:ext uri="{BB962C8B-B14F-4D97-AF65-F5344CB8AC3E}">
-        <p14:creationId xmlns:p14="http://schemas.microsoft.com/office/powerpoint/2010/main" val="1725387343"/>
-      </p:ext>
-    </p:extLst>
-  </p:cSld>
-  <p:clrMapOvr>
-    <a:masterClrMapping/>
-  </p:clrMapOvr>
-</p:sld>
-</file>
-
-<file path=ppt/slides/slide18.xml><?xml version="1.0" encoding="utf-8"?>
-<p:sld xmlns:a="http://schemas.openxmlformats.org/drawingml/2006/main" xmlns:r="http://schemas.openxmlformats.org/officeDocument/2006/relationships" xmlns:p="http://schemas.openxmlformats.org/presentationml/2006/main">
-  <p:cSld>
-    <p:spTree>
-      <p:nvGrpSpPr>
-        <p:cNvPr id="1" name="">
-          <a:extLst>
-            <a:ext uri="{FF2B5EF4-FFF2-40B4-BE49-F238E27FC236}">
               <a16:creationId xmlns:a16="http://schemas.microsoft.com/office/drawing/2014/main" id="{028AE6DE-3D8A-A0A9-726F-6ABA21EDA589}"/>
             </a:ext>
           </a:extLst>
@@ -6895,7 +6639,7 @@
           <a:p>
             <a:fld id="{0EFBEC3F-4208-4590-BA97-4119A385DFD9}" type="datetime1">
               <a:rPr lang="en-US" smtClean="0"/>
-              <a:t>8/25/2025</a:t>
+              <a:t>9/15/2025</a:t>
             </a:fld>
             <a:endParaRPr lang="en-US"/>
           </a:p>
@@ -6924,7 +6668,7 @@
           <a:p>
             <a:fld id="{C1FF6DA9-008F-8B48-92A6-B652298478BF}" type="slidenum">
               <a:rPr lang="en-US" smtClean="0"/>
-              <a:t>18</a:t>
+              <a:t>17</a:t>
             </a:fld>
             <a:endParaRPr lang="en-US"/>
           </a:p>
@@ -7018,7 +6762,7 @@
 </p:sld>
 </file>
 
-<file path=ppt/slides/slide19.xml><?xml version="1.0" encoding="utf-8"?>
+<file path=ppt/slides/slide18.xml><?xml version="1.0" encoding="utf-8"?>
 <p:sld xmlns:a="http://schemas.openxmlformats.org/drawingml/2006/main" xmlns:r="http://schemas.openxmlformats.org/officeDocument/2006/relationships" xmlns:p="http://schemas.openxmlformats.org/presentationml/2006/main">
   <p:cSld>
     <p:spTree>
@@ -7189,7 +6933,7 @@
           <a:p>
             <a:fld id="{0EFBEC3F-4208-4590-BA97-4119A385DFD9}" type="datetime1">
               <a:rPr lang="en-US" smtClean="0"/>
-              <a:t>8/25/2025</a:t>
+              <a:t>9/15/2025</a:t>
             </a:fld>
             <a:endParaRPr lang="en-US"/>
           </a:p>
@@ -7218,7 +6962,7 @@
           <a:p>
             <a:fld id="{C1FF6DA9-008F-8B48-92A6-B652298478BF}" type="slidenum">
               <a:rPr lang="en-US" smtClean="0"/>
-              <a:t>19</a:t>
+              <a:t>18</a:t>
             </a:fld>
             <a:endParaRPr lang="en-US"/>
           </a:p>
@@ -7282,153 +7026,7 @@
 </p:sld>
 </file>
 
-<file path=ppt/slides/slide2.xml><?xml version="1.0" encoding="utf-8"?>
-<p:sld xmlns:a="http://schemas.openxmlformats.org/drawingml/2006/main" xmlns:r="http://schemas.openxmlformats.org/officeDocument/2006/relationships" xmlns:p="http://schemas.openxmlformats.org/presentationml/2006/main">
-  <p:cSld>
-    <p:spTree>
-      <p:nvGrpSpPr>
-        <p:cNvPr id="1" name=""/>
-        <p:cNvGrpSpPr/>
-        <p:nvPr/>
-      </p:nvGrpSpPr>
-      <p:grpSpPr>
-        <a:xfrm>
-          <a:off x="0" y="0"/>
-          <a:ext cx="0" cy="0"/>
-          <a:chOff x="0" y="0"/>
-          <a:chExt cx="0" cy="0"/>
-        </a:xfrm>
-      </p:grpSpPr>
-      <p:sp>
-        <p:nvSpPr>
-          <p:cNvPr id="2" name="Title 1">
-            <a:extLst>
-              <a:ext uri="{FF2B5EF4-FFF2-40B4-BE49-F238E27FC236}">
-                <a16:creationId xmlns:a16="http://schemas.microsoft.com/office/drawing/2014/main" id="{832DDC73-E864-3DF3-D847-0CF6487CE45A}"/>
-              </a:ext>
-            </a:extLst>
-          </p:cNvPr>
-          <p:cNvSpPr>
-            <a:spLocks noGrp="1"/>
-          </p:cNvSpPr>
-          <p:nvPr>
-            <p:ph type="title"/>
-          </p:nvPr>
-        </p:nvSpPr>
-        <p:spPr/>
-        <p:txBody>
-          <a:bodyPr/>
-          <a:lstStyle/>
-          <a:p>
-            <a:r>
-              <a:rPr lang="en-US" dirty="0"/>
-              <a:t>Table of Content</a:t>
-            </a:r>
-          </a:p>
-        </p:txBody>
-      </p:sp>
-      <p:sp>
-        <p:nvSpPr>
-          <p:cNvPr id="4" name="Slide Number Placeholder 3">
-            <a:extLst>
-              <a:ext uri="{FF2B5EF4-FFF2-40B4-BE49-F238E27FC236}">
-                <a16:creationId xmlns:a16="http://schemas.microsoft.com/office/drawing/2014/main" id="{854448E4-E877-3E71-587E-B044E8B2DB27}"/>
-              </a:ext>
-            </a:extLst>
-          </p:cNvPr>
-          <p:cNvSpPr>
-            <a:spLocks noGrp="1"/>
-          </p:cNvSpPr>
-          <p:nvPr>
-            <p:ph type="sldNum" sz="quarter" idx="12"/>
-          </p:nvPr>
-        </p:nvSpPr>
-        <p:spPr/>
-        <p:txBody>
-          <a:bodyPr/>
-          <a:lstStyle/>
-          <a:p>
-            <a:fld id="{C1FF6DA9-008F-8B48-92A6-B652298478BF}" type="slidenum">
-              <a:rPr lang="en-US" smtClean="0"/>
-              <a:t>2</a:t>
-            </a:fld>
-            <a:endParaRPr lang="en-US"/>
-          </a:p>
-        </p:txBody>
-      </p:sp>
-      <p:sp>
-        <p:nvSpPr>
-          <p:cNvPr id="3" name="Datumsplatzhalter 2">
-            <a:extLst>
-              <a:ext uri="{FF2B5EF4-FFF2-40B4-BE49-F238E27FC236}">
-                <a16:creationId xmlns:a16="http://schemas.microsoft.com/office/drawing/2014/main" id="{AAB11697-97BF-A7D8-079E-49FB8B0F44D9}"/>
-              </a:ext>
-            </a:extLst>
-          </p:cNvPr>
-          <p:cNvSpPr>
-            <a:spLocks noGrp="1"/>
-          </p:cNvSpPr>
-          <p:nvPr>
-            <p:ph type="dt" sz="half" idx="10"/>
-          </p:nvPr>
-        </p:nvSpPr>
-        <p:spPr/>
-        <p:txBody>
-          <a:bodyPr/>
-          <a:lstStyle/>
-          <a:p>
-            <a:fld id="{1AA46178-B97E-4817-9029-290586FA77E9}" type="datetime1">
-              <a:rPr lang="en-US" smtClean="0"/>
-              <a:t>8/25/2025</a:t>
-            </a:fld>
-            <a:endParaRPr lang="en-US"/>
-          </a:p>
-        </p:txBody>
-      </p:sp>
-      <p:sp>
-        <p:nvSpPr>
-          <p:cNvPr id="5" name="Content Placeholder 4">
-            <a:extLst>
-              <a:ext uri="{FF2B5EF4-FFF2-40B4-BE49-F238E27FC236}">
-                <a16:creationId xmlns:a16="http://schemas.microsoft.com/office/drawing/2014/main" id="{91B83917-42CB-6C06-A4F1-CD68DB8BD4AB}"/>
-              </a:ext>
-            </a:extLst>
-          </p:cNvPr>
-          <p:cNvSpPr>
-            <a:spLocks noGrp="1"/>
-          </p:cNvSpPr>
-          <p:nvPr>
-            <p:ph idx="1"/>
-          </p:nvPr>
-        </p:nvSpPr>
-        <p:spPr>
-          <a:xfrm>
-            <a:off x="457200" y="1600200"/>
-            <a:ext cx="8229600" cy="4525963"/>
-          </a:xfrm>
-        </p:spPr>
-        <p:txBody>
-          <a:bodyPr/>
-          <a:lstStyle/>
-          <a:p>
-            <a:endParaRPr lang="en-US" dirty="0"/>
-          </a:p>
-        </p:txBody>
-      </p:sp>
-    </p:spTree>
-    <p:extLst>
-      <p:ext uri="{BB962C8B-B14F-4D97-AF65-F5344CB8AC3E}">
-        <p14:creationId xmlns:p14="http://schemas.microsoft.com/office/powerpoint/2010/main" val="1742724825"/>
-      </p:ext>
-    </p:extLst>
-  </p:cSld>
-  <p:clrMapOvr>
-    <a:masterClrMapping/>
-  </p:clrMapOvr>
-</p:sld>
-</file>
-
-<file path=ppt/slides/slide20.xml><?xml version="1.0" encoding="utf-8"?>
+<file path=ppt/slides/slide19.xml><?xml version="1.0" encoding="utf-8"?>
 <p:sld xmlns:a="http://schemas.openxmlformats.org/drawingml/2006/main" xmlns:r="http://schemas.openxmlformats.org/officeDocument/2006/relationships" xmlns:p="http://schemas.openxmlformats.org/presentationml/2006/main">
   <p:cSld>
     <p:spTree>
@@ -7546,7 +7144,7 @@
           <a:p>
             <a:fld id="{0EFBEC3F-4208-4590-BA97-4119A385DFD9}" type="datetime1">
               <a:rPr lang="en-US" smtClean="0"/>
-              <a:t>8/25/2025</a:t>
+              <a:t>9/15/2025</a:t>
             </a:fld>
             <a:endParaRPr lang="en-US"/>
           </a:p>
@@ -7575,7 +7173,7 @@
           <a:p>
             <a:fld id="{C1FF6DA9-008F-8B48-92A6-B652298478BF}" type="slidenum">
               <a:rPr lang="en-US" smtClean="0"/>
-              <a:t>20</a:t>
+              <a:t>19</a:t>
             </a:fld>
             <a:endParaRPr lang="en-US"/>
           </a:p>
@@ -7699,7 +7297,153 @@
 </p:sld>
 </file>
 
-<file path=ppt/slides/slide21.xml><?xml version="1.0" encoding="utf-8"?>
+<file path=ppt/slides/slide2.xml><?xml version="1.0" encoding="utf-8"?>
+<p:sld xmlns:a="http://schemas.openxmlformats.org/drawingml/2006/main" xmlns:r="http://schemas.openxmlformats.org/officeDocument/2006/relationships" xmlns:p="http://schemas.openxmlformats.org/presentationml/2006/main">
+  <p:cSld>
+    <p:spTree>
+      <p:nvGrpSpPr>
+        <p:cNvPr id="1" name=""/>
+        <p:cNvGrpSpPr/>
+        <p:nvPr/>
+      </p:nvGrpSpPr>
+      <p:grpSpPr>
+        <a:xfrm>
+          <a:off x="0" y="0"/>
+          <a:ext cx="0" cy="0"/>
+          <a:chOff x="0" y="0"/>
+          <a:chExt cx="0" cy="0"/>
+        </a:xfrm>
+      </p:grpSpPr>
+      <p:sp>
+        <p:nvSpPr>
+          <p:cNvPr id="2" name="Title 1">
+            <a:extLst>
+              <a:ext uri="{FF2B5EF4-FFF2-40B4-BE49-F238E27FC236}">
+                <a16:creationId xmlns:a16="http://schemas.microsoft.com/office/drawing/2014/main" id="{832DDC73-E864-3DF3-D847-0CF6487CE45A}"/>
+              </a:ext>
+            </a:extLst>
+          </p:cNvPr>
+          <p:cNvSpPr>
+            <a:spLocks noGrp="1"/>
+          </p:cNvSpPr>
+          <p:nvPr>
+            <p:ph type="title"/>
+          </p:nvPr>
+        </p:nvSpPr>
+        <p:spPr/>
+        <p:txBody>
+          <a:bodyPr/>
+          <a:lstStyle/>
+          <a:p>
+            <a:r>
+              <a:rPr lang="en-US" dirty="0"/>
+              <a:t>Table of Content</a:t>
+            </a:r>
+          </a:p>
+        </p:txBody>
+      </p:sp>
+      <p:sp>
+        <p:nvSpPr>
+          <p:cNvPr id="4" name="Slide Number Placeholder 3">
+            <a:extLst>
+              <a:ext uri="{FF2B5EF4-FFF2-40B4-BE49-F238E27FC236}">
+                <a16:creationId xmlns:a16="http://schemas.microsoft.com/office/drawing/2014/main" id="{854448E4-E877-3E71-587E-B044E8B2DB27}"/>
+              </a:ext>
+            </a:extLst>
+          </p:cNvPr>
+          <p:cNvSpPr>
+            <a:spLocks noGrp="1"/>
+          </p:cNvSpPr>
+          <p:nvPr>
+            <p:ph type="sldNum" sz="quarter" idx="12"/>
+          </p:nvPr>
+        </p:nvSpPr>
+        <p:spPr/>
+        <p:txBody>
+          <a:bodyPr/>
+          <a:lstStyle/>
+          <a:p>
+            <a:fld id="{C1FF6DA9-008F-8B48-92A6-B652298478BF}" type="slidenum">
+              <a:rPr lang="en-US" smtClean="0"/>
+              <a:t>2</a:t>
+            </a:fld>
+            <a:endParaRPr lang="en-US"/>
+          </a:p>
+        </p:txBody>
+      </p:sp>
+      <p:sp>
+        <p:nvSpPr>
+          <p:cNvPr id="3" name="Datumsplatzhalter 2">
+            <a:extLst>
+              <a:ext uri="{FF2B5EF4-FFF2-40B4-BE49-F238E27FC236}">
+                <a16:creationId xmlns:a16="http://schemas.microsoft.com/office/drawing/2014/main" id="{AAB11697-97BF-A7D8-079E-49FB8B0F44D9}"/>
+              </a:ext>
+            </a:extLst>
+          </p:cNvPr>
+          <p:cNvSpPr>
+            <a:spLocks noGrp="1"/>
+          </p:cNvSpPr>
+          <p:nvPr>
+            <p:ph type="dt" sz="half" idx="10"/>
+          </p:nvPr>
+        </p:nvSpPr>
+        <p:spPr/>
+        <p:txBody>
+          <a:bodyPr/>
+          <a:lstStyle/>
+          <a:p>
+            <a:fld id="{1AA46178-B97E-4817-9029-290586FA77E9}" type="datetime1">
+              <a:rPr lang="en-US" smtClean="0"/>
+              <a:t>9/15/2025</a:t>
+            </a:fld>
+            <a:endParaRPr lang="en-US"/>
+          </a:p>
+        </p:txBody>
+      </p:sp>
+      <p:sp>
+        <p:nvSpPr>
+          <p:cNvPr id="5" name="Content Placeholder 4">
+            <a:extLst>
+              <a:ext uri="{FF2B5EF4-FFF2-40B4-BE49-F238E27FC236}">
+                <a16:creationId xmlns:a16="http://schemas.microsoft.com/office/drawing/2014/main" id="{91B83917-42CB-6C06-A4F1-CD68DB8BD4AB}"/>
+              </a:ext>
+            </a:extLst>
+          </p:cNvPr>
+          <p:cNvSpPr>
+            <a:spLocks noGrp="1"/>
+          </p:cNvSpPr>
+          <p:nvPr>
+            <p:ph idx="1"/>
+          </p:nvPr>
+        </p:nvSpPr>
+        <p:spPr>
+          <a:xfrm>
+            <a:off x="457200" y="1600200"/>
+            <a:ext cx="8229600" cy="4525963"/>
+          </a:xfrm>
+        </p:spPr>
+        <p:txBody>
+          <a:bodyPr/>
+          <a:lstStyle/>
+          <a:p>
+            <a:endParaRPr lang="en-US" dirty="0"/>
+          </a:p>
+        </p:txBody>
+      </p:sp>
+    </p:spTree>
+    <p:extLst>
+      <p:ext uri="{BB962C8B-B14F-4D97-AF65-F5344CB8AC3E}">
+        <p14:creationId xmlns:p14="http://schemas.microsoft.com/office/powerpoint/2010/main" val="1742724825"/>
+      </p:ext>
+    </p:extLst>
+  </p:cSld>
+  <p:clrMapOvr>
+    <a:masterClrMapping/>
+  </p:clrMapOvr>
+</p:sld>
+</file>
+
+<file path=ppt/slides/slide20.xml><?xml version="1.0" encoding="utf-8"?>
 <p:sld xmlns:a="http://schemas.openxmlformats.org/drawingml/2006/main" xmlns:r="http://schemas.openxmlformats.org/officeDocument/2006/relationships" xmlns:p="http://schemas.openxmlformats.org/presentationml/2006/main">
   <p:cSld>
     <p:spTree>
@@ -7817,7 +7561,7 @@
           <a:p>
             <a:fld id="{0EFBEC3F-4208-4590-BA97-4119A385DFD9}" type="datetime1">
               <a:rPr lang="en-US" smtClean="0"/>
-              <a:t>8/25/2025</a:t>
+              <a:t>9/15/2025</a:t>
             </a:fld>
             <a:endParaRPr lang="en-US"/>
           </a:p>
@@ -7846,7 +7590,7 @@
           <a:p>
             <a:fld id="{C1FF6DA9-008F-8B48-92A6-B652298478BF}" type="slidenum">
               <a:rPr lang="en-US" smtClean="0"/>
-              <a:t>21</a:t>
+              <a:t>20</a:t>
             </a:fld>
             <a:endParaRPr lang="en-US"/>
           </a:p>
@@ -7970,7 +7714,7 @@
 </p:sld>
 </file>
 
-<file path=ppt/slides/slide22.xml><?xml version="1.0" encoding="utf-8"?>
+<file path=ppt/slides/slide21.xml><?xml version="1.0" encoding="utf-8"?>
 <p:sld xmlns:a="http://schemas.openxmlformats.org/drawingml/2006/main" xmlns:r="http://schemas.openxmlformats.org/officeDocument/2006/relationships" xmlns:p="http://schemas.openxmlformats.org/presentationml/2006/main">
   <p:cSld>
     <p:spTree>
@@ -8088,7 +7832,7 @@
           <a:p>
             <a:fld id="{0EFBEC3F-4208-4590-BA97-4119A385DFD9}" type="datetime1">
               <a:rPr lang="en-US" smtClean="0"/>
-              <a:t>8/25/2025</a:t>
+              <a:t>9/15/2025</a:t>
             </a:fld>
             <a:endParaRPr lang="en-US"/>
           </a:p>
@@ -8117,7 +7861,7 @@
           <a:p>
             <a:fld id="{C1FF6DA9-008F-8B48-92A6-B652298478BF}" type="slidenum">
               <a:rPr lang="en-US" smtClean="0"/>
-              <a:t>22</a:t>
+              <a:t>21</a:t>
             </a:fld>
             <a:endParaRPr lang="en-US"/>
           </a:p>
@@ -8211,7 +7955,7 @@
 </p:sld>
 </file>
 
-<file path=ppt/slides/slide23.xml><?xml version="1.0" encoding="utf-8"?>
+<file path=ppt/slides/slide22.xml><?xml version="1.0" encoding="utf-8"?>
 <p:sld xmlns:a="http://schemas.openxmlformats.org/drawingml/2006/main" xmlns:r="http://schemas.openxmlformats.org/officeDocument/2006/relationships" xmlns:p="http://schemas.openxmlformats.org/presentationml/2006/main">
   <p:cSld>
     <p:spTree>
@@ -8329,7 +8073,7 @@
           <a:p>
             <a:fld id="{0EFBEC3F-4208-4590-BA97-4119A385DFD9}" type="datetime1">
               <a:rPr lang="en-US" smtClean="0"/>
-              <a:t>8/25/2025</a:t>
+              <a:t>9/15/2025</a:t>
             </a:fld>
             <a:endParaRPr lang="en-US"/>
           </a:p>
@@ -8358,7 +8102,7 @@
           <a:p>
             <a:fld id="{C1FF6DA9-008F-8B48-92A6-B652298478BF}" type="slidenum">
               <a:rPr lang="en-US" smtClean="0"/>
-              <a:t>23</a:t>
+              <a:t>22</a:t>
             </a:fld>
             <a:endParaRPr lang="en-US"/>
           </a:p>
@@ -8452,7 +8196,7 @@
 </p:sld>
 </file>
 
-<file path=ppt/slides/slide24.xml><?xml version="1.0" encoding="utf-8"?>
+<file path=ppt/slides/slide23.xml><?xml version="1.0" encoding="utf-8"?>
 <p:sld xmlns:a="http://schemas.openxmlformats.org/drawingml/2006/main" xmlns:r="http://schemas.openxmlformats.org/officeDocument/2006/relationships" xmlns:p="http://schemas.openxmlformats.org/presentationml/2006/main">
   <p:cSld>
     <p:spTree>
@@ -8570,7 +8314,7 @@
           <a:p>
             <a:fld id="{0EFBEC3F-4208-4590-BA97-4119A385DFD9}" type="datetime1">
               <a:rPr lang="en-US" smtClean="0"/>
-              <a:t>8/25/2025</a:t>
+              <a:t>9/15/2025</a:t>
             </a:fld>
             <a:endParaRPr lang="en-US"/>
           </a:p>
@@ -8599,7 +8343,7 @@
           <a:p>
             <a:fld id="{C1FF6DA9-008F-8B48-92A6-B652298478BF}" type="slidenum">
               <a:rPr lang="en-US" smtClean="0"/>
-              <a:t>24</a:t>
+              <a:t>23</a:t>
             </a:fld>
             <a:endParaRPr lang="en-US"/>
           </a:p>
@@ -8723,7 +8467,7 @@
 </p:sld>
 </file>
 
-<file path=ppt/slides/slide25.xml><?xml version="1.0" encoding="utf-8"?>
+<file path=ppt/slides/slide24.xml><?xml version="1.0" encoding="utf-8"?>
 <p:sld xmlns:a="http://schemas.openxmlformats.org/drawingml/2006/main" xmlns:r="http://schemas.openxmlformats.org/officeDocument/2006/relationships" xmlns:p="http://schemas.openxmlformats.org/presentationml/2006/main">
   <p:cSld>
     <p:spTree>
@@ -8853,7 +8597,7 @@
           <a:p>
             <a:fld id="{0EFBEC3F-4208-4590-BA97-4119A385DFD9}" type="datetime1">
               <a:rPr lang="en-US" smtClean="0"/>
-              <a:t>8/25/2025</a:t>
+              <a:t>9/15/2025</a:t>
             </a:fld>
             <a:endParaRPr lang="en-US"/>
           </a:p>
@@ -8882,7 +8626,7 @@
           <a:p>
             <a:fld id="{C1FF6DA9-008F-8B48-92A6-B652298478BF}" type="slidenum">
               <a:rPr lang="en-US" smtClean="0"/>
-              <a:t>25</a:t>
+              <a:t>24</a:t>
             </a:fld>
             <a:endParaRPr lang="en-US"/>
           </a:p>
@@ -9012,7 +8756,7 @@
 </p:sld>
 </file>
 
-<file path=ppt/slides/slide26.xml><?xml version="1.0" encoding="utf-8"?>
+<file path=ppt/slides/slide25.xml><?xml version="1.0" encoding="utf-8"?>
 <p:sld xmlns:a="http://schemas.openxmlformats.org/drawingml/2006/main" xmlns:r="http://schemas.openxmlformats.org/officeDocument/2006/relationships" xmlns:p="http://schemas.openxmlformats.org/presentationml/2006/main">
   <p:cSld>
     <p:spTree>
@@ -9127,7 +8871,7 @@
           <a:p>
             <a:fld id="{0EFBEC3F-4208-4590-BA97-4119A385DFD9}" type="datetime1">
               <a:rPr lang="en-US" smtClean="0"/>
-              <a:t>8/25/2025</a:t>
+              <a:t>9/15/2025</a:t>
             </a:fld>
             <a:endParaRPr lang="en-US"/>
           </a:p>
@@ -9156,7 +8900,7 @@
           <a:p>
             <a:fld id="{C1FF6DA9-008F-8B48-92A6-B652298478BF}" type="slidenum">
               <a:rPr lang="en-US" smtClean="0"/>
-              <a:t>26</a:t>
+              <a:t>25</a:t>
             </a:fld>
             <a:endParaRPr lang="en-US"/>
           </a:p>
@@ -9250,7 +8994,7 @@
 </p:sld>
 </file>
 
-<file path=ppt/slides/slide27.xml><?xml version="1.0" encoding="utf-8"?>
+<file path=ppt/slides/slide26.xml><?xml version="1.0" encoding="utf-8"?>
 <p:sld xmlns:a="http://schemas.openxmlformats.org/drawingml/2006/main" xmlns:r="http://schemas.openxmlformats.org/officeDocument/2006/relationships" xmlns:p="http://schemas.openxmlformats.org/presentationml/2006/main">
   <p:cSld>
     <p:spTree>
@@ -9365,7 +9109,7 @@
           <a:p>
             <a:fld id="{0EFBEC3F-4208-4590-BA97-4119A385DFD9}" type="datetime1">
               <a:rPr lang="en-US" smtClean="0"/>
-              <a:t>8/25/2025</a:t>
+              <a:t>9/15/2025</a:t>
             </a:fld>
             <a:endParaRPr lang="en-US"/>
           </a:p>
@@ -9394,7 +9138,7 @@
           <a:p>
             <a:fld id="{C1FF6DA9-008F-8B48-92A6-B652298478BF}" type="slidenum">
               <a:rPr lang="en-US" smtClean="0"/>
-              <a:t>27</a:t>
+              <a:t>26</a:t>
             </a:fld>
             <a:endParaRPr lang="en-US"/>
           </a:p>
@@ -9518,7 +9262,7 @@
 </p:sld>
 </file>
 
-<file path=ppt/slides/slide28.xml><?xml version="1.0" encoding="utf-8"?>
+<file path=ppt/slides/slide27.xml><?xml version="1.0" encoding="utf-8"?>
 <p:sld xmlns:a="http://schemas.openxmlformats.org/drawingml/2006/main" xmlns:r="http://schemas.openxmlformats.org/officeDocument/2006/relationships" xmlns:p="http://schemas.openxmlformats.org/presentationml/2006/main">
   <p:cSld>
     <p:spTree>
@@ -9669,7 +9413,7 @@
           <a:p>
             <a:fld id="{0EFBEC3F-4208-4590-BA97-4119A385DFD9}" type="datetime1">
               <a:rPr lang="en-US" smtClean="0"/>
-              <a:t>8/25/2025</a:t>
+              <a:t>9/15/2025</a:t>
             </a:fld>
             <a:endParaRPr lang="en-US"/>
           </a:p>
@@ -9698,7 +9442,7 @@
           <a:p>
             <a:fld id="{C1FF6DA9-008F-8B48-92A6-B652298478BF}" type="slidenum">
               <a:rPr lang="en-US" smtClean="0"/>
-              <a:t>28</a:t>
+              <a:t>27</a:t>
             </a:fld>
             <a:endParaRPr lang="en-US"/>
           </a:p>
@@ -9777,7 +9521,7 @@
 </p:sld>
 </file>
 
-<file path=ppt/slides/slide29.xml><?xml version="1.0" encoding="utf-8"?>
+<file path=ppt/slides/slide28.xml><?xml version="1.0" encoding="utf-8"?>
 <p:sld xmlns:a="http://schemas.openxmlformats.org/drawingml/2006/main" xmlns:r="http://schemas.openxmlformats.org/officeDocument/2006/relationships" xmlns:p="http://schemas.openxmlformats.org/presentationml/2006/main">
   <p:cSld>
     <p:spTree>
@@ -9896,7 +9640,7 @@
           <a:p>
             <a:fld id="{0EFBEC3F-4208-4590-BA97-4119A385DFD9}" type="datetime1">
               <a:rPr lang="en-US" smtClean="0"/>
-              <a:t>8/25/2025</a:t>
+              <a:t>9/15/2025</a:t>
             </a:fld>
             <a:endParaRPr lang="en-US"/>
           </a:p>
@@ -9925,7 +9669,7 @@
           <a:p>
             <a:fld id="{C1FF6DA9-008F-8B48-92A6-B652298478BF}" type="slidenum">
               <a:rPr lang="en-US" smtClean="0"/>
-              <a:t>29</a:t>
+              <a:t>28</a:t>
             </a:fld>
             <a:endParaRPr lang="en-US"/>
           </a:p>
@@ -10004,163 +9748,7 @@
 </p:sld>
 </file>
 
-<file path=ppt/slides/slide3.xml><?xml version="1.0" encoding="utf-8"?>
-<p:sld xmlns:a="http://schemas.openxmlformats.org/drawingml/2006/main" xmlns:r="http://schemas.openxmlformats.org/officeDocument/2006/relationships" xmlns:p="http://schemas.openxmlformats.org/presentationml/2006/main">
-  <p:cSld>
-    <p:spTree>
-      <p:nvGrpSpPr>
-        <p:cNvPr id="1" name=""/>
-        <p:cNvGrpSpPr/>
-        <p:nvPr/>
-      </p:nvGrpSpPr>
-      <p:grpSpPr>
-        <a:xfrm>
-          <a:off x="0" y="0"/>
-          <a:ext cx="0" cy="0"/>
-          <a:chOff x="0" y="0"/>
-          <a:chExt cx="0" cy="0"/>
-        </a:xfrm>
-      </p:grpSpPr>
-      <p:sp>
-        <p:nvSpPr>
-          <p:cNvPr id="2" name="Title 1">
-            <a:extLst>
-              <a:ext uri="{FF2B5EF4-FFF2-40B4-BE49-F238E27FC236}">
-                <a16:creationId xmlns:a16="http://schemas.microsoft.com/office/drawing/2014/main" id="{B9C0613F-E1A8-00E8-56D9-54D08CE43BF9}"/>
-              </a:ext>
-            </a:extLst>
-          </p:cNvPr>
-          <p:cNvSpPr>
-            <a:spLocks noGrp="1"/>
-          </p:cNvSpPr>
-          <p:nvPr>
-            <p:ph type="title"/>
-          </p:nvPr>
-        </p:nvSpPr>
-        <p:spPr/>
-        <p:txBody>
-          <a:bodyPr/>
-          <a:lstStyle/>
-          <a:p>
-            <a:r>
-              <a:rPr lang="en-US" dirty="0"/>
-              <a:t>Period Highlight - 4</a:t>
-            </a:r>
-          </a:p>
-        </p:txBody>
-      </p:sp>
-      <p:sp>
-        <p:nvSpPr>
-          <p:cNvPr id="3" name="Content Placeholder 2">
-            <a:extLst>
-              <a:ext uri="{FF2B5EF4-FFF2-40B4-BE49-F238E27FC236}">
-                <a16:creationId xmlns:a16="http://schemas.microsoft.com/office/drawing/2014/main" id="{08A4606F-6E0B-C26C-E39E-2025FA207242}"/>
-              </a:ext>
-            </a:extLst>
-          </p:cNvPr>
-          <p:cNvSpPr>
-            <a:spLocks noGrp="1"/>
-          </p:cNvSpPr>
-          <p:nvPr>
-            <p:ph idx="1"/>
-          </p:nvPr>
-        </p:nvSpPr>
-        <p:spPr/>
-        <p:txBody>
-          <a:bodyPr/>
-          <a:lstStyle/>
-          <a:p>
-            <a:r>
-              <a:rPr lang="en-US" dirty="0"/>
-              <a:t>Implementation of Vx and Vy</a:t>
-            </a:r>
-          </a:p>
-          <a:p>
-            <a:r>
-              <a:rPr lang="en-US" dirty="0"/>
-              <a:t>Validation of Vx and Vy</a:t>
-            </a:r>
-          </a:p>
-          <a:p>
-            <a:r>
-              <a:rPr lang="en-US" dirty="0"/>
-              <a:t>Obtain IMU</a:t>
-            </a:r>
-          </a:p>
-        </p:txBody>
-      </p:sp>
-      <p:sp>
-        <p:nvSpPr>
-          <p:cNvPr id="4" name="Date Placeholder 3">
-            <a:extLst>
-              <a:ext uri="{FF2B5EF4-FFF2-40B4-BE49-F238E27FC236}">
-                <a16:creationId xmlns:a16="http://schemas.microsoft.com/office/drawing/2014/main" id="{AF481221-112F-88F1-B090-32C47E3FB9AB}"/>
-              </a:ext>
-            </a:extLst>
-          </p:cNvPr>
-          <p:cNvSpPr>
-            <a:spLocks noGrp="1"/>
-          </p:cNvSpPr>
-          <p:nvPr>
-            <p:ph type="dt" sz="half" idx="10"/>
-          </p:nvPr>
-        </p:nvSpPr>
-        <p:spPr/>
-        <p:txBody>
-          <a:bodyPr/>
-          <a:lstStyle/>
-          <a:p>
-            <a:fld id="{0EFBEC3F-4208-4590-BA97-4119A385DFD9}" type="datetime1">
-              <a:rPr lang="en-US" smtClean="0"/>
-              <a:t>8/25/2025</a:t>
-            </a:fld>
-            <a:endParaRPr lang="en-US"/>
-          </a:p>
-        </p:txBody>
-      </p:sp>
-      <p:sp>
-        <p:nvSpPr>
-          <p:cNvPr id="5" name="Slide Number Placeholder 4">
-            <a:extLst>
-              <a:ext uri="{FF2B5EF4-FFF2-40B4-BE49-F238E27FC236}">
-                <a16:creationId xmlns:a16="http://schemas.microsoft.com/office/drawing/2014/main" id="{5708C3EC-3069-CF97-A1D8-B58BD7378B05}"/>
-              </a:ext>
-            </a:extLst>
-          </p:cNvPr>
-          <p:cNvSpPr>
-            <a:spLocks noGrp="1"/>
-          </p:cNvSpPr>
-          <p:nvPr>
-            <p:ph type="sldNum" sz="quarter" idx="12"/>
-          </p:nvPr>
-        </p:nvSpPr>
-        <p:spPr/>
-        <p:txBody>
-          <a:bodyPr/>
-          <a:lstStyle/>
-          <a:p>
-            <a:fld id="{C1FF6DA9-008F-8B48-92A6-B652298478BF}" type="slidenum">
-              <a:rPr lang="en-US" smtClean="0"/>
-              <a:t>3</a:t>
-            </a:fld>
-            <a:endParaRPr lang="en-US"/>
-          </a:p>
-        </p:txBody>
-      </p:sp>
-    </p:spTree>
-    <p:extLst>
-      <p:ext uri="{BB962C8B-B14F-4D97-AF65-F5344CB8AC3E}">
-        <p14:creationId xmlns:p14="http://schemas.microsoft.com/office/powerpoint/2010/main" val="4022417390"/>
-      </p:ext>
-    </p:extLst>
-  </p:cSld>
-  <p:clrMapOvr>
-    <a:masterClrMapping/>
-  </p:clrMapOvr>
-</p:sld>
-</file>
-
-<file path=ppt/slides/slide30.xml><?xml version="1.0" encoding="utf-8"?>
+<file path=ppt/slides/slide29.xml><?xml version="1.0" encoding="utf-8"?>
 <p:sld xmlns:a="http://schemas.openxmlformats.org/drawingml/2006/main" xmlns:r="http://schemas.openxmlformats.org/officeDocument/2006/relationships" xmlns:p="http://schemas.openxmlformats.org/presentationml/2006/main">
   <p:cSld>
     <p:spTree>
@@ -10279,7 +9867,7 @@
           <a:p>
             <a:fld id="{0EFBEC3F-4208-4590-BA97-4119A385DFD9}" type="datetime1">
               <a:rPr lang="en-US" smtClean="0"/>
-              <a:t>8/25/2025</a:t>
+              <a:t>9/15/2025</a:t>
             </a:fld>
             <a:endParaRPr lang="en-US"/>
           </a:p>
@@ -10308,7 +9896,7 @@
           <a:p>
             <a:fld id="{C1FF6DA9-008F-8B48-92A6-B652298478BF}" type="slidenum">
               <a:rPr lang="en-US" smtClean="0"/>
-              <a:t>30</a:t>
+              <a:t>29</a:t>
             </a:fld>
             <a:endParaRPr lang="en-US"/>
           </a:p>
@@ -10327,7 +9915,163 @@
 </p:sld>
 </file>
 
-<file path=ppt/slides/slide31.xml><?xml version="1.0" encoding="utf-8"?>
+<file path=ppt/slides/slide3.xml><?xml version="1.0" encoding="utf-8"?>
+<p:sld xmlns:a="http://schemas.openxmlformats.org/drawingml/2006/main" xmlns:r="http://schemas.openxmlformats.org/officeDocument/2006/relationships" xmlns:p="http://schemas.openxmlformats.org/presentationml/2006/main">
+  <p:cSld>
+    <p:spTree>
+      <p:nvGrpSpPr>
+        <p:cNvPr id="1" name=""/>
+        <p:cNvGrpSpPr/>
+        <p:nvPr/>
+      </p:nvGrpSpPr>
+      <p:grpSpPr>
+        <a:xfrm>
+          <a:off x="0" y="0"/>
+          <a:ext cx="0" cy="0"/>
+          <a:chOff x="0" y="0"/>
+          <a:chExt cx="0" cy="0"/>
+        </a:xfrm>
+      </p:grpSpPr>
+      <p:sp>
+        <p:nvSpPr>
+          <p:cNvPr id="2" name="Title 1">
+            <a:extLst>
+              <a:ext uri="{FF2B5EF4-FFF2-40B4-BE49-F238E27FC236}">
+                <a16:creationId xmlns:a16="http://schemas.microsoft.com/office/drawing/2014/main" id="{B9C0613F-E1A8-00E8-56D9-54D08CE43BF9}"/>
+              </a:ext>
+            </a:extLst>
+          </p:cNvPr>
+          <p:cNvSpPr>
+            <a:spLocks noGrp="1"/>
+          </p:cNvSpPr>
+          <p:nvPr>
+            <p:ph type="title"/>
+          </p:nvPr>
+        </p:nvSpPr>
+        <p:spPr/>
+        <p:txBody>
+          <a:bodyPr/>
+          <a:lstStyle/>
+          <a:p>
+            <a:r>
+              <a:rPr lang="en-US" dirty="0"/>
+              <a:t>Period Highlight - 4</a:t>
+            </a:r>
+          </a:p>
+        </p:txBody>
+      </p:sp>
+      <p:sp>
+        <p:nvSpPr>
+          <p:cNvPr id="3" name="Content Placeholder 2">
+            <a:extLst>
+              <a:ext uri="{FF2B5EF4-FFF2-40B4-BE49-F238E27FC236}">
+                <a16:creationId xmlns:a16="http://schemas.microsoft.com/office/drawing/2014/main" id="{08A4606F-6E0B-C26C-E39E-2025FA207242}"/>
+              </a:ext>
+            </a:extLst>
+          </p:cNvPr>
+          <p:cNvSpPr>
+            <a:spLocks noGrp="1"/>
+          </p:cNvSpPr>
+          <p:nvPr>
+            <p:ph idx="1"/>
+          </p:nvPr>
+        </p:nvSpPr>
+        <p:spPr/>
+        <p:txBody>
+          <a:bodyPr/>
+          <a:lstStyle/>
+          <a:p>
+            <a:r>
+              <a:rPr lang="en-US" dirty="0"/>
+              <a:t>Implementation of Vx and Vy</a:t>
+            </a:r>
+          </a:p>
+          <a:p>
+            <a:r>
+              <a:rPr lang="en-US" dirty="0"/>
+              <a:t>Validation of Vx and Vy</a:t>
+            </a:r>
+          </a:p>
+          <a:p>
+            <a:r>
+              <a:rPr lang="en-US" dirty="0"/>
+              <a:t>Obtain IMU</a:t>
+            </a:r>
+          </a:p>
+        </p:txBody>
+      </p:sp>
+      <p:sp>
+        <p:nvSpPr>
+          <p:cNvPr id="4" name="Date Placeholder 3">
+            <a:extLst>
+              <a:ext uri="{FF2B5EF4-FFF2-40B4-BE49-F238E27FC236}">
+                <a16:creationId xmlns:a16="http://schemas.microsoft.com/office/drawing/2014/main" id="{AF481221-112F-88F1-B090-32C47E3FB9AB}"/>
+              </a:ext>
+            </a:extLst>
+          </p:cNvPr>
+          <p:cNvSpPr>
+            <a:spLocks noGrp="1"/>
+          </p:cNvSpPr>
+          <p:nvPr>
+            <p:ph type="dt" sz="half" idx="10"/>
+          </p:nvPr>
+        </p:nvSpPr>
+        <p:spPr/>
+        <p:txBody>
+          <a:bodyPr/>
+          <a:lstStyle/>
+          <a:p>
+            <a:fld id="{0EFBEC3F-4208-4590-BA97-4119A385DFD9}" type="datetime1">
+              <a:rPr lang="en-US" smtClean="0"/>
+              <a:t>9/15/2025</a:t>
+            </a:fld>
+            <a:endParaRPr lang="en-US"/>
+          </a:p>
+        </p:txBody>
+      </p:sp>
+      <p:sp>
+        <p:nvSpPr>
+          <p:cNvPr id="5" name="Slide Number Placeholder 4">
+            <a:extLst>
+              <a:ext uri="{FF2B5EF4-FFF2-40B4-BE49-F238E27FC236}">
+                <a16:creationId xmlns:a16="http://schemas.microsoft.com/office/drawing/2014/main" id="{5708C3EC-3069-CF97-A1D8-B58BD7378B05}"/>
+              </a:ext>
+            </a:extLst>
+          </p:cNvPr>
+          <p:cNvSpPr>
+            <a:spLocks noGrp="1"/>
+          </p:cNvSpPr>
+          <p:nvPr>
+            <p:ph type="sldNum" sz="quarter" idx="12"/>
+          </p:nvPr>
+        </p:nvSpPr>
+        <p:spPr/>
+        <p:txBody>
+          <a:bodyPr/>
+          <a:lstStyle/>
+          <a:p>
+            <a:fld id="{C1FF6DA9-008F-8B48-92A6-B652298478BF}" type="slidenum">
+              <a:rPr lang="en-US" smtClean="0"/>
+              <a:t>3</a:t>
+            </a:fld>
+            <a:endParaRPr lang="en-US"/>
+          </a:p>
+        </p:txBody>
+      </p:sp>
+    </p:spTree>
+    <p:extLst>
+      <p:ext uri="{BB962C8B-B14F-4D97-AF65-F5344CB8AC3E}">
+        <p14:creationId xmlns:p14="http://schemas.microsoft.com/office/powerpoint/2010/main" val="4022417390"/>
+      </p:ext>
+    </p:extLst>
+  </p:cSld>
+  <p:clrMapOvr>
+    <a:masterClrMapping/>
+  </p:clrMapOvr>
+</p:sld>
+</file>
+
+<file path=ppt/slides/slide30.xml><?xml version="1.0" encoding="utf-8"?>
 <p:sld xmlns:a="http://schemas.openxmlformats.org/drawingml/2006/main" xmlns:r="http://schemas.openxmlformats.org/officeDocument/2006/relationships" xmlns:p="http://schemas.openxmlformats.org/presentationml/2006/main">
   <p:cSld>
     <p:spTree>
@@ -10459,7 +10203,7 @@
           <a:p>
             <a:fld id="{0EFBEC3F-4208-4590-BA97-4119A385DFD9}" type="datetime1">
               <a:rPr lang="en-US" smtClean="0"/>
-              <a:t>8/25/2025</a:t>
+              <a:t>9/15/2025</a:t>
             </a:fld>
             <a:endParaRPr lang="en-US"/>
           </a:p>
@@ -10488,7 +10232,7 @@
           <a:p>
             <a:fld id="{C1FF6DA9-008F-8B48-92A6-B652298478BF}" type="slidenum">
               <a:rPr lang="en-US" smtClean="0"/>
-              <a:t>31</a:t>
+              <a:t>30</a:t>
             </a:fld>
             <a:endParaRPr lang="en-US"/>
           </a:p>
@@ -10537,7 +10281,7 @@
 </p:sld>
 </file>
 
-<file path=ppt/slides/slide32.xml><?xml version="1.0" encoding="utf-8"?>
+<file path=ppt/slides/slide31.xml><?xml version="1.0" encoding="utf-8"?>
 <p:sld xmlns:a="http://schemas.openxmlformats.org/drawingml/2006/main" xmlns:r="http://schemas.openxmlformats.org/officeDocument/2006/relationships" xmlns:p="http://schemas.openxmlformats.org/presentationml/2006/main">
   <p:cSld>
     <p:spTree>
@@ -10638,7 +10382,7 @@
           <a:p>
             <a:fld id="{0EFBEC3F-4208-4590-BA97-4119A385DFD9}" type="datetime1">
               <a:rPr lang="en-US" smtClean="0"/>
-              <a:t>8/25/2025</a:t>
+              <a:t>9/15/2025</a:t>
             </a:fld>
             <a:endParaRPr lang="en-US"/>
           </a:p>
@@ -10667,7 +10411,7 @@
           <a:p>
             <a:fld id="{C1FF6DA9-008F-8B48-92A6-B652298478BF}" type="slidenum">
               <a:rPr lang="en-US" smtClean="0"/>
-              <a:t>32</a:t>
+              <a:t>31</a:t>
             </a:fld>
             <a:endParaRPr lang="en-US"/>
           </a:p>
@@ -10839,7 +10583,7 @@
           <a:p>
             <a:fld id="{0EFBEC3F-4208-4590-BA97-4119A385DFD9}" type="datetime1">
               <a:rPr lang="en-US" smtClean="0"/>
-              <a:t>8/25/2025</a:t>
+              <a:t>9/15/2025</a:t>
             </a:fld>
             <a:endParaRPr lang="en-US"/>
           </a:p>
@@ -11181,7 +10925,7 @@
           <a:p>
             <a:fld id="{0EFBEC3F-4208-4590-BA97-4119A385DFD9}" type="datetime1">
               <a:rPr lang="en-US" smtClean="0"/>
-              <a:t>8/25/2025</a:t>
+              <a:t>9/15/2025</a:t>
             </a:fld>
             <a:endParaRPr lang="en-US"/>
           </a:p>
@@ -11432,7 +11176,7 @@
           <a:p>
             <a:fld id="{0EFBEC3F-4208-4590-BA97-4119A385DFD9}" type="datetime1">
               <a:rPr lang="en-US" smtClean="0"/>
-              <a:t>8/25/2025</a:t>
+              <a:t>9/15/2025</a:t>
             </a:fld>
             <a:endParaRPr lang="en-US"/>
           </a:p>
@@ -11588,7 +11332,7 @@
           <a:p>
             <a:fld id="{0EFBEC3F-4208-4590-BA97-4119A385DFD9}" type="datetime1">
               <a:rPr lang="en-US" smtClean="0"/>
-              <a:t>8/25/2025</a:t>
+              <a:t>9/15/2025</a:t>
             </a:fld>
             <a:endParaRPr lang="en-US"/>
           </a:p>
@@ -11907,7 +11651,7 @@
           <a:p>
             <a:fld id="{0EFBEC3F-4208-4590-BA97-4119A385DFD9}" type="datetime1">
               <a:rPr lang="en-US" smtClean="0"/>
-              <a:t>8/25/2025</a:t>
+              <a:t>9/15/2025</a:t>
             </a:fld>
             <a:endParaRPr lang="en-US"/>
           </a:p>
@@ -12220,7 +11964,7 @@
           <a:p>
             <a:fld id="{0EFBEC3F-4208-4590-BA97-4119A385DFD9}" type="datetime1">
               <a:rPr lang="en-US" smtClean="0"/>
-              <a:t>8/25/2025</a:t>
+              <a:t>9/15/2025</a:t>
             </a:fld>
             <a:endParaRPr lang="en-US"/>
           </a:p>

</xml_diff>